<commit_message>
slides on first meeting
</commit_message>
<xml_diff>
--- a/NWBUnderstanding.pptx
+++ b/NWBUnderstanding.pptx
@@ -8,6 +8,8 @@
     <p:sldId id="256" r:id="rId2"/>
     <p:sldId id="258" r:id="rId3"/>
     <p:sldId id="257" r:id="rId4"/>
+    <p:sldId id="259" r:id="rId5"/>
+    <p:sldId id="260" r:id="rId6"/>
   </p:sldIdLst>
   <p:sldSz cx="12192000" cy="6858000"/>
   <p:notesSz cx="6858000" cy="9144000"/>
@@ -106,6 +108,11 @@
       </a:defRPr>
     </a:lvl9pPr>
   </p:defaultTextStyle>
+  <p:extLst>
+    <p:ext uri="{EFAFB233-063F-42B5-8137-9DF3F51BA10A}">
+      <p15:sldGuideLst xmlns:p15="http://schemas.microsoft.com/office/powerpoint/2012/main"/>
+    </p:ext>
+  </p:extLst>
 </p:presentation>
 </file>
 
@@ -256,7 +263,7 @@
           <a:p>
             <a:fld id="{22672356-9B25-4037-AA2B-D3C17254FCC8}" type="datetimeFigureOut">
               <a:rPr lang="en-US" smtClean="0"/>
-              <a:t>4/18/2022</a:t>
+              <a:t>4/19/2022</a:t>
             </a:fld>
             <a:endParaRPr lang="en-US"/>
           </a:p>
@@ -454,7 +461,7 @@
           <a:p>
             <a:fld id="{22672356-9B25-4037-AA2B-D3C17254FCC8}" type="datetimeFigureOut">
               <a:rPr lang="en-US" smtClean="0"/>
-              <a:t>4/18/2022</a:t>
+              <a:t>4/19/2022</a:t>
             </a:fld>
             <a:endParaRPr lang="en-US"/>
           </a:p>
@@ -662,7 +669,7 @@
           <a:p>
             <a:fld id="{22672356-9B25-4037-AA2B-D3C17254FCC8}" type="datetimeFigureOut">
               <a:rPr lang="en-US" smtClean="0"/>
-              <a:t>4/18/2022</a:t>
+              <a:t>4/19/2022</a:t>
             </a:fld>
             <a:endParaRPr lang="en-US"/>
           </a:p>
@@ -860,7 +867,7 @@
           <a:p>
             <a:fld id="{22672356-9B25-4037-AA2B-D3C17254FCC8}" type="datetimeFigureOut">
               <a:rPr lang="en-US" smtClean="0"/>
-              <a:t>4/18/2022</a:t>
+              <a:t>4/19/2022</a:t>
             </a:fld>
             <a:endParaRPr lang="en-US"/>
           </a:p>
@@ -1135,7 +1142,7 @@
           <a:p>
             <a:fld id="{22672356-9B25-4037-AA2B-D3C17254FCC8}" type="datetimeFigureOut">
               <a:rPr lang="en-US" smtClean="0"/>
-              <a:t>4/18/2022</a:t>
+              <a:t>4/19/2022</a:t>
             </a:fld>
             <a:endParaRPr lang="en-US"/>
           </a:p>
@@ -1400,7 +1407,7 @@
           <a:p>
             <a:fld id="{22672356-9B25-4037-AA2B-D3C17254FCC8}" type="datetimeFigureOut">
               <a:rPr lang="en-US" smtClean="0"/>
-              <a:t>4/18/2022</a:t>
+              <a:t>4/19/2022</a:t>
             </a:fld>
             <a:endParaRPr lang="en-US"/>
           </a:p>
@@ -1812,7 +1819,7 @@
           <a:p>
             <a:fld id="{22672356-9B25-4037-AA2B-D3C17254FCC8}" type="datetimeFigureOut">
               <a:rPr lang="en-US" smtClean="0"/>
-              <a:t>4/18/2022</a:t>
+              <a:t>4/19/2022</a:t>
             </a:fld>
             <a:endParaRPr lang="en-US"/>
           </a:p>
@@ -1953,7 +1960,7 @@
           <a:p>
             <a:fld id="{22672356-9B25-4037-AA2B-D3C17254FCC8}" type="datetimeFigureOut">
               <a:rPr lang="en-US" smtClean="0"/>
-              <a:t>4/18/2022</a:t>
+              <a:t>4/19/2022</a:t>
             </a:fld>
             <a:endParaRPr lang="en-US"/>
           </a:p>
@@ -2066,7 +2073,7 @@
           <a:p>
             <a:fld id="{22672356-9B25-4037-AA2B-D3C17254FCC8}" type="datetimeFigureOut">
               <a:rPr lang="en-US" smtClean="0"/>
-              <a:t>4/18/2022</a:t>
+              <a:t>4/19/2022</a:t>
             </a:fld>
             <a:endParaRPr lang="en-US"/>
           </a:p>
@@ -2377,7 +2384,7 @@
           <a:p>
             <a:fld id="{22672356-9B25-4037-AA2B-D3C17254FCC8}" type="datetimeFigureOut">
               <a:rPr lang="en-US" smtClean="0"/>
-              <a:t>4/18/2022</a:t>
+              <a:t>4/19/2022</a:t>
             </a:fld>
             <a:endParaRPr lang="en-US"/>
           </a:p>
@@ -2665,7 +2672,7 @@
           <a:p>
             <a:fld id="{22672356-9B25-4037-AA2B-D3C17254FCC8}" type="datetimeFigureOut">
               <a:rPr lang="en-US" smtClean="0"/>
-              <a:t>4/18/2022</a:t>
+              <a:t>4/19/2022</a:t>
             </a:fld>
             <a:endParaRPr lang="en-US"/>
           </a:p>
@@ -2906,7 +2913,7 @@
           <a:p>
             <a:fld id="{22672356-9B25-4037-AA2B-D3C17254FCC8}" type="datetimeFigureOut">
               <a:rPr lang="en-US" smtClean="0"/>
-              <a:t>4/18/2022</a:t>
+              <a:t>4/19/2022</a:t>
             </a:fld>
             <a:endParaRPr lang="en-US"/>
           </a:p>
@@ -3431,23 +3438,211 @@
           <a:p>
             <a:r>
               <a:rPr lang="en-US" dirty="0"/>
-              <a:t>NWB </a:t>
-            </a:r>
-            <a:r>
-              <a:rPr lang="en-US"/>
-              <a:t>file for </a:t>
+              <a:t>NWB file for electrode/device related field</a:t>
+            </a:r>
+          </a:p>
+          <a:p>
+            <a:pPr lvl="1"/>
+            <a:r>
+              <a:rPr lang="en-US" dirty="0" err="1"/>
+              <a:t>general_extracellular_ephys</a:t>
+            </a:r>
+            <a:endParaRPr lang="en-US" dirty="0"/>
+          </a:p>
+          <a:p>
+            <a:pPr lvl="2"/>
+            <a:r>
+              <a:rPr lang="en-US" dirty="0" err="1"/>
+              <a:t>Electrode_group</a:t>
             </a:r>
             <a:r>
               <a:rPr lang="en-US" dirty="0"/>
-              <a:t>electrode </a:t>
-            </a:r>
-            <a:r>
-              <a:rPr lang="en-US"/>
-              <a:t>related field</a:t>
-            </a:r>
+              <a:t>_*</a:t>
+            </a:r>
+          </a:p>
+          <a:p>
+            <a:pPr lvl="3"/>
+            <a:r>
+              <a:rPr lang="en-US" dirty="0" err="1"/>
+              <a:t>nwb.general_extracellular_ephys.set</a:t>
+            </a:r>
+            <a:r>
+              <a:rPr lang="en-US" dirty="0"/>
+              <a:t>('</a:t>
+            </a:r>
+            <a:r>
+              <a:rPr lang="en-US" dirty="0" err="1"/>
+              <a:t>electrode_group_STN</a:t>
+            </a:r>
+            <a:r>
+              <a:rPr lang="en-US" dirty="0"/>
+              <a:t>', </a:t>
+            </a:r>
+            <a:r>
+              <a:rPr lang="en-US" dirty="0" err="1"/>
+              <a:t>eg</a:t>
+            </a:r>
+            <a:r>
+              <a:rPr lang="en-US" dirty="0"/>
+              <a:t>);</a:t>
+            </a:r>
+          </a:p>
+          <a:p>
+            <a:pPr lvl="3"/>
+            <a:r>
+              <a:rPr lang="en-US" dirty="0" err="1"/>
+              <a:t>nwb.general_extracellular_ephys.set</a:t>
+            </a:r>
+            <a:r>
+              <a:rPr lang="en-US" dirty="0"/>
+              <a:t>('</a:t>
+            </a:r>
+            <a:r>
+              <a:rPr lang="en-US" dirty="0" err="1"/>
+              <a:t>electrode_group_GP</a:t>
+            </a:r>
+            <a:r>
+              <a:rPr lang="en-US" dirty="0"/>
+              <a:t>', </a:t>
+            </a:r>
+            <a:r>
+              <a:rPr lang="en-US" dirty="0" err="1"/>
+              <a:t>eg</a:t>
+            </a:r>
+            <a:r>
+              <a:rPr lang="en-US" dirty="0"/>
+              <a:t>);</a:t>
+            </a:r>
+          </a:p>
+          <a:p>
+            <a:pPr lvl="3"/>
+            <a:r>
+              <a:rPr lang="en-US" dirty="0" err="1"/>
+              <a:t>nwb.general_extracellular_ephys.set</a:t>
+            </a:r>
+            <a:r>
+              <a:rPr lang="en-US" dirty="0"/>
+              <a:t>('</a:t>
+            </a:r>
+            <a:r>
+              <a:rPr lang="en-US" dirty="0" err="1"/>
+              <a:t>electrode_group_STN</a:t>
+            </a:r>
+            <a:r>
+              <a:rPr lang="en-US" dirty="0"/>
+              <a:t>', </a:t>
+            </a:r>
+            <a:r>
+              <a:rPr lang="en-US" dirty="0" err="1"/>
+              <a:t>eg</a:t>
+            </a:r>
+            <a:r>
+              <a:rPr lang="en-US" dirty="0"/>
+              <a:t>);</a:t>
+            </a:r>
+          </a:p>
+          <a:p>
+            <a:pPr lvl="2"/>
+            <a:endParaRPr lang="en-US" dirty="0"/>
+          </a:p>
+          <a:p>
+            <a:pPr lvl="2"/>
+            <a:endParaRPr lang="en-US" dirty="0"/>
           </a:p>
           <a:p>
             <a:pPr lvl="1"/>
+            <a:r>
+              <a:rPr lang="en-US" dirty="0" err="1"/>
+              <a:t>general_devices</a:t>
+            </a:r>
+            <a:endParaRPr lang="en-US" dirty="0"/>
+          </a:p>
+          <a:p>
+            <a:pPr lvl="2"/>
+            <a:r>
+              <a:rPr lang="en-US" dirty="0" err="1"/>
+              <a:t>nwb.general_devices.set</a:t>
+            </a:r>
+            <a:r>
+              <a:rPr lang="en-US" dirty="0"/>
+              <a:t>(‘TDT’, </a:t>
+            </a:r>
+            <a:r>
+              <a:rPr lang="en-US" dirty="0" err="1"/>
+              <a:t>types.core.Device</a:t>
+            </a:r>
+            <a:r>
+              <a:rPr lang="en-US" dirty="0"/>
+              <a:t>())</a:t>
+            </a:r>
+          </a:p>
+          <a:p>
+            <a:pPr lvl="2"/>
+            <a:r>
+              <a:rPr lang="en-US" dirty="0" err="1"/>
+              <a:t>nwb.general_devices.set</a:t>
+            </a:r>
+            <a:r>
+              <a:rPr lang="en-US" dirty="0"/>
+              <a:t>(‘MA’, </a:t>
+            </a:r>
+            <a:r>
+              <a:rPr lang="en-US" dirty="0" err="1"/>
+              <a:t>types.core.Device</a:t>
+            </a:r>
+            <a:r>
+              <a:rPr lang="en-US" dirty="0"/>
+              <a:t>())</a:t>
+            </a:r>
+          </a:p>
+          <a:p>
+            <a:pPr lvl="2"/>
+            <a:r>
+              <a:rPr lang="en-US" dirty="0" err="1"/>
+              <a:t>nwb.general_devices.set</a:t>
+            </a:r>
+            <a:r>
+              <a:rPr lang="en-US" dirty="0"/>
+              <a:t>(‘</a:t>
+            </a:r>
+            <a:r>
+              <a:rPr lang="en-US" dirty="0" err="1"/>
+              <a:t>EyeTracking</a:t>
+            </a:r>
+            <a:r>
+              <a:rPr lang="en-US" dirty="0"/>
+              <a:t>’, </a:t>
+            </a:r>
+            <a:r>
+              <a:rPr lang="en-US" dirty="0" err="1"/>
+              <a:t>types.core.Device</a:t>
+            </a:r>
+            <a:r>
+              <a:rPr lang="en-US" dirty="0"/>
+              <a:t>())</a:t>
+            </a:r>
+          </a:p>
+          <a:p>
+            <a:pPr lvl="2"/>
+            <a:r>
+              <a:rPr lang="en-US" dirty="0" err="1"/>
+              <a:t>nwb.general_devices.set</a:t>
+            </a:r>
+            <a:r>
+              <a:rPr lang="en-US" dirty="0"/>
+              <a:t>(‘DLC’, </a:t>
+            </a:r>
+            <a:r>
+              <a:rPr lang="en-US" dirty="0" err="1"/>
+              <a:t>types.core.Device</a:t>
+            </a:r>
+            <a:r>
+              <a:rPr lang="en-US" dirty="0"/>
+              <a:t>())</a:t>
+            </a:r>
+          </a:p>
+          <a:p>
+            <a:pPr lvl="2"/>
             <a:endParaRPr lang="en-US" dirty="0"/>
           </a:p>
         </p:txBody>
@@ -3521,47 +3716,16 @@
           <a:p>
             <a:pPr lvl="1"/>
             <a:r>
-              <a:rPr lang="en-US" b="0" i="0" dirty="0">
-                <a:solidFill>
-                  <a:srgbClr val="404040"/>
-                </a:solidFill>
-                <a:effectLst/>
-                <a:latin typeface="Lato" panose="020F0502020204030203" pitchFamily="34" charset="0"/>
-              </a:rPr>
+              <a:rPr lang="en-US" dirty="0"/>
               <a:t>electrode group, </a:t>
             </a:r>
             <a:r>
-              <a:rPr lang="en-US" b="0" i="0" dirty="0" err="1">
-                <a:solidFill>
-                  <a:srgbClr val="404040"/>
-                </a:solidFill>
-                <a:effectLst/>
-                <a:latin typeface="Lato" panose="020F0502020204030203" pitchFamily="34" charset="0"/>
-              </a:rPr>
+              <a:rPr lang="en-US" dirty="0" err="1"/>
               <a:t>e.g</a:t>
             </a:r>
             <a:r>
-              <a:rPr lang="en-US" b="0" i="0" dirty="0">
-                <a:solidFill>
-                  <a:srgbClr val="404040"/>
-                </a:solidFill>
-                <a:effectLst/>
-                <a:latin typeface="Lato" panose="020F0502020204030203" pitchFamily="34" charset="0"/>
-              </a:rPr>
-              <a:t> DBS</a:t>
-            </a:r>
-            <a:r>
-              <a:rPr lang="en-US" dirty="0">
-                <a:solidFill>
-                  <a:srgbClr val="404040"/>
-                </a:solidFill>
-                <a:latin typeface="Lato" panose="020F0502020204030203" pitchFamily="34" charset="0"/>
-              </a:rPr>
-              <a:t>S, DBSG, UDLP</a:t>
-            </a:r>
-            <a:r>
               <a:rPr lang="en-US" dirty="0"/>
-              <a:t> </a:t>
+              <a:t> DBSS, DBSG, UDLP </a:t>
             </a:r>
           </a:p>
           <a:p>
@@ -3628,6 +3792,188 @@
     <p:extLst>
       <p:ext uri="{BB962C8B-B14F-4D97-AF65-F5344CB8AC3E}">
         <p14:creationId xmlns:p14="http://schemas.microsoft.com/office/powerpoint/2010/main" val="2998193176"/>
+      </p:ext>
+    </p:extLst>
+  </p:cSld>
+  <p:clrMapOvr>
+    <a:masterClrMapping/>
+  </p:clrMapOvr>
+</p:sld>
+</file>
+
+<file path=ppt/slides/slide4.xml><?xml version="1.0" encoding="utf-8"?>
+<p:sld xmlns:a="http://schemas.openxmlformats.org/drawingml/2006/main" xmlns:r="http://schemas.openxmlformats.org/officeDocument/2006/relationships" xmlns:p="http://schemas.openxmlformats.org/presentationml/2006/main">
+  <p:cSld>
+    <p:spTree>
+      <p:nvGrpSpPr>
+        <p:cNvPr id="1" name=""/>
+        <p:cNvGrpSpPr/>
+        <p:nvPr/>
+      </p:nvGrpSpPr>
+      <p:grpSpPr>
+        <a:xfrm>
+          <a:off x="0" y="0"/>
+          <a:ext cx="0" cy="0"/>
+          <a:chOff x="0" y="0"/>
+          <a:chExt cx="0" cy="0"/>
+        </a:xfrm>
+      </p:grpSpPr>
+      <p:sp>
+        <p:nvSpPr>
+          <p:cNvPr id="3" name="Content Placeholder 2">
+            <a:extLst>
+              <a:ext uri="{FF2B5EF4-FFF2-40B4-BE49-F238E27FC236}">
+                <a16:creationId xmlns:a16="http://schemas.microsoft.com/office/drawing/2014/main" id="{1AFD1C06-8BD6-42FA-920F-5D1A835CCBC4}"/>
+              </a:ext>
+            </a:extLst>
+          </p:cNvPr>
+          <p:cNvSpPr>
+            <a:spLocks noGrp="1"/>
+          </p:cNvSpPr>
+          <p:nvPr>
+            <p:ph idx="1"/>
+          </p:nvPr>
+        </p:nvSpPr>
+        <p:spPr>
+          <a:xfrm>
+            <a:off x="838200" y="361150"/>
+            <a:ext cx="11033632" cy="5815813"/>
+          </a:xfrm>
+        </p:spPr>
+        <p:txBody>
+          <a:bodyPr/>
+          <a:lstStyle/>
+          <a:p>
+            <a:r>
+              <a:rPr lang="en-US" dirty="0"/>
+              <a:t>Functions related to electrode</a:t>
+            </a:r>
+          </a:p>
+          <a:p>
+            <a:pPr lvl="1"/>
+            <a:r>
+              <a:rPr lang="en-US" dirty="0"/>
+              <a:t>device</a:t>
+            </a:r>
+          </a:p>
+          <a:p>
+            <a:pPr lvl="2"/>
+            <a:r>
+              <a:rPr lang="en-US" dirty="0" err="1"/>
+              <a:t>list_all_deviceName</a:t>
+            </a:r>
+            <a:r>
+              <a:rPr lang="en-US" dirty="0"/>
+              <a:t>()</a:t>
+            </a:r>
+          </a:p>
+        </p:txBody>
+      </p:sp>
+    </p:spTree>
+    <p:extLst>
+      <p:ext uri="{BB962C8B-B14F-4D97-AF65-F5344CB8AC3E}">
+        <p14:creationId xmlns:p14="http://schemas.microsoft.com/office/powerpoint/2010/main" val="1752827523"/>
+      </p:ext>
+    </p:extLst>
+  </p:cSld>
+  <p:clrMapOvr>
+    <a:masterClrMapping/>
+  </p:clrMapOvr>
+</p:sld>
+</file>
+
+<file path=ppt/slides/slide5.xml><?xml version="1.0" encoding="utf-8"?>
+<p:sld xmlns:a="http://schemas.openxmlformats.org/drawingml/2006/main" xmlns:r="http://schemas.openxmlformats.org/officeDocument/2006/relationships" xmlns:p="http://schemas.openxmlformats.org/presentationml/2006/main">
+  <p:cSld>
+    <p:spTree>
+      <p:nvGrpSpPr>
+        <p:cNvPr id="1" name=""/>
+        <p:cNvGrpSpPr/>
+        <p:nvPr/>
+      </p:nvGrpSpPr>
+      <p:grpSpPr>
+        <a:xfrm>
+          <a:off x="0" y="0"/>
+          <a:ext cx="0" cy="0"/>
+          <a:chOff x="0" y="0"/>
+          <a:chExt cx="0" cy="0"/>
+        </a:xfrm>
+      </p:grpSpPr>
+      <p:sp>
+        <p:nvSpPr>
+          <p:cNvPr id="2" name="Title 1">
+            <a:extLst>
+              <a:ext uri="{FF2B5EF4-FFF2-40B4-BE49-F238E27FC236}">
+                <a16:creationId xmlns:a16="http://schemas.microsoft.com/office/drawing/2014/main" id="{7697442D-4EC9-4C5A-AD28-5EF505EF793C}"/>
+              </a:ext>
+            </a:extLst>
+          </p:cNvPr>
+          <p:cNvSpPr>
+            <a:spLocks noGrp="1"/>
+          </p:cNvSpPr>
+          <p:nvPr>
+            <p:ph type="title"/>
+          </p:nvPr>
+        </p:nvSpPr>
+        <p:spPr/>
+        <p:txBody>
+          <a:bodyPr/>
+          <a:lstStyle/>
+          <a:p>
+            <a:r>
+              <a:rPr lang="en-US" dirty="0"/>
+              <a:t>Apr.22 1pm</a:t>
+            </a:r>
+          </a:p>
+        </p:txBody>
+      </p:sp>
+      <p:sp>
+        <p:nvSpPr>
+          <p:cNvPr id="3" name="Content Placeholder 2">
+            <a:extLst>
+              <a:ext uri="{FF2B5EF4-FFF2-40B4-BE49-F238E27FC236}">
+                <a16:creationId xmlns:a16="http://schemas.microsoft.com/office/drawing/2014/main" id="{D819FBD7-0C3F-4570-8359-D2E4562C95AD}"/>
+              </a:ext>
+            </a:extLst>
+          </p:cNvPr>
+          <p:cNvSpPr>
+            <a:spLocks noGrp="1"/>
+          </p:cNvSpPr>
+          <p:nvPr>
+            <p:ph idx="1"/>
+          </p:nvPr>
+        </p:nvSpPr>
+        <p:spPr/>
+        <p:txBody>
+          <a:bodyPr/>
+          <a:lstStyle/>
+          <a:p>
+            <a:r>
+              <a:rPr lang="en-US" dirty="0"/>
+              <a:t>Basic idea about how to create a NWB file</a:t>
+            </a:r>
+          </a:p>
+          <a:p>
+            <a:r>
+              <a:rPr lang="en-US" dirty="0"/>
+              <a:t>How to store video into NWB</a:t>
+            </a:r>
+          </a:p>
+          <a:p>
+            <a:r>
+              <a:rPr lang="en-US" dirty="0"/>
+              <a:t>Download the current code and learn a bit of the git commands</a:t>
+            </a:r>
+          </a:p>
+          <a:p>
+            <a:endParaRPr lang="en-US" dirty="0"/>
+          </a:p>
+        </p:txBody>
+      </p:sp>
+    </p:spTree>
+    <p:extLst>
+      <p:ext uri="{BB962C8B-B14F-4D97-AF65-F5344CB8AC3E}">
+        <p14:creationId xmlns:p14="http://schemas.microsoft.com/office/powerpoint/2010/main" val="119832519"/>
       </p:ext>
     </p:extLst>
   </p:cSld>

</xml_diff>

<commit_message>
added install work in slides
</commit_message>
<xml_diff>
--- a/NWBUnderstanding.pptx
+++ b/NWBUnderstanding.pptx
@@ -3950,6 +3950,23 @@
           <a:p>
             <a:r>
               <a:rPr lang="en-US" dirty="0"/>
+              <a:t>Install the NMRCNWB code based on the documentation</a:t>
+            </a:r>
+          </a:p>
+          <a:p>
+            <a:pPr lvl="1"/>
+            <a:r>
+              <a:rPr lang="en-US" dirty="0"/>
+              <a:t>Marked the places where </a:t>
+            </a:r>
+            <a:r>
+              <a:rPr lang="en-US"/>
+              <a:t>not clear</a:t>
+            </a:r>
+          </a:p>
+          <a:p>
+            <a:r>
+              <a:rPr lang="en-US" dirty="0"/>
               <a:t>Basic idea about how to create a NWB file</a:t>
             </a:r>
           </a:p>

</xml_diff>

<commit_message>
present nwb strucuture in sildes
</commit_message>
<xml_diff>
--- a/NWBUnderstanding.pptx
+++ b/NWBUnderstanding.pptx
@@ -4,6 +4,9 @@
   <p:sldMasterIdLst>
     <p:sldMasterId id="2147483677" r:id="rId1"/>
   </p:sldMasterIdLst>
+  <p:notesMasterIdLst>
+    <p:notesMasterId r:id="rId16"/>
+  </p:notesMasterIdLst>
   <p:sldIdLst>
     <p:sldId id="256" r:id="rId2"/>
     <p:sldId id="261" r:id="rId3"/>
@@ -11,7 +14,14 @@
     <p:sldId id="258" r:id="rId5"/>
     <p:sldId id="257" r:id="rId6"/>
     <p:sldId id="259" r:id="rId7"/>
-    <p:sldId id="260" r:id="rId8"/>
+    <p:sldId id="265" r:id="rId8"/>
+    <p:sldId id="270" r:id="rId9"/>
+    <p:sldId id="266" r:id="rId10"/>
+    <p:sldId id="267" r:id="rId11"/>
+    <p:sldId id="268" r:id="rId12"/>
+    <p:sldId id="269" r:id="rId13"/>
+    <p:sldId id="264" r:id="rId14"/>
+    <p:sldId id="260" r:id="rId15"/>
   </p:sldIdLst>
   <p:sldSz cx="12192000" cy="6858000"/>
   <p:notesSz cx="6858000" cy="9144000"/>
@@ -118,6 +128,500 @@
 </p:presentation>
 </file>
 
+<file path=ppt/commentAuthors.xml><?xml version="1.0" encoding="utf-8"?>
+<p:cmAuthorLst xmlns:a="http://schemas.openxmlformats.org/drawingml/2006/main" xmlns:r="http://schemas.openxmlformats.org/officeDocument/2006/relationships" xmlns:p="http://schemas.openxmlformats.org/presentationml/2006/main">
+  <p:cmAuthor id="1" name="Lingling Yang" initials="LY" lastIdx="1" clrIdx="0">
+    <p:extLst>
+      <p:ext uri="{19B8F6BF-5375-455C-9EA6-DF929625EA0E}">
+        <p15:presenceInfo xmlns:p15="http://schemas.microsoft.com/office/powerpoint/2012/main" userId="S::yang7003@umn.edu::a31ef6a6-1648-467f-af94-49bc7bd7c256" providerId="AD"/>
+      </p:ext>
+    </p:extLst>
+  </p:cmAuthor>
+</p:cmAuthorLst>
+</file>
+
+<file path=ppt/notesMasters/notesMaster1.xml><?xml version="1.0" encoding="utf-8"?>
+<p:notesMaster xmlns:a="http://schemas.openxmlformats.org/drawingml/2006/main" xmlns:r="http://schemas.openxmlformats.org/officeDocument/2006/relationships" xmlns:p="http://schemas.openxmlformats.org/presentationml/2006/main">
+  <p:cSld>
+    <p:bg>
+      <p:bgRef idx="1001">
+        <a:schemeClr val="bg1"/>
+      </p:bgRef>
+    </p:bg>
+    <p:spTree>
+      <p:nvGrpSpPr>
+        <p:cNvPr id="1" name=""/>
+        <p:cNvGrpSpPr/>
+        <p:nvPr/>
+      </p:nvGrpSpPr>
+      <p:grpSpPr>
+        <a:xfrm>
+          <a:off x="0" y="0"/>
+          <a:ext cx="0" cy="0"/>
+          <a:chOff x="0" y="0"/>
+          <a:chExt cx="0" cy="0"/>
+        </a:xfrm>
+      </p:grpSpPr>
+      <p:sp>
+        <p:nvSpPr>
+          <p:cNvPr id="2" name="Header Placeholder 1"/>
+          <p:cNvSpPr>
+            <a:spLocks noGrp="1"/>
+          </p:cNvSpPr>
+          <p:nvPr>
+            <p:ph type="hdr" sz="quarter"/>
+          </p:nvPr>
+        </p:nvSpPr>
+        <p:spPr>
+          <a:xfrm>
+            <a:off x="0" y="0"/>
+            <a:ext cx="2971800" cy="458788"/>
+          </a:xfrm>
+          <a:prstGeom prst="rect">
+            <a:avLst/>
+          </a:prstGeom>
+        </p:spPr>
+        <p:txBody>
+          <a:bodyPr vert="horz" lIns="91440" tIns="45720" rIns="91440" bIns="45720" rtlCol="0"/>
+          <a:lstStyle>
+            <a:lvl1pPr algn="l">
+              <a:defRPr sz="1200"/>
+            </a:lvl1pPr>
+          </a:lstStyle>
+          <a:p>
+            <a:endParaRPr lang="en-US"/>
+          </a:p>
+        </p:txBody>
+      </p:sp>
+      <p:sp>
+        <p:nvSpPr>
+          <p:cNvPr id="3" name="Date Placeholder 2"/>
+          <p:cNvSpPr>
+            <a:spLocks noGrp="1"/>
+          </p:cNvSpPr>
+          <p:nvPr>
+            <p:ph type="dt" idx="1"/>
+          </p:nvPr>
+        </p:nvSpPr>
+        <p:spPr>
+          <a:xfrm>
+            <a:off x="3884613" y="0"/>
+            <a:ext cx="2971800" cy="458788"/>
+          </a:xfrm>
+          <a:prstGeom prst="rect">
+            <a:avLst/>
+          </a:prstGeom>
+        </p:spPr>
+        <p:txBody>
+          <a:bodyPr vert="horz" lIns="91440" tIns="45720" rIns="91440" bIns="45720" rtlCol="0"/>
+          <a:lstStyle>
+            <a:lvl1pPr algn="r">
+              <a:defRPr sz="1200"/>
+            </a:lvl1pPr>
+          </a:lstStyle>
+          <a:p>
+            <a:fld id="{0BBC82C6-28DA-4EB2-911C-4302BD97042D}" type="datetimeFigureOut">
+              <a:rPr lang="en-US" smtClean="0"/>
+              <a:t>4/28/2022</a:t>
+            </a:fld>
+            <a:endParaRPr lang="en-US"/>
+          </a:p>
+        </p:txBody>
+      </p:sp>
+      <p:sp>
+        <p:nvSpPr>
+          <p:cNvPr id="4" name="Slide Image Placeholder 3"/>
+          <p:cNvSpPr>
+            <a:spLocks noGrp="1" noRot="1" noChangeAspect="1"/>
+          </p:cNvSpPr>
+          <p:nvPr>
+            <p:ph type="sldImg" idx="2"/>
+          </p:nvPr>
+        </p:nvSpPr>
+        <p:spPr>
+          <a:xfrm>
+            <a:off x="685800" y="1143000"/>
+            <a:ext cx="5486400" cy="3086100"/>
+          </a:xfrm>
+          <a:prstGeom prst="rect">
+            <a:avLst/>
+          </a:prstGeom>
+          <a:noFill/>
+          <a:ln w="12700">
+            <a:solidFill>
+              <a:prstClr val="black"/>
+            </a:solidFill>
+          </a:ln>
+        </p:spPr>
+        <p:txBody>
+          <a:bodyPr vert="horz" lIns="91440" tIns="45720" rIns="91440" bIns="45720" rtlCol="0" anchor="ctr"/>
+          <a:lstStyle/>
+          <a:p>
+            <a:endParaRPr lang="en-US"/>
+          </a:p>
+        </p:txBody>
+      </p:sp>
+      <p:sp>
+        <p:nvSpPr>
+          <p:cNvPr id="5" name="Notes Placeholder 4"/>
+          <p:cNvSpPr>
+            <a:spLocks noGrp="1"/>
+          </p:cNvSpPr>
+          <p:nvPr>
+            <p:ph type="body" sz="quarter" idx="3"/>
+          </p:nvPr>
+        </p:nvSpPr>
+        <p:spPr>
+          <a:xfrm>
+            <a:off x="685800" y="4400550"/>
+            <a:ext cx="5486400" cy="3600450"/>
+          </a:xfrm>
+          <a:prstGeom prst="rect">
+            <a:avLst/>
+          </a:prstGeom>
+        </p:spPr>
+        <p:txBody>
+          <a:bodyPr vert="horz" lIns="91440" tIns="45720" rIns="91440" bIns="45720" rtlCol="0"/>
+          <a:lstStyle/>
+          <a:p>
+            <a:pPr lvl="0"/>
+            <a:r>
+              <a:rPr lang="en-US"/>
+              <a:t>Click to edit Master text styles</a:t>
+            </a:r>
+          </a:p>
+          <a:p>
+            <a:pPr lvl="1"/>
+            <a:r>
+              <a:rPr lang="en-US"/>
+              <a:t>Second level</a:t>
+            </a:r>
+          </a:p>
+          <a:p>
+            <a:pPr lvl="2"/>
+            <a:r>
+              <a:rPr lang="en-US"/>
+              <a:t>Third level</a:t>
+            </a:r>
+          </a:p>
+          <a:p>
+            <a:pPr lvl="3"/>
+            <a:r>
+              <a:rPr lang="en-US"/>
+              <a:t>Fourth level</a:t>
+            </a:r>
+          </a:p>
+          <a:p>
+            <a:pPr lvl="4"/>
+            <a:r>
+              <a:rPr lang="en-US"/>
+              <a:t>Fifth level</a:t>
+            </a:r>
+          </a:p>
+        </p:txBody>
+      </p:sp>
+      <p:sp>
+        <p:nvSpPr>
+          <p:cNvPr id="6" name="Footer Placeholder 5"/>
+          <p:cNvSpPr>
+            <a:spLocks noGrp="1"/>
+          </p:cNvSpPr>
+          <p:nvPr>
+            <p:ph type="ftr" sz="quarter" idx="4"/>
+          </p:nvPr>
+        </p:nvSpPr>
+        <p:spPr>
+          <a:xfrm>
+            <a:off x="0" y="8685213"/>
+            <a:ext cx="2971800" cy="458787"/>
+          </a:xfrm>
+          <a:prstGeom prst="rect">
+            <a:avLst/>
+          </a:prstGeom>
+        </p:spPr>
+        <p:txBody>
+          <a:bodyPr vert="horz" lIns="91440" tIns="45720" rIns="91440" bIns="45720" rtlCol="0" anchor="b"/>
+          <a:lstStyle>
+            <a:lvl1pPr algn="l">
+              <a:defRPr sz="1200"/>
+            </a:lvl1pPr>
+          </a:lstStyle>
+          <a:p>
+            <a:endParaRPr lang="en-US"/>
+          </a:p>
+        </p:txBody>
+      </p:sp>
+      <p:sp>
+        <p:nvSpPr>
+          <p:cNvPr id="7" name="Slide Number Placeholder 6"/>
+          <p:cNvSpPr>
+            <a:spLocks noGrp="1"/>
+          </p:cNvSpPr>
+          <p:nvPr>
+            <p:ph type="sldNum" sz="quarter" idx="5"/>
+          </p:nvPr>
+        </p:nvSpPr>
+        <p:spPr>
+          <a:xfrm>
+            <a:off x="3884613" y="8685213"/>
+            <a:ext cx="2971800" cy="458787"/>
+          </a:xfrm>
+          <a:prstGeom prst="rect">
+            <a:avLst/>
+          </a:prstGeom>
+        </p:spPr>
+        <p:txBody>
+          <a:bodyPr vert="horz" lIns="91440" tIns="45720" rIns="91440" bIns="45720" rtlCol="0" anchor="b"/>
+          <a:lstStyle>
+            <a:lvl1pPr algn="r">
+              <a:defRPr sz="1200"/>
+            </a:lvl1pPr>
+          </a:lstStyle>
+          <a:p>
+            <a:fld id="{7FE6DA44-B752-445D-9EA6-65C8A9719224}" type="slidenum">
+              <a:rPr lang="en-US" smtClean="0"/>
+              <a:t>‹#›</a:t>
+            </a:fld>
+            <a:endParaRPr lang="en-US"/>
+          </a:p>
+        </p:txBody>
+      </p:sp>
+    </p:spTree>
+    <p:extLst>
+      <p:ext uri="{BB962C8B-B14F-4D97-AF65-F5344CB8AC3E}">
+        <p14:creationId xmlns:p14="http://schemas.microsoft.com/office/powerpoint/2010/main" val="1808332111"/>
+      </p:ext>
+    </p:extLst>
+  </p:cSld>
+  <p:clrMap bg1="lt1" tx1="dk1" bg2="lt2" tx2="dk2" accent1="accent1" accent2="accent2" accent3="accent3" accent4="accent4" accent5="accent5" accent6="accent6" hlink="hlink" folHlink="folHlink"/>
+  <p:notesStyle>
+    <a:lvl1pPr marL="0" algn="l" defTabSz="914400" rtl="0" eaLnBrk="1" latinLnBrk="0" hangingPunct="1">
+      <a:defRPr sz="1200" kern="1200">
+        <a:solidFill>
+          <a:schemeClr val="tx1"/>
+        </a:solidFill>
+        <a:latin typeface="+mn-lt"/>
+        <a:ea typeface="+mn-ea"/>
+        <a:cs typeface="+mn-cs"/>
+      </a:defRPr>
+    </a:lvl1pPr>
+    <a:lvl2pPr marL="457200" algn="l" defTabSz="914400" rtl="0" eaLnBrk="1" latinLnBrk="0" hangingPunct="1">
+      <a:defRPr sz="1200" kern="1200">
+        <a:solidFill>
+          <a:schemeClr val="tx1"/>
+        </a:solidFill>
+        <a:latin typeface="+mn-lt"/>
+        <a:ea typeface="+mn-ea"/>
+        <a:cs typeface="+mn-cs"/>
+      </a:defRPr>
+    </a:lvl2pPr>
+    <a:lvl3pPr marL="914400" algn="l" defTabSz="914400" rtl="0" eaLnBrk="1" latinLnBrk="0" hangingPunct="1">
+      <a:defRPr sz="1200" kern="1200">
+        <a:solidFill>
+          <a:schemeClr val="tx1"/>
+        </a:solidFill>
+        <a:latin typeface="+mn-lt"/>
+        <a:ea typeface="+mn-ea"/>
+        <a:cs typeface="+mn-cs"/>
+      </a:defRPr>
+    </a:lvl3pPr>
+    <a:lvl4pPr marL="1371600" algn="l" defTabSz="914400" rtl="0" eaLnBrk="1" latinLnBrk="0" hangingPunct="1">
+      <a:defRPr sz="1200" kern="1200">
+        <a:solidFill>
+          <a:schemeClr val="tx1"/>
+        </a:solidFill>
+        <a:latin typeface="+mn-lt"/>
+        <a:ea typeface="+mn-ea"/>
+        <a:cs typeface="+mn-cs"/>
+      </a:defRPr>
+    </a:lvl4pPr>
+    <a:lvl5pPr marL="1828800" algn="l" defTabSz="914400" rtl="0" eaLnBrk="1" latinLnBrk="0" hangingPunct="1">
+      <a:defRPr sz="1200" kern="1200">
+        <a:solidFill>
+          <a:schemeClr val="tx1"/>
+        </a:solidFill>
+        <a:latin typeface="+mn-lt"/>
+        <a:ea typeface="+mn-ea"/>
+        <a:cs typeface="+mn-cs"/>
+      </a:defRPr>
+    </a:lvl5pPr>
+    <a:lvl6pPr marL="2286000" algn="l" defTabSz="914400" rtl="0" eaLnBrk="1" latinLnBrk="0" hangingPunct="1">
+      <a:defRPr sz="1200" kern="1200">
+        <a:solidFill>
+          <a:schemeClr val="tx1"/>
+        </a:solidFill>
+        <a:latin typeface="+mn-lt"/>
+        <a:ea typeface="+mn-ea"/>
+        <a:cs typeface="+mn-cs"/>
+      </a:defRPr>
+    </a:lvl6pPr>
+    <a:lvl7pPr marL="2743200" algn="l" defTabSz="914400" rtl="0" eaLnBrk="1" latinLnBrk="0" hangingPunct="1">
+      <a:defRPr sz="1200" kern="1200">
+        <a:solidFill>
+          <a:schemeClr val="tx1"/>
+        </a:solidFill>
+        <a:latin typeface="+mn-lt"/>
+        <a:ea typeface="+mn-ea"/>
+        <a:cs typeface="+mn-cs"/>
+      </a:defRPr>
+    </a:lvl7pPr>
+    <a:lvl8pPr marL="3200400" algn="l" defTabSz="914400" rtl="0" eaLnBrk="1" latinLnBrk="0" hangingPunct="1">
+      <a:defRPr sz="1200" kern="1200">
+        <a:solidFill>
+          <a:schemeClr val="tx1"/>
+        </a:solidFill>
+        <a:latin typeface="+mn-lt"/>
+        <a:ea typeface="+mn-ea"/>
+        <a:cs typeface="+mn-cs"/>
+      </a:defRPr>
+    </a:lvl8pPr>
+    <a:lvl9pPr marL="3657600" algn="l" defTabSz="914400" rtl="0" eaLnBrk="1" latinLnBrk="0" hangingPunct="1">
+      <a:defRPr sz="1200" kern="1200">
+        <a:solidFill>
+          <a:schemeClr val="tx1"/>
+        </a:solidFill>
+        <a:latin typeface="+mn-lt"/>
+        <a:ea typeface="+mn-ea"/>
+        <a:cs typeface="+mn-cs"/>
+      </a:defRPr>
+    </a:lvl9pPr>
+  </p:notesStyle>
+</p:notesMaster>
+</file>
+
+<file path=ppt/notesSlides/notesSlide1.xml><?xml version="1.0" encoding="utf-8"?>
+<p:notes xmlns:a="http://schemas.openxmlformats.org/drawingml/2006/main" xmlns:r="http://schemas.openxmlformats.org/officeDocument/2006/relationships" xmlns:p="http://schemas.openxmlformats.org/presentationml/2006/main">
+  <p:cSld>
+    <p:spTree>
+      <p:nvGrpSpPr>
+        <p:cNvPr id="1" name=""/>
+        <p:cNvGrpSpPr/>
+        <p:nvPr/>
+      </p:nvGrpSpPr>
+      <p:grpSpPr>
+        <a:xfrm>
+          <a:off x="0" y="0"/>
+          <a:ext cx="0" cy="0"/>
+          <a:chOff x="0" y="0"/>
+          <a:chExt cx="0" cy="0"/>
+        </a:xfrm>
+      </p:grpSpPr>
+      <p:sp>
+        <p:nvSpPr>
+          <p:cNvPr id="2" name="Slide Image Placeholder 1"/>
+          <p:cNvSpPr>
+            <a:spLocks noGrp="1" noRot="1" noChangeAspect="1"/>
+          </p:cNvSpPr>
+          <p:nvPr>
+            <p:ph type="sldImg"/>
+          </p:nvPr>
+        </p:nvSpPr>
+        <p:spPr/>
+      </p:sp>
+      <p:sp>
+        <p:nvSpPr>
+          <p:cNvPr id="3" name="Notes Placeholder 2"/>
+          <p:cNvSpPr>
+            <a:spLocks noGrp="1"/>
+          </p:cNvSpPr>
+          <p:nvPr>
+            <p:ph type="body" idx="1"/>
+          </p:nvPr>
+        </p:nvSpPr>
+        <p:spPr/>
+        <p:txBody>
+          <a:bodyPr/>
+          <a:lstStyle/>
+          <a:p>
+            <a:r>
+              <a:rPr lang="en-US" dirty="0">
+                <a:effectLst/>
+                <a:latin typeface="Helvetica" panose="020B0604020202020204" pitchFamily="34" charset="0"/>
+              </a:rPr>
+              <a:t>The date is stored in UTC with local </a:t>
+            </a:r>
+            <a:r>
+              <a:rPr lang="en-US" dirty="0" err="1">
+                <a:effectLst/>
+                <a:latin typeface="Helvetica" panose="020B0604020202020204" pitchFamily="34" charset="0"/>
+              </a:rPr>
+              <a:t>timezone</a:t>
+            </a:r>
+            <a:r>
+              <a:rPr lang="en-US" dirty="0">
+                <a:effectLst/>
+                <a:latin typeface="Helvetica" panose="020B0604020202020204" pitchFamily="34" charset="0"/>
+              </a:rPr>
+              <a:t> offset as ISO 8601 extended formatted strings: 2018-09-28T14:43:54.123+02:00. Dates stored in UTC end in "Z" with no </a:t>
+            </a:r>
+            <a:r>
+              <a:rPr lang="en-US" dirty="0" err="1">
+                <a:effectLst/>
+                <a:latin typeface="Helvetica" panose="020B0604020202020204" pitchFamily="34" charset="0"/>
+              </a:rPr>
+              <a:t>timezone</a:t>
+            </a:r>
+            <a:r>
+              <a:rPr lang="en-US" dirty="0">
+                <a:effectLst/>
+                <a:latin typeface="Helvetica" panose="020B0604020202020204" pitchFamily="34" charset="0"/>
+              </a:rPr>
+              <a:t> offset. Date accuracy is up to milliseconds. The file can be created after the experiment was run, so this may differ from the experiment start time. Each modification to the </a:t>
+            </a:r>
+            <a:r>
+              <a:rPr lang="en-US" dirty="0" err="1">
+                <a:effectLst/>
+                <a:latin typeface="Helvetica" panose="020B0604020202020204" pitchFamily="34" charset="0"/>
+              </a:rPr>
+              <a:t>nwb</a:t>
+            </a:r>
+            <a:r>
+              <a:rPr lang="en-US" dirty="0">
+                <a:effectLst/>
+                <a:latin typeface="Helvetica" panose="020B0604020202020204" pitchFamily="34" charset="0"/>
+              </a:rPr>
+              <a:t> file adds a new entry to the array. </a:t>
+            </a:r>
+            <a:endParaRPr lang="en-US" dirty="0"/>
+          </a:p>
+        </p:txBody>
+      </p:sp>
+      <p:sp>
+        <p:nvSpPr>
+          <p:cNvPr id="4" name="Slide Number Placeholder 3"/>
+          <p:cNvSpPr>
+            <a:spLocks noGrp="1"/>
+          </p:cNvSpPr>
+          <p:nvPr>
+            <p:ph type="sldNum" sz="quarter" idx="5"/>
+          </p:nvPr>
+        </p:nvSpPr>
+        <p:spPr/>
+        <p:txBody>
+          <a:bodyPr/>
+          <a:lstStyle/>
+          <a:p>
+            <a:fld id="{7FE6DA44-B752-445D-9EA6-65C8A9719224}" type="slidenum">
+              <a:rPr lang="en-US" smtClean="0"/>
+              <a:t>7</a:t>
+            </a:fld>
+            <a:endParaRPr lang="en-US"/>
+          </a:p>
+        </p:txBody>
+      </p:sp>
+    </p:spTree>
+    <p:extLst>
+      <p:ext uri="{BB962C8B-B14F-4D97-AF65-F5344CB8AC3E}">
+        <p14:creationId xmlns:p14="http://schemas.microsoft.com/office/powerpoint/2010/main" val="3717437781"/>
+      </p:ext>
+    </p:extLst>
+  </p:cSld>
+  <p:clrMapOvr>
+    <a:masterClrMapping/>
+  </p:clrMapOvr>
+</p:notes>
+</file>
+
 <file path=ppt/slideLayouts/slideLayout1.xml><?xml version="1.0" encoding="utf-8"?>
 <p:sldLayout xmlns:a="http://schemas.openxmlformats.org/drawingml/2006/main" xmlns:r="http://schemas.openxmlformats.org/officeDocument/2006/relationships" xmlns:p="http://schemas.openxmlformats.org/presentationml/2006/main" type="title" preserve="1">
   <p:cSld name="Title Slide">
@@ -265,7 +769,7 @@
           <a:p>
             <a:fld id="{22672356-9B25-4037-AA2B-D3C17254FCC8}" type="datetimeFigureOut">
               <a:rPr lang="en-US" smtClean="0"/>
-              <a:t>4/25/2022</a:t>
+              <a:t>4/27/2022</a:t>
             </a:fld>
             <a:endParaRPr lang="en-US"/>
           </a:p>
@@ -463,7 +967,7 @@
           <a:p>
             <a:fld id="{22672356-9B25-4037-AA2B-D3C17254FCC8}" type="datetimeFigureOut">
               <a:rPr lang="en-US" smtClean="0"/>
-              <a:t>4/25/2022</a:t>
+              <a:t>4/27/2022</a:t>
             </a:fld>
             <a:endParaRPr lang="en-US"/>
           </a:p>
@@ -671,7 +1175,7 @@
           <a:p>
             <a:fld id="{22672356-9B25-4037-AA2B-D3C17254FCC8}" type="datetimeFigureOut">
               <a:rPr lang="en-US" smtClean="0"/>
-              <a:t>4/25/2022</a:t>
+              <a:t>4/27/2022</a:t>
             </a:fld>
             <a:endParaRPr lang="en-US"/>
           </a:p>
@@ -869,7 +1373,7 @@
           <a:p>
             <a:fld id="{22672356-9B25-4037-AA2B-D3C17254FCC8}" type="datetimeFigureOut">
               <a:rPr lang="en-US" smtClean="0"/>
-              <a:t>4/25/2022</a:t>
+              <a:t>4/27/2022</a:t>
             </a:fld>
             <a:endParaRPr lang="en-US"/>
           </a:p>
@@ -1144,7 +1648,7 @@
           <a:p>
             <a:fld id="{22672356-9B25-4037-AA2B-D3C17254FCC8}" type="datetimeFigureOut">
               <a:rPr lang="en-US" smtClean="0"/>
-              <a:t>4/25/2022</a:t>
+              <a:t>4/27/2022</a:t>
             </a:fld>
             <a:endParaRPr lang="en-US"/>
           </a:p>
@@ -1409,7 +1913,7 @@
           <a:p>
             <a:fld id="{22672356-9B25-4037-AA2B-D3C17254FCC8}" type="datetimeFigureOut">
               <a:rPr lang="en-US" smtClean="0"/>
-              <a:t>4/25/2022</a:t>
+              <a:t>4/27/2022</a:t>
             </a:fld>
             <a:endParaRPr lang="en-US"/>
           </a:p>
@@ -1821,7 +2325,7 @@
           <a:p>
             <a:fld id="{22672356-9B25-4037-AA2B-D3C17254FCC8}" type="datetimeFigureOut">
               <a:rPr lang="en-US" smtClean="0"/>
-              <a:t>4/25/2022</a:t>
+              <a:t>4/27/2022</a:t>
             </a:fld>
             <a:endParaRPr lang="en-US"/>
           </a:p>
@@ -1962,7 +2466,7 @@
           <a:p>
             <a:fld id="{22672356-9B25-4037-AA2B-D3C17254FCC8}" type="datetimeFigureOut">
               <a:rPr lang="en-US" smtClean="0"/>
-              <a:t>4/25/2022</a:t>
+              <a:t>4/27/2022</a:t>
             </a:fld>
             <a:endParaRPr lang="en-US"/>
           </a:p>
@@ -2075,7 +2579,7 @@
           <a:p>
             <a:fld id="{22672356-9B25-4037-AA2B-D3C17254FCC8}" type="datetimeFigureOut">
               <a:rPr lang="en-US" smtClean="0"/>
-              <a:t>4/25/2022</a:t>
+              <a:t>4/27/2022</a:t>
             </a:fld>
             <a:endParaRPr lang="en-US"/>
           </a:p>
@@ -2386,7 +2890,7 @@
           <a:p>
             <a:fld id="{22672356-9B25-4037-AA2B-D3C17254FCC8}" type="datetimeFigureOut">
               <a:rPr lang="en-US" smtClean="0"/>
-              <a:t>4/25/2022</a:t>
+              <a:t>4/27/2022</a:t>
             </a:fld>
             <a:endParaRPr lang="en-US"/>
           </a:p>
@@ -2674,7 +3178,7 @@
           <a:p>
             <a:fld id="{22672356-9B25-4037-AA2B-D3C17254FCC8}" type="datetimeFigureOut">
               <a:rPr lang="en-US" smtClean="0"/>
-              <a:t>4/25/2022</a:t>
+              <a:t>4/27/2022</a:t>
             </a:fld>
             <a:endParaRPr lang="en-US"/>
           </a:p>
@@ -2915,7 +3419,7 @@
           <a:p>
             <a:fld id="{22672356-9B25-4037-AA2B-D3C17254FCC8}" type="datetimeFigureOut">
               <a:rPr lang="en-US" smtClean="0"/>
-              <a:t>4/25/2022</a:t>
+              <a:t>4/27/2022</a:t>
             </a:fld>
             <a:endParaRPr lang="en-US"/>
           </a:p>
@@ -3395,6 +3899,1032 @@
 </p:sld>
 </file>
 
+<file path=ppt/slides/slide10.xml><?xml version="1.0" encoding="utf-8"?>
+<p:sld xmlns:a="http://schemas.openxmlformats.org/drawingml/2006/main" xmlns:r="http://schemas.openxmlformats.org/officeDocument/2006/relationships" xmlns:p="http://schemas.openxmlformats.org/presentationml/2006/main">
+  <p:cSld>
+    <p:spTree>
+      <p:nvGrpSpPr>
+        <p:cNvPr id="1" name=""/>
+        <p:cNvGrpSpPr/>
+        <p:nvPr/>
+      </p:nvGrpSpPr>
+      <p:grpSpPr>
+        <a:xfrm>
+          <a:off x="0" y="0"/>
+          <a:ext cx="0" cy="0"/>
+          <a:chOff x="0" y="0"/>
+          <a:chExt cx="0" cy="0"/>
+        </a:xfrm>
+      </p:grpSpPr>
+      <p:pic>
+        <p:nvPicPr>
+          <p:cNvPr id="5" name="Picture 4" descr="Text, letter&#10;&#10;Description automatically generated">
+            <a:extLst>
+              <a:ext uri="{FF2B5EF4-FFF2-40B4-BE49-F238E27FC236}">
+                <a16:creationId xmlns:a16="http://schemas.microsoft.com/office/drawing/2014/main" id="{393738C9-890D-4C1B-AF46-D5EE3EC0A995}"/>
+              </a:ext>
+            </a:extLst>
+          </p:cNvPr>
+          <p:cNvPicPr>
+            <a:picLocks noChangeAspect="1"/>
+          </p:cNvPicPr>
+          <p:nvPr/>
+        </p:nvPicPr>
+        <p:blipFill>
+          <a:blip r:embed="rId2">
+            <a:extLst>
+              <a:ext uri="{28A0092B-C50C-407E-A947-70E740481C1C}">
+                <a14:useLocalDpi xmlns:a14="http://schemas.microsoft.com/office/drawing/2010/main" val="0"/>
+              </a:ext>
+            </a:extLst>
+          </a:blip>
+          <a:stretch>
+            <a:fillRect/>
+          </a:stretch>
+        </p:blipFill>
+        <p:spPr>
+          <a:xfrm>
+            <a:off x="0" y="3018570"/>
+            <a:ext cx="3886742" cy="1419423"/>
+          </a:xfrm>
+          <a:prstGeom prst="rect">
+            <a:avLst/>
+          </a:prstGeom>
+        </p:spPr>
+      </p:pic>
+      <p:grpSp>
+        <p:nvGrpSpPr>
+          <p:cNvPr id="6" name="Group 5">
+            <a:extLst>
+              <a:ext uri="{FF2B5EF4-FFF2-40B4-BE49-F238E27FC236}">
+                <a16:creationId xmlns:a16="http://schemas.microsoft.com/office/drawing/2014/main" id="{DC322046-AF5F-44A6-BA81-B96758EA69A0}"/>
+              </a:ext>
+            </a:extLst>
+          </p:cNvPr>
+          <p:cNvGrpSpPr/>
+          <p:nvPr/>
+        </p:nvGrpSpPr>
+        <p:grpSpPr>
+          <a:xfrm>
+            <a:off x="0" y="999467"/>
+            <a:ext cx="7363853" cy="1876687"/>
+            <a:chOff x="96797" y="4476816"/>
+            <a:chExt cx="7363853" cy="1876687"/>
+          </a:xfrm>
+        </p:grpSpPr>
+        <p:pic>
+          <p:nvPicPr>
+            <p:cNvPr id="7" name="Picture 6" descr="Text, letter&#10;&#10;Description automatically generated">
+              <a:extLst>
+                <a:ext uri="{FF2B5EF4-FFF2-40B4-BE49-F238E27FC236}">
+                  <a16:creationId xmlns:a16="http://schemas.microsoft.com/office/drawing/2014/main" id="{56B99A1D-78DE-41A5-A14E-E2526D81F696}"/>
+                </a:ext>
+              </a:extLst>
+            </p:cNvPr>
+            <p:cNvPicPr>
+              <a:picLocks noChangeAspect="1"/>
+            </p:cNvPicPr>
+            <p:nvPr/>
+          </p:nvPicPr>
+          <p:blipFill>
+            <a:blip r:embed="rId3">
+              <a:extLst>
+                <a:ext uri="{28A0092B-C50C-407E-A947-70E740481C1C}">
+                  <a14:useLocalDpi xmlns:a14="http://schemas.microsoft.com/office/drawing/2010/main" val="0"/>
+                </a:ext>
+              </a:extLst>
+            </a:blip>
+            <a:stretch>
+              <a:fillRect/>
+            </a:stretch>
+          </p:blipFill>
+          <p:spPr>
+            <a:xfrm>
+              <a:off x="96797" y="4476816"/>
+              <a:ext cx="7363853" cy="1876687"/>
+            </a:xfrm>
+            <a:prstGeom prst="rect">
+              <a:avLst/>
+            </a:prstGeom>
+          </p:spPr>
+        </p:pic>
+        <p:sp>
+          <p:nvSpPr>
+            <p:cNvPr id="8" name="Oval 7">
+              <a:extLst>
+                <a:ext uri="{FF2B5EF4-FFF2-40B4-BE49-F238E27FC236}">
+                  <a16:creationId xmlns:a16="http://schemas.microsoft.com/office/drawing/2014/main" id="{09A36DFE-41F5-46D8-82F7-C58D72D08C3C}"/>
+                </a:ext>
+              </a:extLst>
+            </p:cNvPr>
+            <p:cNvSpPr/>
+            <p:nvPr/>
+          </p:nvSpPr>
+          <p:spPr>
+            <a:xfrm>
+              <a:off x="228177" y="5616856"/>
+              <a:ext cx="1368180" cy="687223"/>
+            </a:xfrm>
+            <a:prstGeom prst="ellipse">
+              <a:avLst/>
+            </a:prstGeom>
+            <a:noFill/>
+            <a:ln>
+              <a:solidFill>
+                <a:srgbClr val="FF0000"/>
+              </a:solidFill>
+            </a:ln>
+          </p:spPr>
+          <p:style>
+            <a:lnRef idx="2">
+              <a:schemeClr val="accent2"/>
+            </a:lnRef>
+            <a:fillRef idx="1">
+              <a:schemeClr val="lt1"/>
+            </a:fillRef>
+            <a:effectRef idx="0">
+              <a:schemeClr val="accent2"/>
+            </a:effectRef>
+            <a:fontRef idx="minor">
+              <a:schemeClr val="dk1"/>
+            </a:fontRef>
+          </p:style>
+          <p:txBody>
+            <a:bodyPr rtlCol="0" anchor="ctr"/>
+            <a:lstStyle/>
+            <a:p>
+              <a:pPr algn="ctr"/>
+              <a:endParaRPr lang="en-US"/>
+            </a:p>
+          </p:txBody>
+        </p:sp>
+      </p:grpSp>
+      <p:pic>
+        <p:nvPicPr>
+          <p:cNvPr id="10" name="Picture 9" descr="Table&#10;&#10;Description automatically generated">
+            <a:extLst>
+              <a:ext uri="{FF2B5EF4-FFF2-40B4-BE49-F238E27FC236}">
+                <a16:creationId xmlns:a16="http://schemas.microsoft.com/office/drawing/2014/main" id="{90F9CFC9-330A-4E77-9EE5-8974EC423768}"/>
+              </a:ext>
+            </a:extLst>
+          </p:cNvPr>
+          <p:cNvPicPr>
+            <a:picLocks noChangeAspect="1"/>
+          </p:cNvPicPr>
+          <p:nvPr/>
+        </p:nvPicPr>
+        <p:blipFill>
+          <a:blip r:embed="rId4">
+            <a:extLst>
+              <a:ext uri="{28A0092B-C50C-407E-A947-70E740481C1C}">
+                <a14:useLocalDpi xmlns:a14="http://schemas.microsoft.com/office/drawing/2010/main" val="0"/>
+              </a:ext>
+            </a:extLst>
+          </a:blip>
+          <a:stretch>
+            <a:fillRect/>
+          </a:stretch>
+        </p:blipFill>
+        <p:spPr>
+          <a:xfrm>
+            <a:off x="7585060" y="1050825"/>
+            <a:ext cx="4505954" cy="2581635"/>
+          </a:xfrm>
+          <a:prstGeom prst="rect">
+            <a:avLst/>
+          </a:prstGeom>
+        </p:spPr>
+      </p:pic>
+    </p:spTree>
+    <p:extLst>
+      <p:ext uri="{BB962C8B-B14F-4D97-AF65-F5344CB8AC3E}">
+        <p14:creationId xmlns:p14="http://schemas.microsoft.com/office/powerpoint/2010/main" val="1526994772"/>
+      </p:ext>
+    </p:extLst>
+  </p:cSld>
+  <p:clrMapOvr>
+    <a:masterClrMapping/>
+  </p:clrMapOvr>
+</p:sld>
+</file>
+
+<file path=ppt/slides/slide11.xml><?xml version="1.0" encoding="utf-8"?>
+<p:sld xmlns:a="http://schemas.openxmlformats.org/drawingml/2006/main" xmlns:r="http://schemas.openxmlformats.org/officeDocument/2006/relationships" xmlns:p="http://schemas.openxmlformats.org/presentationml/2006/main">
+  <p:cSld>
+    <p:spTree>
+      <p:nvGrpSpPr>
+        <p:cNvPr id="1" name=""/>
+        <p:cNvGrpSpPr/>
+        <p:nvPr/>
+      </p:nvGrpSpPr>
+      <p:grpSpPr>
+        <a:xfrm>
+          <a:off x="0" y="0"/>
+          <a:ext cx="0" cy="0"/>
+          <a:chOff x="0" y="0"/>
+          <a:chExt cx="0" cy="0"/>
+        </a:xfrm>
+      </p:grpSpPr>
+      <p:pic>
+        <p:nvPicPr>
+          <p:cNvPr id="5" name="Picture 4" descr="Table&#10;&#10;Description automatically generated">
+            <a:extLst>
+              <a:ext uri="{FF2B5EF4-FFF2-40B4-BE49-F238E27FC236}">
+                <a16:creationId xmlns:a16="http://schemas.microsoft.com/office/drawing/2014/main" id="{AB52A940-51AB-4293-9ADA-E1D10D0FACB1}"/>
+              </a:ext>
+            </a:extLst>
+          </p:cNvPr>
+          <p:cNvPicPr>
+            <a:picLocks noChangeAspect="1"/>
+          </p:cNvPicPr>
+          <p:nvPr/>
+        </p:nvPicPr>
+        <p:blipFill>
+          <a:blip r:embed="rId2">
+            <a:extLst>
+              <a:ext uri="{28A0092B-C50C-407E-A947-70E740481C1C}">
+                <a14:useLocalDpi xmlns:a14="http://schemas.microsoft.com/office/drawing/2010/main" val="0"/>
+              </a:ext>
+            </a:extLst>
+          </a:blip>
+          <a:stretch>
+            <a:fillRect/>
+          </a:stretch>
+        </p:blipFill>
+        <p:spPr>
+          <a:xfrm>
+            <a:off x="739492" y="0"/>
+            <a:ext cx="9535856" cy="6592220"/>
+          </a:xfrm>
+          <a:prstGeom prst="rect">
+            <a:avLst/>
+          </a:prstGeom>
+        </p:spPr>
+      </p:pic>
+    </p:spTree>
+    <p:extLst>
+      <p:ext uri="{BB962C8B-B14F-4D97-AF65-F5344CB8AC3E}">
+        <p14:creationId xmlns:p14="http://schemas.microsoft.com/office/powerpoint/2010/main" val="3339191435"/>
+      </p:ext>
+    </p:extLst>
+  </p:cSld>
+  <p:clrMapOvr>
+    <a:masterClrMapping/>
+  </p:clrMapOvr>
+</p:sld>
+</file>
+
+<file path=ppt/slides/slide12.xml><?xml version="1.0" encoding="utf-8"?>
+<p:sld xmlns:a="http://schemas.openxmlformats.org/drawingml/2006/main" xmlns:r="http://schemas.openxmlformats.org/officeDocument/2006/relationships" xmlns:p="http://schemas.openxmlformats.org/presentationml/2006/main">
+  <p:cSld>
+    <p:spTree>
+      <p:nvGrpSpPr>
+        <p:cNvPr id="1" name=""/>
+        <p:cNvGrpSpPr/>
+        <p:nvPr/>
+      </p:nvGrpSpPr>
+      <p:grpSpPr>
+        <a:xfrm>
+          <a:off x="0" y="0"/>
+          <a:ext cx="0" cy="0"/>
+          <a:chOff x="0" y="0"/>
+          <a:chExt cx="0" cy="0"/>
+        </a:xfrm>
+      </p:grpSpPr>
+      <p:pic>
+        <p:nvPicPr>
+          <p:cNvPr id="4" name="Picture 3" descr="Text&#10;&#10;Description automatically generated with medium confidence">
+            <a:extLst>
+              <a:ext uri="{FF2B5EF4-FFF2-40B4-BE49-F238E27FC236}">
+                <a16:creationId xmlns:a16="http://schemas.microsoft.com/office/drawing/2014/main" id="{B5739CA8-25F1-41D4-AF9A-2A67DD65227E}"/>
+              </a:ext>
+            </a:extLst>
+          </p:cNvPr>
+          <p:cNvPicPr>
+            <a:picLocks noChangeAspect="1"/>
+          </p:cNvPicPr>
+          <p:nvPr/>
+        </p:nvPicPr>
+        <p:blipFill>
+          <a:blip r:embed="rId2">
+            <a:extLst>
+              <a:ext uri="{28A0092B-C50C-407E-A947-70E740481C1C}">
+                <a14:useLocalDpi xmlns:a14="http://schemas.microsoft.com/office/drawing/2010/main" val="0"/>
+              </a:ext>
+            </a:extLst>
+          </a:blip>
+          <a:stretch>
+            <a:fillRect/>
+          </a:stretch>
+        </p:blipFill>
+        <p:spPr>
+          <a:xfrm>
+            <a:off x="211441" y="308131"/>
+            <a:ext cx="4515480" cy="1314633"/>
+          </a:xfrm>
+          <a:prstGeom prst="rect">
+            <a:avLst/>
+          </a:prstGeom>
+        </p:spPr>
+      </p:pic>
+      <p:pic>
+        <p:nvPicPr>
+          <p:cNvPr id="6" name="Picture 5" descr="Text, letter&#10;&#10;Description automatically generated">
+            <a:extLst>
+              <a:ext uri="{FF2B5EF4-FFF2-40B4-BE49-F238E27FC236}">
+                <a16:creationId xmlns:a16="http://schemas.microsoft.com/office/drawing/2014/main" id="{482A7503-985E-46E3-8134-8DB3D293FAE2}"/>
+              </a:ext>
+            </a:extLst>
+          </p:cNvPr>
+          <p:cNvPicPr>
+            <a:picLocks noChangeAspect="1"/>
+          </p:cNvPicPr>
+          <p:nvPr/>
+        </p:nvPicPr>
+        <p:blipFill>
+          <a:blip r:embed="rId3">
+            <a:extLst>
+              <a:ext uri="{28A0092B-C50C-407E-A947-70E740481C1C}">
+                <a14:useLocalDpi xmlns:a14="http://schemas.microsoft.com/office/drawing/2010/main" val="0"/>
+              </a:ext>
+            </a:extLst>
+          </a:blip>
+          <a:stretch>
+            <a:fillRect/>
+          </a:stretch>
+        </p:blipFill>
+        <p:spPr>
+          <a:xfrm>
+            <a:off x="211441" y="2140269"/>
+            <a:ext cx="3972479" cy="1924319"/>
+          </a:xfrm>
+          <a:prstGeom prst="rect">
+            <a:avLst/>
+          </a:prstGeom>
+        </p:spPr>
+      </p:pic>
+      <p:pic>
+        <p:nvPicPr>
+          <p:cNvPr id="8" name="Picture 7" descr="Text&#10;&#10;Description automatically generated">
+            <a:extLst>
+              <a:ext uri="{FF2B5EF4-FFF2-40B4-BE49-F238E27FC236}">
+                <a16:creationId xmlns:a16="http://schemas.microsoft.com/office/drawing/2014/main" id="{14A39CE6-17B1-4605-8338-A574BCFB7653}"/>
+              </a:ext>
+            </a:extLst>
+          </p:cNvPr>
+          <p:cNvPicPr>
+            <a:picLocks noChangeAspect="1"/>
+          </p:cNvPicPr>
+          <p:nvPr/>
+        </p:nvPicPr>
+        <p:blipFill>
+          <a:blip r:embed="rId4">
+            <a:extLst>
+              <a:ext uri="{28A0092B-C50C-407E-A947-70E740481C1C}">
+                <a14:useLocalDpi xmlns:a14="http://schemas.microsoft.com/office/drawing/2010/main" val="0"/>
+              </a:ext>
+            </a:extLst>
+          </a:blip>
+          <a:stretch>
+            <a:fillRect/>
+          </a:stretch>
+        </p:blipFill>
+        <p:spPr>
+          <a:xfrm>
+            <a:off x="5751373" y="2149796"/>
+            <a:ext cx="4544059" cy="1914792"/>
+          </a:xfrm>
+          <a:prstGeom prst="rect">
+            <a:avLst/>
+          </a:prstGeom>
+        </p:spPr>
+      </p:pic>
+      <p:pic>
+        <p:nvPicPr>
+          <p:cNvPr id="10" name="Picture 9" descr="Text&#10;&#10;Description automatically generated">
+            <a:extLst>
+              <a:ext uri="{FF2B5EF4-FFF2-40B4-BE49-F238E27FC236}">
+                <a16:creationId xmlns:a16="http://schemas.microsoft.com/office/drawing/2014/main" id="{ACB6181A-6AB9-469C-9D15-3D407BAC94CD}"/>
+              </a:ext>
+            </a:extLst>
+          </p:cNvPr>
+          <p:cNvPicPr>
+            <a:picLocks noChangeAspect="1"/>
+          </p:cNvPicPr>
+          <p:nvPr/>
+        </p:nvPicPr>
+        <p:blipFill>
+          <a:blip r:embed="rId5">
+            <a:extLst>
+              <a:ext uri="{28A0092B-C50C-407E-A947-70E740481C1C}">
+                <a14:useLocalDpi xmlns:a14="http://schemas.microsoft.com/office/drawing/2010/main" val="0"/>
+              </a:ext>
+            </a:extLst>
+          </a:blip>
+          <a:stretch>
+            <a:fillRect/>
+          </a:stretch>
+        </p:blipFill>
+        <p:spPr>
+          <a:xfrm>
+            <a:off x="211441" y="4756276"/>
+            <a:ext cx="5239481" cy="1438476"/>
+          </a:xfrm>
+          <a:prstGeom prst="rect">
+            <a:avLst/>
+          </a:prstGeom>
+        </p:spPr>
+      </p:pic>
+      <p:pic>
+        <p:nvPicPr>
+          <p:cNvPr id="12" name="Picture 11" descr="Text, letter&#10;&#10;Description automatically generated">
+            <a:extLst>
+              <a:ext uri="{FF2B5EF4-FFF2-40B4-BE49-F238E27FC236}">
+                <a16:creationId xmlns:a16="http://schemas.microsoft.com/office/drawing/2014/main" id="{7499AE97-BC77-4D21-B704-401D527AC8BD}"/>
+              </a:ext>
+            </a:extLst>
+          </p:cNvPr>
+          <p:cNvPicPr>
+            <a:picLocks noChangeAspect="1"/>
+          </p:cNvPicPr>
+          <p:nvPr/>
+        </p:nvPicPr>
+        <p:blipFill>
+          <a:blip r:embed="rId6">
+            <a:extLst>
+              <a:ext uri="{28A0092B-C50C-407E-A947-70E740481C1C}">
+                <a14:useLocalDpi xmlns:a14="http://schemas.microsoft.com/office/drawing/2010/main" val="0"/>
+              </a:ext>
+            </a:extLst>
+          </a:blip>
+          <a:stretch>
+            <a:fillRect/>
+          </a:stretch>
+        </p:blipFill>
+        <p:spPr>
+          <a:xfrm>
+            <a:off x="5751373" y="4713407"/>
+            <a:ext cx="2943636" cy="1524213"/>
+          </a:xfrm>
+          <a:prstGeom prst="rect">
+            <a:avLst/>
+          </a:prstGeom>
+        </p:spPr>
+      </p:pic>
+      <p:pic>
+        <p:nvPicPr>
+          <p:cNvPr id="14" name="Picture 13" descr="Text&#10;&#10;Description automatically generated">
+            <a:extLst>
+              <a:ext uri="{FF2B5EF4-FFF2-40B4-BE49-F238E27FC236}">
+                <a16:creationId xmlns:a16="http://schemas.microsoft.com/office/drawing/2014/main" id="{32EA2B5B-4FB3-41F3-9A7E-26E0D1B8FEED}"/>
+              </a:ext>
+            </a:extLst>
+          </p:cNvPr>
+          <p:cNvPicPr>
+            <a:picLocks noChangeAspect="1"/>
+          </p:cNvPicPr>
+          <p:nvPr/>
+        </p:nvPicPr>
+        <p:blipFill>
+          <a:blip r:embed="rId7">
+            <a:extLst>
+              <a:ext uri="{28A0092B-C50C-407E-A947-70E740481C1C}">
+                <a14:useLocalDpi xmlns:a14="http://schemas.microsoft.com/office/drawing/2010/main" val="0"/>
+              </a:ext>
+            </a:extLst>
+          </a:blip>
+          <a:stretch>
+            <a:fillRect/>
+          </a:stretch>
+        </p:blipFill>
+        <p:spPr>
+          <a:xfrm>
+            <a:off x="8816858" y="4713407"/>
+            <a:ext cx="3372321" cy="1609950"/>
+          </a:xfrm>
+          <a:prstGeom prst="rect">
+            <a:avLst/>
+          </a:prstGeom>
+        </p:spPr>
+      </p:pic>
+    </p:spTree>
+    <p:extLst>
+      <p:ext uri="{BB962C8B-B14F-4D97-AF65-F5344CB8AC3E}">
+        <p14:creationId xmlns:p14="http://schemas.microsoft.com/office/powerpoint/2010/main" val="1645433445"/>
+      </p:ext>
+    </p:extLst>
+  </p:cSld>
+  <p:clrMapOvr>
+    <a:masterClrMapping/>
+  </p:clrMapOvr>
+</p:sld>
+</file>
+
+<file path=ppt/slides/slide13.xml><?xml version="1.0" encoding="utf-8"?>
+<p:sld xmlns:a="http://schemas.openxmlformats.org/drawingml/2006/main" xmlns:r="http://schemas.openxmlformats.org/officeDocument/2006/relationships" xmlns:p="http://schemas.openxmlformats.org/presentationml/2006/main">
+  <p:cSld>
+    <p:spTree>
+      <p:nvGrpSpPr>
+        <p:cNvPr id="1" name=""/>
+        <p:cNvGrpSpPr/>
+        <p:nvPr/>
+      </p:nvGrpSpPr>
+      <p:grpSpPr>
+        <a:xfrm>
+          <a:off x="0" y="0"/>
+          <a:ext cx="0" cy="0"/>
+          <a:chOff x="0" y="0"/>
+          <a:chExt cx="0" cy="0"/>
+        </a:xfrm>
+      </p:grpSpPr>
+      <p:graphicFrame>
+        <p:nvGraphicFramePr>
+          <p:cNvPr id="5" name="Table 5">
+            <a:extLst>
+              <a:ext uri="{FF2B5EF4-FFF2-40B4-BE49-F238E27FC236}">
+                <a16:creationId xmlns:a16="http://schemas.microsoft.com/office/drawing/2014/main" id="{2684E076-3241-45BA-A24C-57C60AEFF164}"/>
+              </a:ext>
+            </a:extLst>
+          </p:cNvPr>
+          <p:cNvGraphicFramePr>
+            <a:graphicFrameLocks noGrp="1"/>
+          </p:cNvGraphicFramePr>
+          <p:nvPr>
+            <p:extLst>
+              <p:ext uri="{D42A27DB-BD31-4B8C-83A1-F6EECF244321}">
+                <p14:modId xmlns:p14="http://schemas.microsoft.com/office/powerpoint/2010/main" val="530128418"/>
+              </p:ext>
+            </p:extLst>
+          </p:nvPr>
+        </p:nvGraphicFramePr>
+        <p:xfrm>
+          <a:off x="838099" y="1298762"/>
+          <a:ext cx="10609486" cy="1854200"/>
+        </p:xfrm>
+        <a:graphic>
+          <a:graphicData uri="http://schemas.openxmlformats.org/drawingml/2006/table">
+            <a:tbl>
+              <a:tblPr firstRow="1" bandRow="1">
+                <a:tableStyleId>{3B4B98B0-60AC-42C2-AFA5-B58CD77FA1E5}</a:tableStyleId>
+              </a:tblPr>
+              <a:tblGrid>
+                <a:gridCol w="5304743">
+                  <a:extLst>
+                    <a:ext uri="{9D8B030D-6E8A-4147-A177-3AD203B41FA5}">
+                      <a16:colId xmlns:a16="http://schemas.microsoft.com/office/drawing/2014/main" val="3314975554"/>
+                    </a:ext>
+                  </a:extLst>
+                </a:gridCol>
+                <a:gridCol w="5304743">
+                  <a:extLst>
+                    <a:ext uri="{9D8B030D-6E8A-4147-A177-3AD203B41FA5}">
+                      <a16:colId xmlns:a16="http://schemas.microsoft.com/office/drawing/2014/main" val="3612535637"/>
+                    </a:ext>
+                  </a:extLst>
+                </a:gridCol>
+              </a:tblGrid>
+              <a:tr h="370840">
+                <a:tc gridSpan="2">
+                  <a:txBody>
+                    <a:bodyPr/>
+                    <a:lstStyle/>
+                    <a:p>
+                      <a:r>
+                        <a:rPr lang="en-US" sz="1600" b="1" dirty="0"/>
+                        <a:t>379.89s, 321 electrodes(UDLP96+UMCX96+UPMC96+DBSS12+DBSG12), 11.2G, </a:t>
+                      </a:r>
+                      <a:r>
+                        <a:rPr lang="en-US" sz="1600" b="1" kern="1200" dirty="0" err="1">
+                          <a:solidFill>
+                            <a:schemeClr val="tx1"/>
+                          </a:solidFill>
+                          <a:latin typeface="+mn-lt"/>
+                          <a:ea typeface="+mn-ea"/>
+                          <a:cs typeface="+mn-cs"/>
+                        </a:rPr>
+                        <a:t>rawTDT</a:t>
+                      </a:r>
+                      <a:r>
+                        <a:rPr lang="en-US" sz="1600" b="1" kern="1200" dirty="0">
+                          <a:solidFill>
+                            <a:schemeClr val="tx1"/>
+                          </a:solidFill>
+                          <a:latin typeface="+mn-lt"/>
+                          <a:ea typeface="+mn-ea"/>
+                          <a:cs typeface="+mn-cs"/>
+                        </a:rPr>
+                        <a:t>\Barb-220324\Block-2</a:t>
+                      </a:r>
+                    </a:p>
+                  </a:txBody>
+                  <a:tcPr/>
+                </a:tc>
+                <a:tc hMerge="1">
+                  <a:txBody>
+                    <a:bodyPr/>
+                    <a:lstStyle/>
+                    <a:p>
+                      <a:endParaRPr lang="en-US" dirty="0"/>
+                    </a:p>
+                  </a:txBody>
+                  <a:tcPr/>
+                </a:tc>
+                <a:extLst>
+                  <a:ext uri="{0D108BD9-81ED-4DB2-BD59-A6C34878D82A}">
+                    <a16:rowId xmlns:a16="http://schemas.microsoft.com/office/drawing/2014/main" val="3808233786"/>
+                  </a:ext>
+                </a:extLst>
+              </a:tr>
+              <a:tr h="370840">
+                <a:tc>
+                  <a:txBody>
+                    <a:bodyPr/>
+                    <a:lstStyle/>
+                    <a:p>
+                      <a:pPr marL="0" marR="0" lvl="0" indent="0" algn="l" defTabSz="914400" rtl="0" eaLnBrk="1" fontAlgn="auto" latinLnBrk="0" hangingPunct="1">
+                        <a:lnSpc>
+                          <a:spcPct val="100000"/>
+                        </a:lnSpc>
+                        <a:spcBef>
+                          <a:spcPts val="0"/>
+                        </a:spcBef>
+                        <a:spcAft>
+                          <a:spcPts val="0"/>
+                        </a:spcAft>
+                        <a:buClrTx/>
+                        <a:buSzTx/>
+                        <a:buFontTx/>
+                        <a:buNone/>
+                        <a:tabLst/>
+                        <a:defRPr/>
+                      </a:pPr>
+                      <a:r>
+                        <a:rPr lang="en-US" sz="1600" b="0" u="none" strike="noStrike" kern="1200" baseline="0" dirty="0">
+                          <a:solidFill>
+                            <a:schemeClr val="dk1"/>
+                          </a:solidFill>
+                        </a:rPr>
+                        <a:t>TDTbin2mat</a:t>
+                      </a:r>
+                      <a:endParaRPr lang="en-US" sz="1600" b="0" i="0" u="none" strike="noStrike" kern="1200" baseline="0" dirty="0">
+                        <a:solidFill>
+                          <a:schemeClr val="dk1"/>
+                        </a:solidFill>
+                        <a:latin typeface="+mn-lt"/>
+                        <a:ea typeface="+mn-ea"/>
+                        <a:cs typeface="+mn-cs"/>
+                      </a:endParaRPr>
+                    </a:p>
+                  </a:txBody>
+                  <a:tcPr/>
+                </a:tc>
+                <a:tc>
+                  <a:txBody>
+                    <a:bodyPr/>
+                    <a:lstStyle/>
+                    <a:p>
+                      <a:r>
+                        <a:rPr lang="en-US" sz="1600" dirty="0"/>
+                        <a:t>687.283583 seconds</a:t>
+                      </a:r>
+                    </a:p>
+                  </a:txBody>
+                  <a:tcPr/>
+                </a:tc>
+                <a:extLst>
+                  <a:ext uri="{0D108BD9-81ED-4DB2-BD59-A6C34878D82A}">
+                    <a16:rowId xmlns:a16="http://schemas.microsoft.com/office/drawing/2014/main" val="833362563"/>
+                  </a:ext>
+                </a:extLst>
+              </a:tr>
+              <a:tr h="370840">
+                <a:tc>
+                  <a:txBody>
+                    <a:bodyPr/>
+                    <a:lstStyle/>
+                    <a:p>
+                      <a:pPr marL="0" marR="0" lvl="0" indent="0" algn="l" defTabSz="914400" rtl="0" eaLnBrk="1" fontAlgn="auto" latinLnBrk="0" hangingPunct="1">
+                        <a:lnSpc>
+                          <a:spcPct val="100000"/>
+                        </a:lnSpc>
+                        <a:spcBef>
+                          <a:spcPts val="0"/>
+                        </a:spcBef>
+                        <a:spcAft>
+                          <a:spcPts val="0"/>
+                        </a:spcAft>
+                        <a:buClrTx/>
+                        <a:buSzTx/>
+                        <a:buFontTx/>
+                        <a:buNone/>
+                        <a:tabLst/>
+                        <a:defRPr/>
+                      </a:pPr>
+                      <a:r>
+                        <a:rPr lang="en-US" sz="1600" b="0" u="none" strike="noStrike" kern="1200" baseline="0" dirty="0">
+                          <a:solidFill>
+                            <a:schemeClr val="dk1"/>
+                          </a:solidFill>
+                        </a:rPr>
+                        <a:t>convraw_tdt2nwb</a:t>
+                      </a:r>
+                      <a:endParaRPr lang="en-US" sz="1600" b="0" i="0" u="none" strike="noStrike" kern="1200" baseline="0" dirty="0">
+                        <a:solidFill>
+                          <a:schemeClr val="dk1"/>
+                        </a:solidFill>
+                        <a:latin typeface="+mn-lt"/>
+                        <a:ea typeface="+mn-ea"/>
+                        <a:cs typeface="+mn-cs"/>
+                      </a:endParaRPr>
+                    </a:p>
+                  </a:txBody>
+                  <a:tcPr/>
+                </a:tc>
+                <a:tc>
+                  <a:txBody>
+                    <a:bodyPr/>
+                    <a:lstStyle/>
+                    <a:p>
+                      <a:r>
+                        <a:rPr lang="en-US" sz="1600" dirty="0"/>
+                        <a:t>8.932317 seconds.</a:t>
+                      </a:r>
+                    </a:p>
+                  </a:txBody>
+                  <a:tcPr/>
+                </a:tc>
+                <a:extLst>
+                  <a:ext uri="{0D108BD9-81ED-4DB2-BD59-A6C34878D82A}">
+                    <a16:rowId xmlns:a16="http://schemas.microsoft.com/office/drawing/2014/main" val="134367092"/>
+                  </a:ext>
+                </a:extLst>
+              </a:tr>
+              <a:tr h="370840">
+                <a:tc>
+                  <a:txBody>
+                    <a:bodyPr/>
+                    <a:lstStyle/>
+                    <a:p>
+                      <a:r>
+                        <a:rPr lang="en-US" sz="1600" dirty="0" err="1"/>
+                        <a:t>nwbExport</a:t>
+                      </a:r>
+                      <a:endParaRPr lang="en-US" sz="1600" dirty="0"/>
+                    </a:p>
+                  </a:txBody>
+                  <a:tcPr/>
+                </a:tc>
+                <a:tc>
+                  <a:txBody>
+                    <a:bodyPr/>
+                    <a:lstStyle/>
+                    <a:p>
+                      <a:r>
+                        <a:rPr lang="en-US" sz="1600" dirty="0"/>
+                        <a:t>25.347252 seconds.</a:t>
+                      </a:r>
+                    </a:p>
+                  </a:txBody>
+                  <a:tcPr/>
+                </a:tc>
+                <a:extLst>
+                  <a:ext uri="{0D108BD9-81ED-4DB2-BD59-A6C34878D82A}">
+                    <a16:rowId xmlns:a16="http://schemas.microsoft.com/office/drawing/2014/main" val="4050278205"/>
+                  </a:ext>
+                </a:extLst>
+              </a:tr>
+              <a:tr h="370840">
+                <a:tc>
+                  <a:txBody>
+                    <a:bodyPr/>
+                    <a:lstStyle/>
+                    <a:p>
+                      <a:pPr marL="0" marR="0" lvl="0" indent="0" algn="l" defTabSz="914400" rtl="0" eaLnBrk="1" fontAlgn="auto" latinLnBrk="0" hangingPunct="1">
+                        <a:lnSpc>
+                          <a:spcPct val="100000"/>
+                        </a:lnSpc>
+                        <a:spcBef>
+                          <a:spcPts val="0"/>
+                        </a:spcBef>
+                        <a:spcAft>
+                          <a:spcPts val="0"/>
+                        </a:spcAft>
+                        <a:buClrTx/>
+                        <a:buSzTx/>
+                        <a:buFontTx/>
+                        <a:buNone/>
+                        <a:tabLst/>
+                        <a:defRPr/>
+                      </a:pPr>
+                      <a:r>
+                        <a:rPr lang="en-US" sz="1600" b="0" u="none" strike="noStrike" kern="1200" baseline="0" dirty="0" err="1">
+                          <a:solidFill>
+                            <a:schemeClr val="dk1"/>
+                          </a:solidFill>
+                        </a:rPr>
+                        <a:t>nwbRead</a:t>
+                      </a:r>
+                      <a:endParaRPr lang="en-US" sz="1600" b="0" i="0" u="none" strike="noStrike" kern="1200" baseline="0" dirty="0">
+                        <a:solidFill>
+                          <a:schemeClr val="dk1"/>
+                        </a:solidFill>
+                        <a:latin typeface="+mn-lt"/>
+                        <a:ea typeface="+mn-ea"/>
+                        <a:cs typeface="+mn-cs"/>
+                      </a:endParaRPr>
+                    </a:p>
+                  </a:txBody>
+                  <a:tcPr/>
+                </a:tc>
+                <a:tc>
+                  <a:txBody>
+                    <a:bodyPr/>
+                    <a:lstStyle/>
+                    <a:p>
+                      <a:r>
+                        <a:rPr lang="en-US" sz="1600" dirty="0"/>
+                        <a:t>5.856116 seconds</a:t>
+                      </a:r>
+                    </a:p>
+                  </a:txBody>
+                  <a:tcPr/>
+                </a:tc>
+                <a:extLst>
+                  <a:ext uri="{0D108BD9-81ED-4DB2-BD59-A6C34878D82A}">
+                    <a16:rowId xmlns:a16="http://schemas.microsoft.com/office/drawing/2014/main" val="2072437182"/>
+                  </a:ext>
+                </a:extLst>
+              </a:tr>
+            </a:tbl>
+          </a:graphicData>
+        </a:graphic>
+      </p:graphicFrame>
+      <p:sp>
+        <p:nvSpPr>
+          <p:cNvPr id="6" name="TextBox 5">
+            <a:extLst>
+              <a:ext uri="{FF2B5EF4-FFF2-40B4-BE49-F238E27FC236}">
+                <a16:creationId xmlns:a16="http://schemas.microsoft.com/office/drawing/2014/main" id="{63C76B66-0637-4CB7-91AB-71F58B6B7563}"/>
+              </a:ext>
+            </a:extLst>
+          </p:cNvPr>
+          <p:cNvSpPr txBox="1"/>
+          <p:nvPr/>
+        </p:nvSpPr>
+        <p:spPr>
+          <a:xfrm>
+            <a:off x="2057400" y="562708"/>
+            <a:ext cx="2628989" cy="369332"/>
+          </a:xfrm>
+          <a:prstGeom prst="rect">
+            <a:avLst/>
+          </a:prstGeom>
+          <a:noFill/>
+        </p:spPr>
+        <p:txBody>
+          <a:bodyPr wrap="none" rtlCol="0">
+            <a:spAutoFit/>
+          </a:bodyPr>
+          <a:lstStyle/>
+          <a:p>
+            <a:r>
+              <a:rPr lang="en-US" dirty="0"/>
+              <a:t>Time for various functions</a:t>
+            </a:r>
+          </a:p>
+        </p:txBody>
+      </p:sp>
+    </p:spTree>
+    <p:extLst>
+      <p:ext uri="{BB962C8B-B14F-4D97-AF65-F5344CB8AC3E}">
+        <p14:creationId xmlns:p14="http://schemas.microsoft.com/office/powerpoint/2010/main" val="771491092"/>
+      </p:ext>
+    </p:extLst>
+  </p:cSld>
+  <p:clrMapOvr>
+    <a:masterClrMapping/>
+  </p:clrMapOvr>
+</p:sld>
+</file>
+
+<file path=ppt/slides/slide14.xml><?xml version="1.0" encoding="utf-8"?>
+<p:sld xmlns:a="http://schemas.openxmlformats.org/drawingml/2006/main" xmlns:r="http://schemas.openxmlformats.org/officeDocument/2006/relationships" xmlns:p="http://schemas.openxmlformats.org/presentationml/2006/main">
+  <p:cSld>
+    <p:spTree>
+      <p:nvGrpSpPr>
+        <p:cNvPr id="1" name=""/>
+        <p:cNvGrpSpPr/>
+        <p:nvPr/>
+      </p:nvGrpSpPr>
+      <p:grpSpPr>
+        <a:xfrm>
+          <a:off x="0" y="0"/>
+          <a:ext cx="0" cy="0"/>
+          <a:chOff x="0" y="0"/>
+          <a:chExt cx="0" cy="0"/>
+        </a:xfrm>
+      </p:grpSpPr>
+      <p:sp>
+        <p:nvSpPr>
+          <p:cNvPr id="2" name="Title 1">
+            <a:extLst>
+              <a:ext uri="{FF2B5EF4-FFF2-40B4-BE49-F238E27FC236}">
+                <a16:creationId xmlns:a16="http://schemas.microsoft.com/office/drawing/2014/main" id="{7697442D-4EC9-4C5A-AD28-5EF505EF793C}"/>
+              </a:ext>
+            </a:extLst>
+          </p:cNvPr>
+          <p:cNvSpPr>
+            <a:spLocks noGrp="1"/>
+          </p:cNvSpPr>
+          <p:nvPr>
+            <p:ph type="title"/>
+          </p:nvPr>
+        </p:nvSpPr>
+        <p:spPr/>
+        <p:txBody>
+          <a:bodyPr/>
+          <a:lstStyle/>
+          <a:p>
+            <a:r>
+              <a:rPr lang="en-US" dirty="0"/>
+              <a:t>Apr.22 1pm</a:t>
+            </a:r>
+          </a:p>
+        </p:txBody>
+      </p:sp>
+      <p:sp>
+        <p:nvSpPr>
+          <p:cNvPr id="3" name="Content Placeholder 2">
+            <a:extLst>
+              <a:ext uri="{FF2B5EF4-FFF2-40B4-BE49-F238E27FC236}">
+                <a16:creationId xmlns:a16="http://schemas.microsoft.com/office/drawing/2014/main" id="{D819FBD7-0C3F-4570-8359-D2E4562C95AD}"/>
+              </a:ext>
+            </a:extLst>
+          </p:cNvPr>
+          <p:cNvSpPr>
+            <a:spLocks noGrp="1"/>
+          </p:cNvSpPr>
+          <p:nvPr>
+            <p:ph idx="1"/>
+          </p:nvPr>
+        </p:nvSpPr>
+        <p:spPr/>
+        <p:txBody>
+          <a:bodyPr/>
+          <a:lstStyle/>
+          <a:p>
+            <a:r>
+              <a:rPr lang="en-US" dirty="0"/>
+              <a:t>Install the NMRCNWB code based on the documentation</a:t>
+            </a:r>
+          </a:p>
+          <a:p>
+            <a:pPr lvl="1"/>
+            <a:r>
+              <a:rPr lang="en-US" dirty="0"/>
+              <a:t>Marked the places where </a:t>
+            </a:r>
+            <a:r>
+              <a:rPr lang="en-US"/>
+              <a:t>not clear</a:t>
+            </a:r>
+          </a:p>
+          <a:p>
+            <a:r>
+              <a:rPr lang="en-US" dirty="0"/>
+              <a:t>Basic idea about how to create a NWB file</a:t>
+            </a:r>
+          </a:p>
+          <a:p>
+            <a:r>
+              <a:rPr lang="en-US" dirty="0"/>
+              <a:t>How to store video into NWB</a:t>
+            </a:r>
+          </a:p>
+          <a:p>
+            <a:r>
+              <a:rPr lang="en-US" dirty="0"/>
+              <a:t>Download the current code and learn a bit of the git commands</a:t>
+            </a:r>
+          </a:p>
+          <a:p>
+            <a:endParaRPr lang="en-US" dirty="0"/>
+          </a:p>
+        </p:txBody>
+      </p:sp>
+    </p:spTree>
+    <p:extLst>
+      <p:ext uri="{BB962C8B-B14F-4D97-AF65-F5344CB8AC3E}">
+        <p14:creationId xmlns:p14="http://schemas.microsoft.com/office/powerpoint/2010/main" val="119832519"/>
+      </p:ext>
+    </p:extLst>
+  </p:cSld>
+  <p:clrMapOvr>
+    <a:masterClrMapping/>
+  </p:clrMapOvr>
+</p:sld>
+</file>
+
 <file path=ppt/slides/slide2.xml><?xml version="1.0" encoding="utf-8"?>
 <p:sld xmlns:a="http://schemas.openxmlformats.org/drawingml/2006/main" xmlns:r="http://schemas.openxmlformats.org/officeDocument/2006/relationships" xmlns:p="http://schemas.openxmlformats.org/presentationml/2006/main">
   <p:cSld>
@@ -4073,98 +5603,1363 @@
           <a:chExt cx="0" cy="0"/>
         </a:xfrm>
       </p:grpSpPr>
-      <p:sp>
-        <p:nvSpPr>
-          <p:cNvPr id="2" name="Title 1">
-            <a:extLst>
-              <a:ext uri="{FF2B5EF4-FFF2-40B4-BE49-F238E27FC236}">
-                <a16:creationId xmlns:a16="http://schemas.microsoft.com/office/drawing/2014/main" id="{7697442D-4EC9-4C5A-AD28-5EF505EF793C}"/>
-              </a:ext>
-            </a:extLst>
-          </p:cNvPr>
-          <p:cNvSpPr>
-            <a:spLocks noGrp="1"/>
-          </p:cNvSpPr>
-          <p:nvPr>
-            <p:ph type="title"/>
-          </p:nvPr>
-        </p:nvSpPr>
-        <p:spPr/>
-        <p:txBody>
-          <a:bodyPr/>
-          <a:lstStyle/>
-          <a:p>
-            <a:r>
-              <a:rPr lang="en-US" dirty="0"/>
-              <a:t>Apr.22 1pm</a:t>
-            </a:r>
-          </a:p>
-        </p:txBody>
-      </p:sp>
-      <p:sp>
-        <p:nvSpPr>
-          <p:cNvPr id="3" name="Content Placeholder 2">
-            <a:extLst>
-              <a:ext uri="{FF2B5EF4-FFF2-40B4-BE49-F238E27FC236}">
-                <a16:creationId xmlns:a16="http://schemas.microsoft.com/office/drawing/2014/main" id="{D819FBD7-0C3F-4570-8359-D2E4562C95AD}"/>
-              </a:ext>
-            </a:extLst>
-          </p:cNvPr>
-          <p:cNvSpPr>
-            <a:spLocks noGrp="1"/>
-          </p:cNvSpPr>
-          <p:nvPr>
-            <p:ph idx="1"/>
-          </p:nvPr>
-        </p:nvSpPr>
-        <p:spPr/>
-        <p:txBody>
-          <a:bodyPr/>
-          <a:lstStyle/>
-          <a:p>
-            <a:r>
-              <a:rPr lang="en-US" dirty="0"/>
-              <a:t>Install the NMRCNWB code based on the documentation</a:t>
-            </a:r>
-          </a:p>
-          <a:p>
-            <a:pPr lvl="1"/>
-            <a:r>
-              <a:rPr lang="en-US" dirty="0"/>
-              <a:t>Marked the places where </a:t>
-            </a:r>
-            <a:r>
-              <a:rPr lang="en-US"/>
-              <a:t>not clear</a:t>
-            </a:r>
-          </a:p>
-          <a:p>
-            <a:r>
-              <a:rPr lang="en-US" dirty="0"/>
-              <a:t>Basic idea about how to create a NWB file</a:t>
-            </a:r>
-          </a:p>
-          <a:p>
-            <a:r>
-              <a:rPr lang="en-US" dirty="0"/>
-              <a:t>How to store video into NWB</a:t>
-            </a:r>
-          </a:p>
-          <a:p>
-            <a:r>
-              <a:rPr lang="en-US" dirty="0"/>
-              <a:t>Download the current code and learn a bit of the git commands</a:t>
-            </a:r>
-          </a:p>
-          <a:p>
-            <a:endParaRPr lang="en-US" dirty="0"/>
-          </a:p>
-        </p:txBody>
-      </p:sp>
+      <p:grpSp>
+        <p:nvGrpSpPr>
+          <p:cNvPr id="41" name="Group 40">
+            <a:extLst>
+              <a:ext uri="{FF2B5EF4-FFF2-40B4-BE49-F238E27FC236}">
+                <a16:creationId xmlns:a16="http://schemas.microsoft.com/office/drawing/2014/main" id="{C58488CA-970D-4346-A74E-4E07973D1B27}"/>
+              </a:ext>
+            </a:extLst>
+          </p:cNvPr>
+          <p:cNvGrpSpPr/>
+          <p:nvPr/>
+        </p:nvGrpSpPr>
+        <p:grpSpPr>
+          <a:xfrm>
+            <a:off x="0" y="0"/>
+            <a:ext cx="5393318" cy="6858000"/>
+            <a:chOff x="2401294" y="0"/>
+            <a:chExt cx="5393318" cy="6858000"/>
+          </a:xfrm>
+        </p:grpSpPr>
+        <p:pic>
+          <p:nvPicPr>
+            <p:cNvPr id="28" name="Picture 27" descr="Table&#10;&#10;Description automatically generated">
+              <a:extLst>
+                <a:ext uri="{FF2B5EF4-FFF2-40B4-BE49-F238E27FC236}">
+                  <a16:creationId xmlns:a16="http://schemas.microsoft.com/office/drawing/2014/main" id="{8AC382B4-9270-442A-B58B-DCF45F74BE39}"/>
+                </a:ext>
+              </a:extLst>
+            </p:cNvPr>
+            <p:cNvPicPr>
+              <a:picLocks noChangeAspect="1"/>
+            </p:cNvPicPr>
+            <p:nvPr/>
+          </p:nvPicPr>
+          <p:blipFill>
+            <a:blip r:embed="rId3">
+              <a:extLst>
+                <a:ext uri="{28A0092B-C50C-407E-A947-70E740481C1C}">
+                  <a14:useLocalDpi xmlns:a14="http://schemas.microsoft.com/office/drawing/2010/main" val="0"/>
+                </a:ext>
+              </a:extLst>
+            </a:blip>
+            <a:stretch>
+              <a:fillRect/>
+            </a:stretch>
+          </p:blipFill>
+          <p:spPr>
+            <a:xfrm>
+              <a:off x="2401294" y="0"/>
+              <a:ext cx="5393318" cy="6858000"/>
+            </a:xfrm>
+            <a:prstGeom prst="rect">
+              <a:avLst/>
+            </a:prstGeom>
+          </p:spPr>
+        </p:pic>
+        <p:sp>
+          <p:nvSpPr>
+            <p:cNvPr id="6" name="Oval 5">
+              <a:extLst>
+                <a:ext uri="{FF2B5EF4-FFF2-40B4-BE49-F238E27FC236}">
+                  <a16:creationId xmlns:a16="http://schemas.microsoft.com/office/drawing/2014/main" id="{33A2FCDC-03AC-42FD-A47A-A7D1A84C87C4}"/>
+                </a:ext>
+              </a:extLst>
+            </p:cNvPr>
+            <p:cNvSpPr/>
+            <p:nvPr/>
+          </p:nvSpPr>
+          <p:spPr>
+            <a:xfrm>
+              <a:off x="4827973" y="844063"/>
+              <a:ext cx="729762" cy="149469"/>
+            </a:xfrm>
+            <a:prstGeom prst="ellipse">
+              <a:avLst/>
+            </a:prstGeom>
+            <a:noFill/>
+            <a:ln>
+              <a:solidFill>
+                <a:srgbClr val="FF0000"/>
+              </a:solidFill>
+            </a:ln>
+          </p:spPr>
+          <p:style>
+            <a:lnRef idx="2">
+              <a:schemeClr val="accent2"/>
+            </a:lnRef>
+            <a:fillRef idx="1">
+              <a:schemeClr val="lt1"/>
+            </a:fillRef>
+            <a:effectRef idx="0">
+              <a:schemeClr val="accent2"/>
+            </a:effectRef>
+            <a:fontRef idx="minor">
+              <a:schemeClr val="dk1"/>
+            </a:fontRef>
+          </p:style>
+          <p:txBody>
+            <a:bodyPr rtlCol="0" anchor="ctr"/>
+            <a:lstStyle/>
+            <a:p>
+              <a:pPr algn="ctr"/>
+              <a:endParaRPr lang="en-US"/>
+            </a:p>
+          </p:txBody>
+        </p:sp>
+        <p:sp>
+          <p:nvSpPr>
+            <p:cNvPr id="23" name="Oval 22">
+              <a:extLst>
+                <a:ext uri="{FF2B5EF4-FFF2-40B4-BE49-F238E27FC236}">
+                  <a16:creationId xmlns:a16="http://schemas.microsoft.com/office/drawing/2014/main" id="{35A97430-941F-4D77-8DAA-DE7B12AF4E8E}"/>
+                </a:ext>
+              </a:extLst>
+            </p:cNvPr>
+            <p:cNvSpPr/>
+            <p:nvPr/>
+          </p:nvSpPr>
+          <p:spPr>
+            <a:xfrm>
+              <a:off x="4871935" y="5164017"/>
+              <a:ext cx="729762" cy="149469"/>
+            </a:xfrm>
+            <a:prstGeom prst="ellipse">
+              <a:avLst/>
+            </a:prstGeom>
+            <a:noFill/>
+            <a:ln>
+              <a:solidFill>
+                <a:srgbClr val="FF0000"/>
+              </a:solidFill>
+            </a:ln>
+          </p:spPr>
+          <p:style>
+            <a:lnRef idx="2">
+              <a:schemeClr val="accent2"/>
+            </a:lnRef>
+            <a:fillRef idx="1">
+              <a:schemeClr val="lt1"/>
+            </a:fillRef>
+            <a:effectRef idx="0">
+              <a:schemeClr val="accent2"/>
+            </a:effectRef>
+            <a:fontRef idx="minor">
+              <a:schemeClr val="dk1"/>
+            </a:fontRef>
+          </p:style>
+          <p:txBody>
+            <a:bodyPr rtlCol="0" anchor="ctr"/>
+            <a:lstStyle/>
+            <a:p>
+              <a:pPr algn="ctr"/>
+              <a:endParaRPr lang="en-US"/>
+            </a:p>
+          </p:txBody>
+        </p:sp>
+        <p:sp>
+          <p:nvSpPr>
+            <p:cNvPr id="24" name="Oval 23">
+              <a:extLst>
+                <a:ext uri="{FF2B5EF4-FFF2-40B4-BE49-F238E27FC236}">
+                  <a16:creationId xmlns:a16="http://schemas.microsoft.com/office/drawing/2014/main" id="{D112344D-1119-4ABA-B01A-A14E822DFD13}"/>
+                </a:ext>
+              </a:extLst>
+            </p:cNvPr>
+            <p:cNvSpPr/>
+            <p:nvPr/>
+          </p:nvSpPr>
+          <p:spPr>
+            <a:xfrm>
+              <a:off x="4370771" y="6011008"/>
+              <a:ext cx="1368180" cy="284284"/>
+            </a:xfrm>
+            <a:prstGeom prst="ellipse">
+              <a:avLst/>
+            </a:prstGeom>
+            <a:noFill/>
+            <a:ln>
+              <a:solidFill>
+                <a:srgbClr val="FF0000"/>
+              </a:solidFill>
+            </a:ln>
+          </p:spPr>
+          <p:style>
+            <a:lnRef idx="2">
+              <a:schemeClr val="accent2"/>
+            </a:lnRef>
+            <a:fillRef idx="1">
+              <a:schemeClr val="lt1"/>
+            </a:fillRef>
+            <a:effectRef idx="0">
+              <a:schemeClr val="accent2"/>
+            </a:effectRef>
+            <a:fontRef idx="minor">
+              <a:schemeClr val="dk1"/>
+            </a:fontRef>
+          </p:style>
+          <p:txBody>
+            <a:bodyPr rtlCol="0" anchor="ctr"/>
+            <a:lstStyle/>
+            <a:p>
+              <a:pPr algn="ctr"/>
+              <a:endParaRPr lang="en-US"/>
+            </a:p>
+          </p:txBody>
+        </p:sp>
+        <p:sp>
+          <p:nvSpPr>
+            <p:cNvPr id="38" name="Oval 37">
+              <a:extLst>
+                <a:ext uri="{FF2B5EF4-FFF2-40B4-BE49-F238E27FC236}">
+                  <a16:creationId xmlns:a16="http://schemas.microsoft.com/office/drawing/2014/main" id="{264B2965-CAC8-4B18-B132-476A8D154F7F}"/>
+                </a:ext>
+              </a:extLst>
+            </p:cNvPr>
+            <p:cNvSpPr/>
+            <p:nvPr/>
+          </p:nvSpPr>
+          <p:spPr>
+            <a:xfrm>
+              <a:off x="4602915" y="1469779"/>
+              <a:ext cx="998781" cy="149469"/>
+            </a:xfrm>
+            <a:prstGeom prst="ellipse">
+              <a:avLst/>
+            </a:prstGeom>
+            <a:noFill/>
+            <a:ln>
+              <a:solidFill>
+                <a:srgbClr val="FF0000"/>
+              </a:solidFill>
+            </a:ln>
+          </p:spPr>
+          <p:style>
+            <a:lnRef idx="2">
+              <a:schemeClr val="accent2"/>
+            </a:lnRef>
+            <a:fillRef idx="1">
+              <a:schemeClr val="lt1"/>
+            </a:fillRef>
+            <a:effectRef idx="0">
+              <a:schemeClr val="accent2"/>
+            </a:effectRef>
+            <a:fontRef idx="minor">
+              <a:schemeClr val="dk1"/>
+            </a:fontRef>
+          </p:style>
+          <p:txBody>
+            <a:bodyPr rtlCol="0" anchor="ctr"/>
+            <a:lstStyle/>
+            <a:p>
+              <a:pPr algn="ctr"/>
+              <a:endParaRPr lang="en-US"/>
+            </a:p>
+          </p:txBody>
+        </p:sp>
+        <p:sp>
+          <p:nvSpPr>
+            <p:cNvPr id="40" name="Oval 39">
+              <a:extLst>
+                <a:ext uri="{FF2B5EF4-FFF2-40B4-BE49-F238E27FC236}">
+                  <a16:creationId xmlns:a16="http://schemas.microsoft.com/office/drawing/2014/main" id="{E76D6EF6-FABA-4D2A-9BD0-9E4A15335AC4}"/>
+                </a:ext>
+              </a:extLst>
+            </p:cNvPr>
+            <p:cNvSpPr/>
+            <p:nvPr/>
+          </p:nvSpPr>
+          <p:spPr>
+            <a:xfrm>
+              <a:off x="3275938" y="1837595"/>
+              <a:ext cx="2325758" cy="257900"/>
+            </a:xfrm>
+            <a:prstGeom prst="ellipse">
+              <a:avLst/>
+            </a:prstGeom>
+            <a:noFill/>
+            <a:ln>
+              <a:solidFill>
+                <a:srgbClr val="FF0000"/>
+              </a:solidFill>
+            </a:ln>
+          </p:spPr>
+          <p:style>
+            <a:lnRef idx="2">
+              <a:schemeClr val="accent2"/>
+            </a:lnRef>
+            <a:fillRef idx="1">
+              <a:schemeClr val="lt1"/>
+            </a:fillRef>
+            <a:effectRef idx="0">
+              <a:schemeClr val="accent2"/>
+            </a:effectRef>
+            <a:fontRef idx="minor">
+              <a:schemeClr val="dk1"/>
+            </a:fontRef>
+          </p:style>
+          <p:txBody>
+            <a:bodyPr rtlCol="0" anchor="ctr"/>
+            <a:lstStyle/>
+            <a:p>
+              <a:pPr algn="ctr"/>
+              <a:endParaRPr lang="en-US"/>
+            </a:p>
+          </p:txBody>
+        </p:sp>
+      </p:grpSp>
+      <p:pic>
+        <p:nvPicPr>
+          <p:cNvPr id="42" name="Picture 41" descr="Text, letter&#10;&#10;Description automatically generated">
+            <a:extLst>
+              <a:ext uri="{FF2B5EF4-FFF2-40B4-BE49-F238E27FC236}">
+                <a16:creationId xmlns:a16="http://schemas.microsoft.com/office/drawing/2014/main" id="{1F8E46BA-7DA3-4EF7-9D59-C475B09071CD}"/>
+              </a:ext>
+            </a:extLst>
+          </p:cNvPr>
+          <p:cNvPicPr>
+            <a:picLocks noChangeAspect="1"/>
+          </p:cNvPicPr>
+          <p:nvPr/>
+        </p:nvPicPr>
+        <p:blipFill>
+          <a:blip r:embed="rId4">
+            <a:extLst>
+              <a:ext uri="{28A0092B-C50C-407E-A947-70E740481C1C}">
+                <a14:useLocalDpi xmlns:a14="http://schemas.microsoft.com/office/drawing/2010/main" val="0"/>
+              </a:ext>
+            </a:extLst>
+          </a:blip>
+          <a:stretch>
+            <a:fillRect/>
+          </a:stretch>
+        </p:blipFill>
+        <p:spPr>
+          <a:xfrm>
+            <a:off x="6179108" y="1732693"/>
+            <a:ext cx="3972479" cy="1924319"/>
+          </a:xfrm>
+          <a:prstGeom prst="rect">
+            <a:avLst/>
+          </a:prstGeom>
+        </p:spPr>
+      </p:pic>
+      <p:grpSp>
+        <p:nvGrpSpPr>
+          <p:cNvPr id="43" name="Group 42">
+            <a:extLst>
+              <a:ext uri="{FF2B5EF4-FFF2-40B4-BE49-F238E27FC236}">
+                <a16:creationId xmlns:a16="http://schemas.microsoft.com/office/drawing/2014/main" id="{5DFF62B8-FC9F-498B-9033-E09B5C03B5DF}"/>
+              </a:ext>
+            </a:extLst>
+          </p:cNvPr>
+          <p:cNvGrpSpPr/>
+          <p:nvPr/>
+        </p:nvGrpSpPr>
+        <p:grpSpPr>
+          <a:xfrm>
+            <a:off x="4738977" y="3838083"/>
+            <a:ext cx="7363853" cy="1876687"/>
+            <a:chOff x="96797" y="4476816"/>
+            <a:chExt cx="7363853" cy="1876687"/>
+          </a:xfrm>
+        </p:grpSpPr>
+        <p:pic>
+          <p:nvPicPr>
+            <p:cNvPr id="44" name="Picture 43" descr="Text, letter&#10;&#10;Description automatically generated">
+              <a:extLst>
+                <a:ext uri="{FF2B5EF4-FFF2-40B4-BE49-F238E27FC236}">
+                  <a16:creationId xmlns:a16="http://schemas.microsoft.com/office/drawing/2014/main" id="{42CDE696-8AD6-4647-9C8A-B5153FEA3B6B}"/>
+                </a:ext>
+              </a:extLst>
+            </p:cNvPr>
+            <p:cNvPicPr>
+              <a:picLocks noChangeAspect="1"/>
+            </p:cNvPicPr>
+            <p:nvPr/>
+          </p:nvPicPr>
+          <p:blipFill>
+            <a:blip r:embed="rId5">
+              <a:extLst>
+                <a:ext uri="{28A0092B-C50C-407E-A947-70E740481C1C}">
+                  <a14:useLocalDpi xmlns:a14="http://schemas.microsoft.com/office/drawing/2010/main" val="0"/>
+                </a:ext>
+              </a:extLst>
+            </a:blip>
+            <a:stretch>
+              <a:fillRect/>
+            </a:stretch>
+          </p:blipFill>
+          <p:spPr>
+            <a:xfrm>
+              <a:off x="96797" y="4476816"/>
+              <a:ext cx="7363853" cy="1876687"/>
+            </a:xfrm>
+            <a:prstGeom prst="rect">
+              <a:avLst/>
+            </a:prstGeom>
+          </p:spPr>
+        </p:pic>
+        <p:sp>
+          <p:nvSpPr>
+            <p:cNvPr id="45" name="Oval 44">
+              <a:extLst>
+                <a:ext uri="{FF2B5EF4-FFF2-40B4-BE49-F238E27FC236}">
+                  <a16:creationId xmlns:a16="http://schemas.microsoft.com/office/drawing/2014/main" id="{3D5A5D23-EE43-4873-A3BE-55CD51BDF7F9}"/>
+                </a:ext>
+              </a:extLst>
+            </p:cNvPr>
+            <p:cNvSpPr/>
+            <p:nvPr/>
+          </p:nvSpPr>
+          <p:spPr>
+            <a:xfrm>
+              <a:off x="228177" y="5616856"/>
+              <a:ext cx="1368180" cy="687223"/>
+            </a:xfrm>
+            <a:prstGeom prst="ellipse">
+              <a:avLst/>
+            </a:prstGeom>
+            <a:noFill/>
+            <a:ln>
+              <a:solidFill>
+                <a:srgbClr val="FF0000"/>
+              </a:solidFill>
+            </a:ln>
+          </p:spPr>
+          <p:style>
+            <a:lnRef idx="2">
+              <a:schemeClr val="accent2"/>
+            </a:lnRef>
+            <a:fillRef idx="1">
+              <a:schemeClr val="lt1"/>
+            </a:fillRef>
+            <a:effectRef idx="0">
+              <a:schemeClr val="accent2"/>
+            </a:effectRef>
+            <a:fontRef idx="minor">
+              <a:schemeClr val="dk1"/>
+            </a:fontRef>
+          </p:style>
+          <p:txBody>
+            <a:bodyPr rtlCol="0" anchor="ctr"/>
+            <a:lstStyle/>
+            <a:p>
+              <a:pPr algn="ctr"/>
+              <a:endParaRPr lang="en-US"/>
+            </a:p>
+          </p:txBody>
+        </p:sp>
+      </p:grpSp>
+      <p:pic>
+        <p:nvPicPr>
+          <p:cNvPr id="46" name="Picture 45" descr="Text, letter&#10;&#10;Description automatically generated">
+            <a:extLst>
+              <a:ext uri="{FF2B5EF4-FFF2-40B4-BE49-F238E27FC236}">
+                <a16:creationId xmlns:a16="http://schemas.microsoft.com/office/drawing/2014/main" id="{C4BB25A7-B6E1-4759-BA7C-CC4B022D02DF}"/>
+              </a:ext>
+            </a:extLst>
+          </p:cNvPr>
+          <p:cNvPicPr>
+            <a:picLocks noChangeAspect="1"/>
+          </p:cNvPicPr>
+          <p:nvPr/>
+        </p:nvPicPr>
+        <p:blipFill>
+          <a:blip r:embed="rId6">
+            <a:extLst>
+              <a:ext uri="{28A0092B-C50C-407E-A947-70E740481C1C}">
+                <a14:useLocalDpi xmlns:a14="http://schemas.microsoft.com/office/drawing/2010/main" val="0"/>
+              </a:ext>
+            </a:extLst>
+          </a:blip>
+          <a:stretch>
+            <a:fillRect/>
+          </a:stretch>
+        </p:blipFill>
+        <p:spPr>
+          <a:xfrm>
+            <a:off x="6179108" y="81956"/>
+            <a:ext cx="2943636" cy="1524213"/>
+          </a:xfrm>
+          <a:prstGeom prst="rect">
+            <a:avLst/>
+          </a:prstGeom>
+        </p:spPr>
+      </p:pic>
     </p:spTree>
     <p:extLst>
       <p:ext uri="{BB962C8B-B14F-4D97-AF65-F5344CB8AC3E}">
-        <p14:creationId xmlns:p14="http://schemas.microsoft.com/office/powerpoint/2010/main" val="119832519"/>
+        <p14:creationId xmlns:p14="http://schemas.microsoft.com/office/powerpoint/2010/main" val="2861659902"/>
+      </p:ext>
+    </p:extLst>
+  </p:cSld>
+  <p:clrMapOvr>
+    <a:masterClrMapping/>
+  </p:clrMapOvr>
+</p:sld>
+</file>
+
+<file path=ppt/slides/slide8.xml><?xml version="1.0" encoding="utf-8"?>
+<p:sld xmlns:a="http://schemas.openxmlformats.org/drawingml/2006/main" xmlns:r="http://schemas.openxmlformats.org/officeDocument/2006/relationships" xmlns:p="http://schemas.openxmlformats.org/presentationml/2006/main">
+  <p:cSld>
+    <p:spTree>
+      <p:nvGrpSpPr>
+        <p:cNvPr id="1" name=""/>
+        <p:cNvGrpSpPr/>
+        <p:nvPr/>
+      </p:nvGrpSpPr>
+      <p:grpSpPr>
+        <a:xfrm>
+          <a:off x="0" y="0"/>
+          <a:ext cx="0" cy="0"/>
+          <a:chOff x="0" y="0"/>
+          <a:chExt cx="0" cy="0"/>
+        </a:xfrm>
+      </p:grpSpPr>
+      <p:grpSp>
+        <p:nvGrpSpPr>
+          <p:cNvPr id="30" name="Group 29">
+            <a:extLst>
+              <a:ext uri="{FF2B5EF4-FFF2-40B4-BE49-F238E27FC236}">
+                <a16:creationId xmlns:a16="http://schemas.microsoft.com/office/drawing/2014/main" id="{69E84CBD-1727-4A08-AFC3-927A606DF3FD}"/>
+              </a:ext>
+            </a:extLst>
+          </p:cNvPr>
+          <p:cNvGrpSpPr/>
+          <p:nvPr/>
+        </p:nvGrpSpPr>
+        <p:grpSpPr>
+          <a:xfrm>
+            <a:off x="2975958" y="2143910"/>
+            <a:ext cx="5563376" cy="4486901"/>
+            <a:chOff x="5656096" y="2143910"/>
+            <a:chExt cx="5563376" cy="4486901"/>
+          </a:xfrm>
+        </p:grpSpPr>
+        <p:pic>
+          <p:nvPicPr>
+            <p:cNvPr id="13" name="Picture 12" descr="Table&#10;&#10;Description automatically generated">
+              <a:extLst>
+                <a:ext uri="{FF2B5EF4-FFF2-40B4-BE49-F238E27FC236}">
+                  <a16:creationId xmlns:a16="http://schemas.microsoft.com/office/drawing/2014/main" id="{3111600D-CA85-4817-AEB1-A65EFBCE78D7}"/>
+                </a:ext>
+              </a:extLst>
+            </p:cNvPr>
+            <p:cNvPicPr>
+              <a:picLocks noChangeAspect="1"/>
+            </p:cNvPicPr>
+            <p:nvPr/>
+          </p:nvPicPr>
+          <p:blipFill>
+            <a:blip r:embed="rId2">
+              <a:extLst>
+                <a:ext uri="{28A0092B-C50C-407E-A947-70E740481C1C}">
+                  <a14:useLocalDpi xmlns:a14="http://schemas.microsoft.com/office/drawing/2010/main" val="0"/>
+                </a:ext>
+              </a:extLst>
+            </a:blip>
+            <a:stretch>
+              <a:fillRect/>
+            </a:stretch>
+          </p:blipFill>
+          <p:spPr>
+            <a:xfrm>
+              <a:off x="5656096" y="2143910"/>
+              <a:ext cx="5563376" cy="4486901"/>
+            </a:xfrm>
+            <a:prstGeom prst="rect">
+              <a:avLst/>
+            </a:prstGeom>
+          </p:spPr>
+        </p:pic>
+        <p:sp>
+          <p:nvSpPr>
+            <p:cNvPr id="14" name="Oval 13">
+              <a:extLst>
+                <a:ext uri="{FF2B5EF4-FFF2-40B4-BE49-F238E27FC236}">
+                  <a16:creationId xmlns:a16="http://schemas.microsoft.com/office/drawing/2014/main" id="{BD53E608-F3DB-4451-A56C-2FBB65221332}"/>
+                </a:ext>
+              </a:extLst>
+            </p:cNvPr>
+            <p:cNvSpPr/>
+            <p:nvPr/>
+          </p:nvSpPr>
+          <p:spPr>
+            <a:xfrm>
+              <a:off x="6931270" y="3616569"/>
+              <a:ext cx="911468" cy="172916"/>
+            </a:xfrm>
+            <a:prstGeom prst="ellipse">
+              <a:avLst/>
+            </a:prstGeom>
+            <a:noFill/>
+            <a:ln>
+              <a:solidFill>
+                <a:srgbClr val="FF0000"/>
+              </a:solidFill>
+            </a:ln>
+          </p:spPr>
+          <p:style>
+            <a:lnRef idx="2">
+              <a:schemeClr val="accent2"/>
+            </a:lnRef>
+            <a:fillRef idx="1">
+              <a:schemeClr val="lt1"/>
+            </a:fillRef>
+            <a:effectRef idx="0">
+              <a:schemeClr val="accent2"/>
+            </a:effectRef>
+            <a:fontRef idx="minor">
+              <a:schemeClr val="dk1"/>
+            </a:fontRef>
+          </p:style>
+          <p:txBody>
+            <a:bodyPr rtlCol="0" anchor="ctr"/>
+            <a:lstStyle/>
+            <a:p>
+              <a:pPr algn="ctr"/>
+              <a:endParaRPr lang="en-US"/>
+            </a:p>
+          </p:txBody>
+        </p:sp>
+        <p:sp>
+          <p:nvSpPr>
+            <p:cNvPr id="15" name="Oval 14">
+              <a:extLst>
+                <a:ext uri="{FF2B5EF4-FFF2-40B4-BE49-F238E27FC236}">
+                  <a16:creationId xmlns:a16="http://schemas.microsoft.com/office/drawing/2014/main" id="{42B62A08-BD74-43E9-9AFC-D7B42E9540A5}"/>
+                </a:ext>
+              </a:extLst>
+            </p:cNvPr>
+            <p:cNvSpPr/>
+            <p:nvPr/>
+          </p:nvSpPr>
+          <p:spPr>
+            <a:xfrm>
+              <a:off x="6714392" y="6011008"/>
+              <a:ext cx="1128345" cy="172916"/>
+            </a:xfrm>
+            <a:prstGeom prst="ellipse">
+              <a:avLst/>
+            </a:prstGeom>
+            <a:noFill/>
+            <a:ln>
+              <a:solidFill>
+                <a:srgbClr val="FF0000"/>
+              </a:solidFill>
+            </a:ln>
+          </p:spPr>
+          <p:style>
+            <a:lnRef idx="2">
+              <a:schemeClr val="accent2"/>
+            </a:lnRef>
+            <a:fillRef idx="1">
+              <a:schemeClr val="lt1"/>
+            </a:fillRef>
+            <a:effectRef idx="0">
+              <a:schemeClr val="accent2"/>
+            </a:effectRef>
+            <a:fontRef idx="minor">
+              <a:schemeClr val="dk1"/>
+            </a:fontRef>
+          </p:style>
+          <p:txBody>
+            <a:bodyPr rtlCol="0" anchor="ctr"/>
+            <a:lstStyle/>
+            <a:p>
+              <a:pPr algn="ctr"/>
+              <a:endParaRPr lang="en-US"/>
+            </a:p>
+          </p:txBody>
+        </p:sp>
+        <p:sp>
+          <p:nvSpPr>
+            <p:cNvPr id="17" name="Oval 16">
+              <a:extLst>
+                <a:ext uri="{FF2B5EF4-FFF2-40B4-BE49-F238E27FC236}">
+                  <a16:creationId xmlns:a16="http://schemas.microsoft.com/office/drawing/2014/main" id="{23D427E3-335C-4B73-BF61-46954444F06C}"/>
+                </a:ext>
+              </a:extLst>
+            </p:cNvPr>
+            <p:cNvSpPr/>
+            <p:nvPr/>
+          </p:nvSpPr>
+          <p:spPr>
+            <a:xfrm>
+              <a:off x="6309945" y="6186853"/>
+              <a:ext cx="1532792" cy="172916"/>
+            </a:xfrm>
+            <a:prstGeom prst="ellipse">
+              <a:avLst/>
+            </a:prstGeom>
+            <a:noFill/>
+            <a:ln>
+              <a:solidFill>
+                <a:srgbClr val="FF0000"/>
+              </a:solidFill>
+            </a:ln>
+          </p:spPr>
+          <p:style>
+            <a:lnRef idx="2">
+              <a:schemeClr val="accent2"/>
+            </a:lnRef>
+            <a:fillRef idx="1">
+              <a:schemeClr val="lt1"/>
+            </a:fillRef>
+            <a:effectRef idx="0">
+              <a:schemeClr val="accent2"/>
+            </a:effectRef>
+            <a:fontRef idx="minor">
+              <a:schemeClr val="dk1"/>
+            </a:fontRef>
+          </p:style>
+          <p:txBody>
+            <a:bodyPr rtlCol="0" anchor="ctr"/>
+            <a:lstStyle/>
+            <a:p>
+              <a:pPr algn="ctr"/>
+              <a:endParaRPr lang="en-US"/>
+            </a:p>
+          </p:txBody>
+        </p:sp>
+        <p:sp>
+          <p:nvSpPr>
+            <p:cNvPr id="20" name="Oval 19">
+              <a:extLst>
+                <a:ext uri="{FF2B5EF4-FFF2-40B4-BE49-F238E27FC236}">
+                  <a16:creationId xmlns:a16="http://schemas.microsoft.com/office/drawing/2014/main" id="{50E166F9-9C8A-46F2-BF0B-21F7980F08FA}"/>
+                </a:ext>
+              </a:extLst>
+            </p:cNvPr>
+            <p:cNvSpPr/>
+            <p:nvPr/>
+          </p:nvSpPr>
+          <p:spPr>
+            <a:xfrm>
+              <a:off x="7083670" y="4973515"/>
+              <a:ext cx="911468" cy="172916"/>
+            </a:xfrm>
+            <a:prstGeom prst="ellipse">
+              <a:avLst/>
+            </a:prstGeom>
+            <a:noFill/>
+            <a:ln>
+              <a:solidFill>
+                <a:srgbClr val="FF0000"/>
+              </a:solidFill>
+            </a:ln>
+          </p:spPr>
+          <p:style>
+            <a:lnRef idx="2">
+              <a:schemeClr val="accent2"/>
+            </a:lnRef>
+            <a:fillRef idx="1">
+              <a:schemeClr val="lt1"/>
+            </a:fillRef>
+            <a:effectRef idx="0">
+              <a:schemeClr val="accent2"/>
+            </a:effectRef>
+            <a:fontRef idx="minor">
+              <a:schemeClr val="dk1"/>
+            </a:fontRef>
+          </p:style>
+          <p:txBody>
+            <a:bodyPr rtlCol="0" anchor="ctr"/>
+            <a:lstStyle/>
+            <a:p>
+              <a:pPr algn="ctr"/>
+              <a:endParaRPr lang="en-US"/>
+            </a:p>
+          </p:txBody>
+        </p:sp>
+      </p:grpSp>
+      <p:grpSp>
+        <p:nvGrpSpPr>
+          <p:cNvPr id="32" name="Group 31">
+            <a:extLst>
+              <a:ext uri="{FF2B5EF4-FFF2-40B4-BE49-F238E27FC236}">
+                <a16:creationId xmlns:a16="http://schemas.microsoft.com/office/drawing/2014/main" id="{3C2A89E6-5655-407B-A016-D85AF50ECC47}"/>
+              </a:ext>
+            </a:extLst>
+          </p:cNvPr>
+          <p:cNvGrpSpPr/>
+          <p:nvPr/>
+        </p:nvGrpSpPr>
+        <p:grpSpPr>
+          <a:xfrm>
+            <a:off x="2975958" y="0"/>
+            <a:ext cx="3419952" cy="1838582"/>
+            <a:chOff x="5656096" y="0"/>
+            <a:chExt cx="3419952" cy="1838582"/>
+          </a:xfrm>
+        </p:grpSpPr>
+        <p:pic>
+          <p:nvPicPr>
+            <p:cNvPr id="8" name="Picture 7" descr="Text, letter&#10;&#10;Description automatically generated">
+              <a:extLst>
+                <a:ext uri="{FF2B5EF4-FFF2-40B4-BE49-F238E27FC236}">
+                  <a16:creationId xmlns:a16="http://schemas.microsoft.com/office/drawing/2014/main" id="{3701AE51-4BD4-46F0-93CE-382BF8832386}"/>
+                </a:ext>
+              </a:extLst>
+            </p:cNvPr>
+            <p:cNvPicPr>
+              <a:picLocks noChangeAspect="1"/>
+            </p:cNvPicPr>
+            <p:nvPr/>
+          </p:nvPicPr>
+          <p:blipFill>
+            <a:blip r:embed="rId3">
+              <a:extLst>
+                <a:ext uri="{28A0092B-C50C-407E-A947-70E740481C1C}">
+                  <a14:useLocalDpi xmlns:a14="http://schemas.microsoft.com/office/drawing/2010/main" val="0"/>
+                </a:ext>
+              </a:extLst>
+            </a:blip>
+            <a:stretch>
+              <a:fillRect/>
+            </a:stretch>
+          </p:blipFill>
+          <p:spPr>
+            <a:xfrm>
+              <a:off x="5656096" y="0"/>
+              <a:ext cx="3419952" cy="1838582"/>
+            </a:xfrm>
+            <a:prstGeom prst="rect">
+              <a:avLst/>
+            </a:prstGeom>
+          </p:spPr>
+        </p:pic>
+        <p:sp>
+          <p:nvSpPr>
+            <p:cNvPr id="31" name="Oval 30">
+              <a:extLst>
+                <a:ext uri="{FF2B5EF4-FFF2-40B4-BE49-F238E27FC236}">
+                  <a16:creationId xmlns:a16="http://schemas.microsoft.com/office/drawing/2014/main" id="{A52930DA-6211-49FF-B454-8020CCB92F6C}"/>
+                </a:ext>
+              </a:extLst>
+            </p:cNvPr>
+            <p:cNvSpPr/>
+            <p:nvPr/>
+          </p:nvSpPr>
+          <p:spPr>
+            <a:xfrm>
+              <a:off x="5723530" y="1080241"/>
+              <a:ext cx="1172829" cy="758341"/>
+            </a:xfrm>
+            <a:prstGeom prst="ellipse">
+              <a:avLst/>
+            </a:prstGeom>
+            <a:noFill/>
+            <a:ln>
+              <a:solidFill>
+                <a:srgbClr val="FF0000"/>
+              </a:solidFill>
+            </a:ln>
+          </p:spPr>
+          <p:style>
+            <a:lnRef idx="2">
+              <a:schemeClr val="accent2"/>
+            </a:lnRef>
+            <a:fillRef idx="1">
+              <a:schemeClr val="lt1"/>
+            </a:fillRef>
+            <a:effectRef idx="0">
+              <a:schemeClr val="accent2"/>
+            </a:effectRef>
+            <a:fontRef idx="minor">
+              <a:schemeClr val="dk1"/>
+            </a:fontRef>
+          </p:style>
+          <p:txBody>
+            <a:bodyPr rtlCol="0" anchor="ctr"/>
+            <a:lstStyle/>
+            <a:p>
+              <a:pPr algn="ctr"/>
+              <a:endParaRPr lang="en-US"/>
+            </a:p>
+          </p:txBody>
+        </p:sp>
+      </p:grpSp>
+      <p:sp>
+        <p:nvSpPr>
+          <p:cNvPr id="18" name="TextBox 17">
+            <a:extLst>
+              <a:ext uri="{FF2B5EF4-FFF2-40B4-BE49-F238E27FC236}">
+                <a16:creationId xmlns:a16="http://schemas.microsoft.com/office/drawing/2014/main" id="{F9563EA6-4549-4CF2-955B-15BF87359787}"/>
+              </a:ext>
+            </a:extLst>
+          </p:cNvPr>
+          <p:cNvSpPr txBox="1"/>
+          <p:nvPr/>
+        </p:nvSpPr>
+        <p:spPr>
+          <a:xfrm>
+            <a:off x="7032026" y="0"/>
+            <a:ext cx="1532214" cy="646331"/>
+          </a:xfrm>
+          <a:prstGeom prst="rect">
+            <a:avLst/>
+          </a:prstGeom>
+          <a:noFill/>
+        </p:spPr>
+        <p:txBody>
+          <a:bodyPr wrap="none" rtlCol="0">
+            <a:spAutoFit/>
+          </a:bodyPr>
+          <a:lstStyle/>
+          <a:p>
+            <a:r>
+              <a:rPr lang="en-US" dirty="0"/>
+              <a:t>raw-DBS</a:t>
+            </a:r>
+          </a:p>
+          <a:p>
+            <a:r>
+              <a:rPr lang="en-US" dirty="0"/>
+              <a:t>raw-</a:t>
+            </a:r>
+            <a:r>
+              <a:rPr lang="en-US" dirty="0" err="1"/>
+              <a:t>utahArray</a:t>
+            </a:r>
+            <a:endParaRPr lang="en-US" dirty="0"/>
+          </a:p>
+        </p:txBody>
+      </p:sp>
+      <p:sp>
+        <p:nvSpPr>
+          <p:cNvPr id="19" name="TextBox 18">
+            <a:extLst>
+              <a:ext uri="{FF2B5EF4-FFF2-40B4-BE49-F238E27FC236}">
+                <a16:creationId xmlns:a16="http://schemas.microsoft.com/office/drawing/2014/main" id="{BA44FB20-BA2C-4B5F-ADDE-F38F41A7DF6B}"/>
+              </a:ext>
+            </a:extLst>
+          </p:cNvPr>
+          <p:cNvSpPr txBox="1"/>
+          <p:nvPr/>
+        </p:nvSpPr>
+        <p:spPr>
+          <a:xfrm>
+            <a:off x="7032026" y="804468"/>
+            <a:ext cx="2525591" cy="923330"/>
+          </a:xfrm>
+          <a:prstGeom prst="rect">
+            <a:avLst/>
+          </a:prstGeom>
+          <a:noFill/>
+        </p:spPr>
+        <p:txBody>
+          <a:bodyPr wrap="square">
+            <a:spAutoFit/>
+          </a:bodyPr>
+          <a:lstStyle/>
+          <a:p>
+            <a:r>
+              <a:rPr lang="en-US" dirty="0"/>
+              <a:t> UDLP(9272996), UMCX/UPMC(9272995)</a:t>
+            </a:r>
+          </a:p>
+          <a:p>
+            <a:r>
+              <a:rPr lang="en-US" dirty="0"/>
+              <a:t> DBS*(9271296)</a:t>
+            </a:r>
+          </a:p>
+        </p:txBody>
+      </p:sp>
+    </p:spTree>
+    <p:extLst>
+      <p:ext uri="{BB962C8B-B14F-4D97-AF65-F5344CB8AC3E}">
+        <p14:creationId xmlns:p14="http://schemas.microsoft.com/office/powerpoint/2010/main" val="822829289"/>
+      </p:ext>
+    </p:extLst>
+  </p:cSld>
+  <p:clrMapOvr>
+    <a:masterClrMapping/>
+  </p:clrMapOvr>
+</p:sld>
+</file>
+
+<file path=ppt/slides/slide9.xml><?xml version="1.0" encoding="utf-8"?>
+<p:sld xmlns:a="http://schemas.openxmlformats.org/drawingml/2006/main" xmlns:r="http://schemas.openxmlformats.org/officeDocument/2006/relationships" xmlns:p="http://schemas.openxmlformats.org/presentationml/2006/main">
+  <p:cSld>
+    <p:spTree>
+      <p:nvGrpSpPr>
+        <p:cNvPr id="1" name=""/>
+        <p:cNvGrpSpPr/>
+        <p:nvPr/>
+      </p:nvGrpSpPr>
+      <p:grpSpPr>
+        <a:xfrm>
+          <a:off x="0" y="0"/>
+          <a:ext cx="0" cy="0"/>
+          <a:chOff x="0" y="0"/>
+          <a:chExt cx="0" cy="0"/>
+        </a:xfrm>
+      </p:grpSpPr>
+      <p:grpSp>
+        <p:nvGrpSpPr>
+          <p:cNvPr id="9" name="Group 8">
+            <a:extLst>
+              <a:ext uri="{FF2B5EF4-FFF2-40B4-BE49-F238E27FC236}">
+                <a16:creationId xmlns:a16="http://schemas.microsoft.com/office/drawing/2014/main" id="{4D62A68A-D52D-4CF5-A3CD-5B8486D268D2}"/>
+              </a:ext>
+            </a:extLst>
+          </p:cNvPr>
+          <p:cNvGrpSpPr/>
+          <p:nvPr/>
+        </p:nvGrpSpPr>
+        <p:grpSpPr>
+          <a:xfrm>
+            <a:off x="7879018" y="0"/>
+            <a:ext cx="3953427" cy="5315692"/>
+            <a:chOff x="5544048" y="130664"/>
+            <a:chExt cx="3953427" cy="5315692"/>
+          </a:xfrm>
+        </p:grpSpPr>
+        <p:pic>
+          <p:nvPicPr>
+            <p:cNvPr id="7" name="Picture 6" descr="A picture containing table&#10;&#10;Description automatically generated">
+              <a:extLst>
+                <a:ext uri="{FF2B5EF4-FFF2-40B4-BE49-F238E27FC236}">
+                  <a16:creationId xmlns:a16="http://schemas.microsoft.com/office/drawing/2014/main" id="{5DCD4D7B-E82D-46E2-B582-F442830A24A7}"/>
+                </a:ext>
+              </a:extLst>
+            </p:cNvPr>
+            <p:cNvPicPr>
+              <a:picLocks noChangeAspect="1"/>
+            </p:cNvPicPr>
+            <p:nvPr/>
+          </p:nvPicPr>
+          <p:blipFill>
+            <a:blip r:embed="rId2">
+              <a:extLst>
+                <a:ext uri="{28A0092B-C50C-407E-A947-70E740481C1C}">
+                  <a14:useLocalDpi xmlns:a14="http://schemas.microsoft.com/office/drawing/2010/main" val="0"/>
+                </a:ext>
+              </a:extLst>
+            </a:blip>
+            <a:stretch>
+              <a:fillRect/>
+            </a:stretch>
+          </p:blipFill>
+          <p:spPr>
+            <a:xfrm>
+              <a:off x="5544048" y="130664"/>
+              <a:ext cx="3953427" cy="5315692"/>
+            </a:xfrm>
+            <a:prstGeom prst="rect">
+              <a:avLst/>
+            </a:prstGeom>
+          </p:spPr>
+        </p:pic>
+        <p:sp>
+          <p:nvSpPr>
+            <p:cNvPr id="8" name="TextBox 7">
+              <a:extLst>
+                <a:ext uri="{FF2B5EF4-FFF2-40B4-BE49-F238E27FC236}">
+                  <a16:creationId xmlns:a16="http://schemas.microsoft.com/office/drawing/2014/main" id="{D27593B4-C16A-4658-A1B6-4FEE45FC2FFF}"/>
+                </a:ext>
+              </a:extLst>
+            </p:cNvPr>
+            <p:cNvSpPr txBox="1"/>
+            <p:nvPr/>
+          </p:nvSpPr>
+          <p:spPr>
+            <a:xfrm>
+              <a:off x="6379326" y="2228193"/>
+              <a:ext cx="2282869" cy="646331"/>
+            </a:xfrm>
+            <a:prstGeom prst="rect">
+              <a:avLst/>
+            </a:prstGeom>
+            <a:noFill/>
+          </p:spPr>
+          <p:txBody>
+            <a:bodyPr wrap="none" rtlCol="0">
+              <a:spAutoFit/>
+            </a:bodyPr>
+            <a:lstStyle/>
+            <a:p>
+              <a:r>
+                <a:rPr lang="en-US" dirty="0">
+                  <a:solidFill>
+                    <a:srgbClr val="FF0000"/>
+                  </a:solidFill>
+                </a:rPr>
+                <a:t>Row number of</a:t>
+              </a:r>
+            </a:p>
+            <a:p>
+              <a:r>
+                <a:rPr lang="en-US" dirty="0">
+                  <a:solidFill>
+                    <a:srgbClr val="FF0000"/>
+                  </a:solidFill>
+                </a:rPr>
+                <a:t> actual electrode table</a:t>
+              </a:r>
+            </a:p>
+          </p:txBody>
+        </p:sp>
+      </p:grpSp>
+      <p:pic>
+        <p:nvPicPr>
+          <p:cNvPr id="11" name="Picture 10" descr="Text, letter&#10;&#10;Description automatically generated">
+            <a:extLst>
+              <a:ext uri="{FF2B5EF4-FFF2-40B4-BE49-F238E27FC236}">
+                <a16:creationId xmlns:a16="http://schemas.microsoft.com/office/drawing/2014/main" id="{2A4711CD-5166-4B15-8AE1-78C8257498F3}"/>
+              </a:ext>
+            </a:extLst>
+          </p:cNvPr>
+          <p:cNvPicPr>
+            <a:picLocks noChangeAspect="1"/>
+          </p:cNvPicPr>
+          <p:nvPr/>
+        </p:nvPicPr>
+        <p:blipFill>
+          <a:blip r:embed="rId3">
+            <a:extLst>
+              <a:ext uri="{28A0092B-C50C-407E-A947-70E740481C1C}">
+                <a14:useLocalDpi xmlns:a14="http://schemas.microsoft.com/office/drawing/2010/main" val="0"/>
+              </a:ext>
+            </a:extLst>
+          </a:blip>
+          <a:stretch>
+            <a:fillRect/>
+          </a:stretch>
+        </p:blipFill>
+        <p:spPr>
+          <a:xfrm>
+            <a:off x="58692" y="2789383"/>
+            <a:ext cx="4105848" cy="1276528"/>
+          </a:xfrm>
+          <a:prstGeom prst="rect">
+            <a:avLst/>
+          </a:prstGeom>
+        </p:spPr>
+      </p:pic>
+      <p:grpSp>
+        <p:nvGrpSpPr>
+          <p:cNvPr id="13" name="Group 12">
+            <a:extLst>
+              <a:ext uri="{FF2B5EF4-FFF2-40B4-BE49-F238E27FC236}">
+                <a16:creationId xmlns:a16="http://schemas.microsoft.com/office/drawing/2014/main" id="{D5504DEB-BE2D-4550-99A2-37042B4DDF43}"/>
+              </a:ext>
+            </a:extLst>
+          </p:cNvPr>
+          <p:cNvGrpSpPr/>
+          <p:nvPr/>
+        </p:nvGrpSpPr>
+        <p:grpSpPr>
+          <a:xfrm>
+            <a:off x="96797" y="130664"/>
+            <a:ext cx="4067743" cy="1743318"/>
+            <a:chOff x="96797" y="130664"/>
+            <a:chExt cx="4067743" cy="1743318"/>
+          </a:xfrm>
+        </p:grpSpPr>
+        <p:pic>
+          <p:nvPicPr>
+            <p:cNvPr id="5" name="Picture 4" descr="Text&#10;&#10;Description automatically generated">
+              <a:extLst>
+                <a:ext uri="{FF2B5EF4-FFF2-40B4-BE49-F238E27FC236}">
+                  <a16:creationId xmlns:a16="http://schemas.microsoft.com/office/drawing/2014/main" id="{61C10F17-B97A-4C92-BDE3-D40A1913E1F7}"/>
+                </a:ext>
+              </a:extLst>
+            </p:cNvPr>
+            <p:cNvPicPr>
+              <a:picLocks noChangeAspect="1"/>
+            </p:cNvPicPr>
+            <p:nvPr/>
+          </p:nvPicPr>
+          <p:blipFill>
+            <a:blip r:embed="rId4">
+              <a:extLst>
+                <a:ext uri="{28A0092B-C50C-407E-A947-70E740481C1C}">
+                  <a14:useLocalDpi xmlns:a14="http://schemas.microsoft.com/office/drawing/2010/main" val="0"/>
+                </a:ext>
+              </a:extLst>
+            </a:blip>
+            <a:stretch>
+              <a:fillRect/>
+            </a:stretch>
+          </p:blipFill>
+          <p:spPr>
+            <a:xfrm>
+              <a:off x="96797" y="130664"/>
+              <a:ext cx="4067743" cy="1743318"/>
+            </a:xfrm>
+            <a:prstGeom prst="rect">
+              <a:avLst/>
+            </a:prstGeom>
+          </p:spPr>
+        </p:pic>
+        <p:sp>
+          <p:nvSpPr>
+            <p:cNvPr id="12" name="Oval 11">
+              <a:extLst>
+                <a:ext uri="{FF2B5EF4-FFF2-40B4-BE49-F238E27FC236}">
+                  <a16:creationId xmlns:a16="http://schemas.microsoft.com/office/drawing/2014/main" id="{7798286A-0E83-4B24-AF46-26F80BC60D3E}"/>
+                </a:ext>
+              </a:extLst>
+            </p:cNvPr>
+            <p:cNvSpPr/>
+            <p:nvPr/>
+          </p:nvSpPr>
+          <p:spPr>
+            <a:xfrm>
+              <a:off x="359555" y="1186759"/>
+              <a:ext cx="1368180" cy="687223"/>
+            </a:xfrm>
+            <a:prstGeom prst="ellipse">
+              <a:avLst/>
+            </a:prstGeom>
+            <a:noFill/>
+            <a:ln>
+              <a:solidFill>
+                <a:srgbClr val="FF0000"/>
+              </a:solidFill>
+            </a:ln>
+          </p:spPr>
+          <p:style>
+            <a:lnRef idx="2">
+              <a:schemeClr val="accent2"/>
+            </a:lnRef>
+            <a:fillRef idx="1">
+              <a:schemeClr val="lt1"/>
+            </a:fillRef>
+            <a:effectRef idx="0">
+              <a:schemeClr val="accent2"/>
+            </a:effectRef>
+            <a:fontRef idx="minor">
+              <a:schemeClr val="dk1"/>
+            </a:fontRef>
+          </p:style>
+          <p:txBody>
+            <a:bodyPr rtlCol="0" anchor="ctr"/>
+            <a:lstStyle/>
+            <a:p>
+              <a:pPr algn="ctr"/>
+              <a:endParaRPr lang="en-US"/>
+            </a:p>
+          </p:txBody>
+        </p:sp>
+      </p:grpSp>
+      <p:grpSp>
+        <p:nvGrpSpPr>
+          <p:cNvPr id="17" name="Group 16">
+            <a:extLst>
+              <a:ext uri="{FF2B5EF4-FFF2-40B4-BE49-F238E27FC236}">
+                <a16:creationId xmlns:a16="http://schemas.microsoft.com/office/drawing/2014/main" id="{2A28BD2D-58E5-43A5-8AE3-665A6A91E216}"/>
+              </a:ext>
+            </a:extLst>
+          </p:cNvPr>
+          <p:cNvGrpSpPr/>
+          <p:nvPr/>
+        </p:nvGrpSpPr>
+        <p:grpSpPr>
+          <a:xfrm>
+            <a:off x="96797" y="4476816"/>
+            <a:ext cx="7363853" cy="1876687"/>
+            <a:chOff x="96797" y="4476816"/>
+            <a:chExt cx="7363853" cy="1876687"/>
+          </a:xfrm>
+        </p:grpSpPr>
+        <p:pic>
+          <p:nvPicPr>
+            <p:cNvPr id="15" name="Picture 14" descr="Text, letter&#10;&#10;Description automatically generated">
+              <a:extLst>
+                <a:ext uri="{FF2B5EF4-FFF2-40B4-BE49-F238E27FC236}">
+                  <a16:creationId xmlns:a16="http://schemas.microsoft.com/office/drawing/2014/main" id="{663C0444-1D70-4005-8448-7A73224C1801}"/>
+                </a:ext>
+              </a:extLst>
+            </p:cNvPr>
+            <p:cNvPicPr>
+              <a:picLocks noChangeAspect="1"/>
+            </p:cNvPicPr>
+            <p:nvPr/>
+          </p:nvPicPr>
+          <p:blipFill>
+            <a:blip r:embed="rId5">
+              <a:extLst>
+                <a:ext uri="{28A0092B-C50C-407E-A947-70E740481C1C}">
+                  <a14:useLocalDpi xmlns:a14="http://schemas.microsoft.com/office/drawing/2010/main" val="0"/>
+                </a:ext>
+              </a:extLst>
+            </a:blip>
+            <a:stretch>
+              <a:fillRect/>
+            </a:stretch>
+          </p:blipFill>
+          <p:spPr>
+            <a:xfrm>
+              <a:off x="96797" y="4476816"/>
+              <a:ext cx="7363853" cy="1876687"/>
+            </a:xfrm>
+            <a:prstGeom prst="rect">
+              <a:avLst/>
+            </a:prstGeom>
+          </p:spPr>
+        </p:pic>
+        <p:sp>
+          <p:nvSpPr>
+            <p:cNvPr id="16" name="Oval 15">
+              <a:extLst>
+                <a:ext uri="{FF2B5EF4-FFF2-40B4-BE49-F238E27FC236}">
+                  <a16:creationId xmlns:a16="http://schemas.microsoft.com/office/drawing/2014/main" id="{61882AD9-DAF1-489F-B728-0A1C30D95ABE}"/>
+                </a:ext>
+              </a:extLst>
+            </p:cNvPr>
+            <p:cNvSpPr/>
+            <p:nvPr/>
+          </p:nvSpPr>
+          <p:spPr>
+            <a:xfrm>
+              <a:off x="228177" y="5616856"/>
+              <a:ext cx="1368180" cy="687223"/>
+            </a:xfrm>
+            <a:prstGeom prst="ellipse">
+              <a:avLst/>
+            </a:prstGeom>
+            <a:noFill/>
+            <a:ln>
+              <a:solidFill>
+                <a:srgbClr val="FF0000"/>
+              </a:solidFill>
+            </a:ln>
+          </p:spPr>
+          <p:style>
+            <a:lnRef idx="2">
+              <a:schemeClr val="accent2"/>
+            </a:lnRef>
+            <a:fillRef idx="1">
+              <a:schemeClr val="lt1"/>
+            </a:fillRef>
+            <a:effectRef idx="0">
+              <a:schemeClr val="accent2"/>
+            </a:effectRef>
+            <a:fontRef idx="minor">
+              <a:schemeClr val="dk1"/>
+            </a:fontRef>
+          </p:style>
+          <p:txBody>
+            <a:bodyPr rtlCol="0" anchor="ctr"/>
+            <a:lstStyle/>
+            <a:p>
+              <a:pPr algn="ctr"/>
+              <a:endParaRPr lang="en-US"/>
+            </a:p>
+          </p:txBody>
+        </p:sp>
+      </p:grpSp>
+    </p:spTree>
+    <p:extLst>
+      <p:ext uri="{BB962C8B-B14F-4D97-AF65-F5344CB8AC3E}">
+        <p14:creationId xmlns:p14="http://schemas.microsoft.com/office/powerpoint/2010/main" val="196408731"/>
       </p:ext>
     </p:extLst>
   </p:cSld>
@@ -4467,4 +7262,299 @@
     </a:ext>
   </a:extLst>
 </a:theme>
+</file>
+
+<file path=ppt/theme/theme2.xml><?xml version="1.0" encoding="utf-8"?>
+<a:theme xmlns:a="http://schemas.openxmlformats.org/drawingml/2006/main" name="Office Theme">
+  <a:themeElements>
+    <a:clrScheme name="Office">
+      <a:dk1>
+        <a:sysClr val="windowText" lastClr="000000"/>
+      </a:dk1>
+      <a:lt1>
+        <a:sysClr val="window" lastClr="FFFFFF"/>
+      </a:lt1>
+      <a:dk2>
+        <a:srgbClr val="44546A"/>
+      </a:dk2>
+      <a:lt2>
+        <a:srgbClr val="E7E6E6"/>
+      </a:lt2>
+      <a:accent1>
+        <a:srgbClr val="4472C4"/>
+      </a:accent1>
+      <a:accent2>
+        <a:srgbClr val="ED7D31"/>
+      </a:accent2>
+      <a:accent3>
+        <a:srgbClr val="A5A5A5"/>
+      </a:accent3>
+      <a:accent4>
+        <a:srgbClr val="FFC000"/>
+      </a:accent4>
+      <a:accent5>
+        <a:srgbClr val="5B9BD5"/>
+      </a:accent5>
+      <a:accent6>
+        <a:srgbClr val="70AD47"/>
+      </a:accent6>
+      <a:hlink>
+        <a:srgbClr val="0563C1"/>
+      </a:hlink>
+      <a:folHlink>
+        <a:srgbClr val="954F72"/>
+      </a:folHlink>
+    </a:clrScheme>
+    <a:fontScheme name="Office">
+      <a:majorFont>
+        <a:latin typeface="Calibri Light" panose="020F0302020204030204"/>
+        <a:ea typeface=""/>
+        <a:cs typeface=""/>
+        <a:font script="Jpan" typeface="游ゴシック Light"/>
+        <a:font script="Hang" typeface="맑은 고딕"/>
+        <a:font script="Hans" typeface="等线 Light"/>
+        <a:font script="Hant" typeface="新細明體"/>
+        <a:font script="Arab" typeface="Times New Roman"/>
+        <a:font script="Hebr" typeface="Times New Roman"/>
+        <a:font script="Thai" typeface="Angsana New"/>
+        <a:font script="Ethi" typeface="Nyala"/>
+        <a:font script="Beng" typeface="Vrinda"/>
+        <a:font script="Gujr" typeface="Shruti"/>
+        <a:font script="Khmr" typeface="MoolBoran"/>
+        <a:font script="Knda" typeface="Tunga"/>
+        <a:font script="Guru" typeface="Raavi"/>
+        <a:font script="Cans" typeface="Euphemia"/>
+        <a:font script="Cher" typeface="Plantagenet Cherokee"/>
+        <a:font script="Yiii" typeface="Microsoft Yi Baiti"/>
+        <a:font script="Tibt" typeface="Microsoft Himalaya"/>
+        <a:font script="Thaa" typeface="MV Boli"/>
+        <a:font script="Deva" typeface="Mangal"/>
+        <a:font script="Telu" typeface="Gautami"/>
+        <a:font script="Taml" typeface="Latha"/>
+        <a:font script="Syrc" typeface="Estrangelo Edessa"/>
+        <a:font script="Orya" typeface="Kalinga"/>
+        <a:font script="Mlym" typeface="Kartika"/>
+        <a:font script="Laoo" typeface="DokChampa"/>
+        <a:font script="Sinh" typeface="Iskoola Pota"/>
+        <a:font script="Mong" typeface="Mongolian Baiti"/>
+        <a:font script="Viet" typeface="Times New Roman"/>
+        <a:font script="Uigh" typeface="Microsoft Uighur"/>
+        <a:font script="Geor" typeface="Sylfaen"/>
+        <a:font script="Armn" typeface="Arial"/>
+        <a:font script="Bugi" typeface="Leelawadee UI"/>
+        <a:font script="Bopo" typeface="Microsoft JhengHei"/>
+        <a:font script="Java" typeface="Javanese Text"/>
+        <a:font script="Lisu" typeface="Segoe UI"/>
+        <a:font script="Mymr" typeface="Myanmar Text"/>
+        <a:font script="Nkoo" typeface="Ebrima"/>
+        <a:font script="Olck" typeface="Nirmala UI"/>
+        <a:font script="Osma" typeface="Ebrima"/>
+        <a:font script="Phag" typeface="Phagspa"/>
+        <a:font script="Syrn" typeface="Estrangelo Edessa"/>
+        <a:font script="Syrj" typeface="Estrangelo Edessa"/>
+        <a:font script="Syre" typeface="Estrangelo Edessa"/>
+        <a:font script="Sora" typeface="Nirmala UI"/>
+        <a:font script="Tale" typeface="Microsoft Tai Le"/>
+        <a:font script="Talu" typeface="Microsoft New Tai Lue"/>
+        <a:font script="Tfng" typeface="Ebrima"/>
+      </a:majorFont>
+      <a:minorFont>
+        <a:latin typeface="Calibri" panose="020F0502020204030204"/>
+        <a:ea typeface=""/>
+        <a:cs typeface=""/>
+        <a:font script="Jpan" typeface="游ゴシック"/>
+        <a:font script="Hang" typeface="맑은 고딕"/>
+        <a:font script="Hans" typeface="等线"/>
+        <a:font script="Hant" typeface="新細明體"/>
+        <a:font script="Arab" typeface="Arial"/>
+        <a:font script="Hebr" typeface="Arial"/>
+        <a:font script="Thai" typeface="Cordia New"/>
+        <a:font script="Ethi" typeface="Nyala"/>
+        <a:font script="Beng" typeface="Vrinda"/>
+        <a:font script="Gujr" typeface="Shruti"/>
+        <a:font script="Khmr" typeface="DaunPenh"/>
+        <a:font script="Knda" typeface="Tunga"/>
+        <a:font script="Guru" typeface="Raavi"/>
+        <a:font script="Cans" typeface="Euphemia"/>
+        <a:font script="Cher" typeface="Plantagenet Cherokee"/>
+        <a:font script="Yiii" typeface="Microsoft Yi Baiti"/>
+        <a:font script="Tibt" typeface="Microsoft Himalaya"/>
+        <a:font script="Thaa" typeface="MV Boli"/>
+        <a:font script="Deva" typeface="Mangal"/>
+        <a:font script="Telu" typeface="Gautami"/>
+        <a:font script="Taml" typeface="Latha"/>
+        <a:font script="Syrc" typeface="Estrangelo Edessa"/>
+        <a:font script="Orya" typeface="Kalinga"/>
+        <a:font script="Mlym" typeface="Kartika"/>
+        <a:font script="Laoo" typeface="DokChampa"/>
+        <a:font script="Sinh" typeface="Iskoola Pota"/>
+        <a:font script="Mong" typeface="Mongolian Baiti"/>
+        <a:font script="Viet" typeface="Arial"/>
+        <a:font script="Uigh" typeface="Microsoft Uighur"/>
+        <a:font script="Geor" typeface="Sylfaen"/>
+        <a:font script="Armn" typeface="Arial"/>
+        <a:font script="Bugi" typeface="Leelawadee UI"/>
+        <a:font script="Bopo" typeface="Microsoft JhengHei"/>
+        <a:font script="Java" typeface="Javanese Text"/>
+        <a:font script="Lisu" typeface="Segoe UI"/>
+        <a:font script="Mymr" typeface="Myanmar Text"/>
+        <a:font script="Nkoo" typeface="Ebrima"/>
+        <a:font script="Olck" typeface="Nirmala UI"/>
+        <a:font script="Osma" typeface="Ebrima"/>
+        <a:font script="Phag" typeface="Phagspa"/>
+        <a:font script="Syrn" typeface="Estrangelo Edessa"/>
+        <a:font script="Syrj" typeface="Estrangelo Edessa"/>
+        <a:font script="Syre" typeface="Estrangelo Edessa"/>
+        <a:font script="Sora" typeface="Nirmala UI"/>
+        <a:font script="Tale" typeface="Microsoft Tai Le"/>
+        <a:font script="Talu" typeface="Microsoft New Tai Lue"/>
+        <a:font script="Tfng" typeface="Ebrima"/>
+      </a:minorFont>
+    </a:fontScheme>
+    <a:fmtScheme name="Office">
+      <a:fillStyleLst>
+        <a:solidFill>
+          <a:schemeClr val="phClr"/>
+        </a:solidFill>
+        <a:gradFill rotWithShape="1">
+          <a:gsLst>
+            <a:gs pos="0">
+              <a:schemeClr val="phClr">
+                <a:lumMod val="110000"/>
+                <a:satMod val="105000"/>
+                <a:tint val="67000"/>
+              </a:schemeClr>
+            </a:gs>
+            <a:gs pos="50000">
+              <a:schemeClr val="phClr">
+                <a:lumMod val="105000"/>
+                <a:satMod val="103000"/>
+                <a:tint val="73000"/>
+              </a:schemeClr>
+            </a:gs>
+            <a:gs pos="100000">
+              <a:schemeClr val="phClr">
+                <a:lumMod val="105000"/>
+                <a:satMod val="109000"/>
+                <a:tint val="81000"/>
+              </a:schemeClr>
+            </a:gs>
+          </a:gsLst>
+          <a:lin ang="5400000" scaled="0"/>
+        </a:gradFill>
+        <a:gradFill rotWithShape="1">
+          <a:gsLst>
+            <a:gs pos="0">
+              <a:schemeClr val="phClr">
+                <a:satMod val="103000"/>
+                <a:lumMod val="102000"/>
+                <a:tint val="94000"/>
+              </a:schemeClr>
+            </a:gs>
+            <a:gs pos="50000">
+              <a:schemeClr val="phClr">
+                <a:satMod val="110000"/>
+                <a:lumMod val="100000"/>
+                <a:shade val="100000"/>
+              </a:schemeClr>
+            </a:gs>
+            <a:gs pos="100000">
+              <a:schemeClr val="phClr">
+                <a:lumMod val="99000"/>
+                <a:satMod val="120000"/>
+                <a:shade val="78000"/>
+              </a:schemeClr>
+            </a:gs>
+          </a:gsLst>
+          <a:lin ang="5400000" scaled="0"/>
+        </a:gradFill>
+      </a:fillStyleLst>
+      <a:lnStyleLst>
+        <a:ln w="6350" cap="flat" cmpd="sng" algn="ctr">
+          <a:solidFill>
+            <a:schemeClr val="phClr"/>
+          </a:solidFill>
+          <a:prstDash val="solid"/>
+          <a:miter lim="800000"/>
+        </a:ln>
+        <a:ln w="12700" cap="flat" cmpd="sng" algn="ctr">
+          <a:solidFill>
+            <a:schemeClr val="phClr"/>
+          </a:solidFill>
+          <a:prstDash val="solid"/>
+          <a:miter lim="800000"/>
+        </a:ln>
+        <a:ln w="19050" cap="flat" cmpd="sng" algn="ctr">
+          <a:solidFill>
+            <a:schemeClr val="phClr"/>
+          </a:solidFill>
+          <a:prstDash val="solid"/>
+          <a:miter lim="800000"/>
+        </a:ln>
+      </a:lnStyleLst>
+      <a:effectStyleLst>
+        <a:effectStyle>
+          <a:effectLst/>
+        </a:effectStyle>
+        <a:effectStyle>
+          <a:effectLst/>
+        </a:effectStyle>
+        <a:effectStyle>
+          <a:effectLst>
+            <a:outerShdw blurRad="57150" dist="19050" dir="5400000" algn="ctr" rotWithShape="0">
+              <a:srgbClr val="000000">
+                <a:alpha val="63000"/>
+              </a:srgbClr>
+            </a:outerShdw>
+          </a:effectLst>
+        </a:effectStyle>
+      </a:effectStyleLst>
+      <a:bgFillStyleLst>
+        <a:solidFill>
+          <a:schemeClr val="phClr"/>
+        </a:solidFill>
+        <a:solidFill>
+          <a:schemeClr val="phClr">
+            <a:tint val="95000"/>
+            <a:satMod val="170000"/>
+          </a:schemeClr>
+        </a:solidFill>
+        <a:gradFill rotWithShape="1">
+          <a:gsLst>
+            <a:gs pos="0">
+              <a:schemeClr val="phClr">
+                <a:tint val="93000"/>
+                <a:satMod val="150000"/>
+                <a:shade val="98000"/>
+                <a:lumMod val="102000"/>
+              </a:schemeClr>
+            </a:gs>
+            <a:gs pos="50000">
+              <a:schemeClr val="phClr">
+                <a:tint val="98000"/>
+                <a:satMod val="130000"/>
+                <a:shade val="90000"/>
+                <a:lumMod val="103000"/>
+              </a:schemeClr>
+            </a:gs>
+            <a:gs pos="100000">
+              <a:schemeClr val="phClr">
+                <a:shade val="63000"/>
+                <a:satMod val="120000"/>
+              </a:schemeClr>
+            </a:gs>
+          </a:gsLst>
+          <a:lin ang="5400000" scaled="0"/>
+        </a:gradFill>
+      </a:bgFillStyleLst>
+    </a:fmtScheme>
+  </a:themeElements>
+  <a:objectDefaults/>
+  <a:extraClrSchemeLst/>
+  <a:extLst>
+    <a:ext uri="{05A4C25C-085E-4340-85A3-A5531E510DB2}">
+      <thm15:themeFamily xmlns:thm15="http://schemas.microsoft.com/office/thememl/2012/main" name="Office Theme" id="{62F939B6-93AF-4DB8-9C6B-D6C7DFDC589F}" vid="{4A3C46E8-61CC-4603-A589-7422A47A8E4A}"/>
+    </a:ext>
+  </a:extLst>
+</a:theme>
 </file>
</xml_diff>

<commit_message>
electrial series first dim should be time
</commit_message>
<xml_diff>
--- a/NWBUnderstanding.pptx
+++ b/NWBUnderstanding.pptx
@@ -5,7 +5,7 @@
     <p:sldMasterId id="2147483677" r:id="rId1"/>
   </p:sldMasterIdLst>
   <p:notesMasterIdLst>
-    <p:notesMasterId r:id="rId16"/>
+    <p:notesMasterId r:id="rId17"/>
   </p:notesMasterIdLst>
   <p:sldIdLst>
     <p:sldId id="256" r:id="rId2"/>
@@ -15,13 +15,14 @@
     <p:sldId id="257" r:id="rId6"/>
     <p:sldId id="259" r:id="rId7"/>
     <p:sldId id="265" r:id="rId8"/>
-    <p:sldId id="270" r:id="rId9"/>
-    <p:sldId id="266" r:id="rId10"/>
-    <p:sldId id="267" r:id="rId11"/>
-    <p:sldId id="268" r:id="rId12"/>
-    <p:sldId id="269" r:id="rId13"/>
-    <p:sldId id="264" r:id="rId14"/>
-    <p:sldId id="260" r:id="rId15"/>
+    <p:sldId id="271" r:id="rId9"/>
+    <p:sldId id="270" r:id="rId10"/>
+    <p:sldId id="266" r:id="rId11"/>
+    <p:sldId id="267" r:id="rId12"/>
+    <p:sldId id="268" r:id="rId13"/>
+    <p:sldId id="269" r:id="rId14"/>
+    <p:sldId id="264" r:id="rId15"/>
+    <p:sldId id="260" r:id="rId16"/>
   </p:sldIdLst>
   <p:sldSz cx="12192000" cy="6858000"/>
   <p:notesSz cx="6858000" cy="9144000"/>
@@ -533,55 +534,6 @@
           <a:bodyPr/>
           <a:lstStyle/>
           <a:p>
-            <a:r>
-              <a:rPr lang="en-US" dirty="0">
-                <a:effectLst/>
-                <a:latin typeface="Helvetica" panose="020B0604020202020204" pitchFamily="34" charset="0"/>
-              </a:rPr>
-              <a:t>The date is stored in UTC with local </a:t>
-            </a:r>
-            <a:r>
-              <a:rPr lang="en-US" dirty="0" err="1">
-                <a:effectLst/>
-                <a:latin typeface="Helvetica" panose="020B0604020202020204" pitchFamily="34" charset="0"/>
-              </a:rPr>
-              <a:t>timezone</a:t>
-            </a:r>
-            <a:r>
-              <a:rPr lang="en-US" dirty="0">
-                <a:effectLst/>
-                <a:latin typeface="Helvetica" panose="020B0604020202020204" pitchFamily="34" charset="0"/>
-              </a:rPr>
-              <a:t> offset as ISO 8601 extended formatted strings: 2018-09-28T14:43:54.123+02:00. Dates stored in UTC end in "Z" with no </a:t>
-            </a:r>
-            <a:r>
-              <a:rPr lang="en-US" dirty="0" err="1">
-                <a:effectLst/>
-                <a:latin typeface="Helvetica" panose="020B0604020202020204" pitchFamily="34" charset="0"/>
-              </a:rPr>
-              <a:t>timezone</a:t>
-            </a:r>
-            <a:r>
-              <a:rPr lang="en-US" dirty="0">
-                <a:effectLst/>
-                <a:latin typeface="Helvetica" panose="020B0604020202020204" pitchFamily="34" charset="0"/>
-              </a:rPr>
-              <a:t> offset. Date accuracy is up to milliseconds. The file can be created after the experiment was run, so this may differ from the experiment start time. Each modification to the </a:t>
-            </a:r>
-            <a:r>
-              <a:rPr lang="en-US" dirty="0" err="1">
-                <a:effectLst/>
-                <a:latin typeface="Helvetica" panose="020B0604020202020204" pitchFamily="34" charset="0"/>
-              </a:rPr>
-              <a:t>nwb</a:t>
-            </a:r>
-            <a:r>
-              <a:rPr lang="en-US" dirty="0">
-                <a:effectLst/>
-                <a:latin typeface="Helvetica" panose="020B0604020202020204" pitchFamily="34" charset="0"/>
-              </a:rPr>
-              <a:t> file adds a new entry to the array. </a:t>
-            </a:r>
             <a:endParaRPr lang="en-US" dirty="0"/>
           </a:p>
         </p:txBody>
@@ -613,6 +565,115 @@
     <p:extLst>
       <p:ext uri="{BB962C8B-B14F-4D97-AF65-F5344CB8AC3E}">
         <p14:creationId xmlns:p14="http://schemas.microsoft.com/office/powerpoint/2010/main" val="3717437781"/>
+      </p:ext>
+    </p:extLst>
+  </p:cSld>
+  <p:clrMapOvr>
+    <a:masterClrMapping/>
+  </p:clrMapOvr>
+</p:notes>
+</file>
+
+<file path=ppt/notesSlides/notesSlide2.xml><?xml version="1.0" encoding="utf-8"?>
+<p:notes xmlns:a="http://schemas.openxmlformats.org/drawingml/2006/main" xmlns:r="http://schemas.openxmlformats.org/officeDocument/2006/relationships" xmlns:p="http://schemas.openxmlformats.org/presentationml/2006/main">
+  <p:cSld>
+    <p:spTree>
+      <p:nvGrpSpPr>
+        <p:cNvPr id="1" name=""/>
+        <p:cNvGrpSpPr/>
+        <p:nvPr/>
+      </p:nvGrpSpPr>
+      <p:grpSpPr>
+        <a:xfrm>
+          <a:off x="0" y="0"/>
+          <a:ext cx="0" cy="0"/>
+          <a:chOff x="0" y="0"/>
+          <a:chExt cx="0" cy="0"/>
+        </a:xfrm>
+      </p:grpSpPr>
+      <p:sp>
+        <p:nvSpPr>
+          <p:cNvPr id="2" name="Slide Image Placeholder 1"/>
+          <p:cNvSpPr>
+            <a:spLocks noGrp="1" noRot="1" noChangeAspect="1"/>
+          </p:cNvSpPr>
+          <p:nvPr>
+            <p:ph type="sldImg"/>
+          </p:nvPr>
+        </p:nvSpPr>
+        <p:spPr/>
+      </p:sp>
+      <p:sp>
+        <p:nvSpPr>
+          <p:cNvPr id="3" name="Notes Placeholder 2"/>
+          <p:cNvSpPr>
+            <a:spLocks noGrp="1"/>
+          </p:cNvSpPr>
+          <p:nvPr>
+            <p:ph type="body" idx="1"/>
+          </p:nvPr>
+        </p:nvSpPr>
+        <p:spPr/>
+        <p:txBody>
+          <a:bodyPr/>
+          <a:lstStyle/>
+          <a:p>
+            <a:r>
+              <a:rPr lang="en-US" dirty="0"/>
+              <a:t>DBS Lead: Heraeus</a:t>
+            </a:r>
+          </a:p>
+          <a:p>
+            <a:endParaRPr lang="en-US" dirty="0"/>
+          </a:p>
+          <a:p>
+            <a:r>
+              <a:rPr lang="en-US" dirty="0"/>
+              <a:t>Utah Array:  Blackrock</a:t>
+            </a:r>
+          </a:p>
+          <a:p>
+            <a:endParaRPr lang="en-US" dirty="0"/>
+          </a:p>
+          <a:p>
+            <a:r>
+              <a:rPr lang="en-US" dirty="0" err="1"/>
+              <a:t>GrayMatter</a:t>
+            </a:r>
+            <a:r>
+              <a:rPr lang="en-US" dirty="0"/>
+              <a:t>: gray matter research</a:t>
+            </a:r>
+          </a:p>
+        </p:txBody>
+      </p:sp>
+      <p:sp>
+        <p:nvSpPr>
+          <p:cNvPr id="4" name="Slide Number Placeholder 3"/>
+          <p:cNvSpPr>
+            <a:spLocks noGrp="1"/>
+          </p:cNvSpPr>
+          <p:nvPr>
+            <p:ph type="sldNum" sz="quarter" idx="5"/>
+          </p:nvPr>
+        </p:nvSpPr>
+        <p:spPr/>
+        <p:txBody>
+          <a:bodyPr/>
+          <a:lstStyle/>
+          <a:p>
+            <a:fld id="{7FE6DA44-B752-445D-9EA6-65C8A9719224}" type="slidenum">
+              <a:rPr lang="en-US" smtClean="0"/>
+              <a:t>13</a:t>
+            </a:fld>
+            <a:endParaRPr lang="en-US"/>
+          </a:p>
+        </p:txBody>
+      </p:sp>
+    </p:spTree>
+    <p:extLst>
+      <p:ext uri="{BB962C8B-B14F-4D97-AF65-F5344CB8AC3E}">
+        <p14:creationId xmlns:p14="http://schemas.microsoft.com/office/powerpoint/2010/main" val="1350183761"/>
       </p:ext>
     </p:extLst>
   </p:cSld>
@@ -3916,6 +3977,678 @@
           <a:chExt cx="0" cy="0"/>
         </a:xfrm>
       </p:grpSpPr>
+      <p:grpSp>
+        <p:nvGrpSpPr>
+          <p:cNvPr id="9" name="Group 8">
+            <a:extLst>
+              <a:ext uri="{FF2B5EF4-FFF2-40B4-BE49-F238E27FC236}">
+                <a16:creationId xmlns:a16="http://schemas.microsoft.com/office/drawing/2014/main" id="{4D62A68A-D52D-4CF5-A3CD-5B8486D268D2}"/>
+              </a:ext>
+            </a:extLst>
+          </p:cNvPr>
+          <p:cNvGrpSpPr/>
+          <p:nvPr/>
+        </p:nvGrpSpPr>
+        <p:grpSpPr>
+          <a:xfrm>
+            <a:off x="7879018" y="0"/>
+            <a:ext cx="3953427" cy="2543503"/>
+            <a:chOff x="5544048" y="130664"/>
+            <a:chExt cx="3953427" cy="2543503"/>
+          </a:xfrm>
+        </p:grpSpPr>
+        <p:pic>
+          <p:nvPicPr>
+            <p:cNvPr id="7" name="Picture 6" descr="A picture containing table&#10;&#10;Description automatically generated">
+              <a:extLst>
+                <a:ext uri="{FF2B5EF4-FFF2-40B4-BE49-F238E27FC236}">
+                  <a16:creationId xmlns:a16="http://schemas.microsoft.com/office/drawing/2014/main" id="{5DCD4D7B-E82D-46E2-B582-F442830A24A7}"/>
+                </a:ext>
+              </a:extLst>
+            </p:cNvPr>
+            <p:cNvPicPr>
+              <a:picLocks noChangeAspect="1"/>
+            </p:cNvPicPr>
+            <p:nvPr/>
+          </p:nvPicPr>
+          <p:blipFill rotWithShape="1">
+            <a:blip r:embed="rId2">
+              <a:extLst>
+                <a:ext uri="{28A0092B-C50C-407E-A947-70E740481C1C}">
+                  <a14:useLocalDpi xmlns:a14="http://schemas.microsoft.com/office/drawing/2010/main" val="0"/>
+                </a:ext>
+              </a:extLst>
+            </a:blip>
+            <a:srcRect b="52151"/>
+            <a:stretch/>
+          </p:blipFill>
+          <p:spPr>
+            <a:xfrm>
+              <a:off x="5544048" y="130664"/>
+              <a:ext cx="3953427" cy="2543503"/>
+            </a:xfrm>
+            <a:prstGeom prst="rect">
+              <a:avLst/>
+            </a:prstGeom>
+          </p:spPr>
+        </p:pic>
+        <p:sp>
+          <p:nvSpPr>
+            <p:cNvPr id="8" name="TextBox 7">
+              <a:extLst>
+                <a:ext uri="{FF2B5EF4-FFF2-40B4-BE49-F238E27FC236}">
+                  <a16:creationId xmlns:a16="http://schemas.microsoft.com/office/drawing/2014/main" id="{D27593B4-C16A-4658-A1B6-4FEE45FC2FFF}"/>
+                </a:ext>
+              </a:extLst>
+            </p:cNvPr>
+            <p:cNvSpPr txBox="1"/>
+            <p:nvPr/>
+          </p:nvSpPr>
+          <p:spPr>
+            <a:xfrm>
+              <a:off x="6492577" y="1079249"/>
+              <a:ext cx="2282869" cy="646331"/>
+            </a:xfrm>
+            <a:prstGeom prst="rect">
+              <a:avLst/>
+            </a:prstGeom>
+            <a:noFill/>
+          </p:spPr>
+          <p:txBody>
+            <a:bodyPr wrap="none" rtlCol="0">
+              <a:spAutoFit/>
+            </a:bodyPr>
+            <a:lstStyle/>
+            <a:p>
+              <a:r>
+                <a:rPr lang="en-US" dirty="0">
+                  <a:solidFill>
+                    <a:srgbClr val="FF0000"/>
+                  </a:solidFill>
+                </a:rPr>
+                <a:t>Row number of</a:t>
+              </a:r>
+            </a:p>
+            <a:p>
+              <a:r>
+                <a:rPr lang="en-US" dirty="0">
+                  <a:solidFill>
+                    <a:srgbClr val="FF0000"/>
+                  </a:solidFill>
+                </a:rPr>
+                <a:t> actual electrode table</a:t>
+              </a:r>
+            </a:p>
+          </p:txBody>
+        </p:sp>
+      </p:grpSp>
+      <p:pic>
+        <p:nvPicPr>
+          <p:cNvPr id="11" name="Picture 10" descr="Text, letter&#10;&#10;Description automatically generated">
+            <a:extLst>
+              <a:ext uri="{FF2B5EF4-FFF2-40B4-BE49-F238E27FC236}">
+                <a16:creationId xmlns:a16="http://schemas.microsoft.com/office/drawing/2014/main" id="{2A4711CD-5166-4B15-8AE1-78C8257498F3}"/>
+              </a:ext>
+            </a:extLst>
+          </p:cNvPr>
+          <p:cNvPicPr>
+            <a:picLocks noChangeAspect="1"/>
+          </p:cNvPicPr>
+          <p:nvPr/>
+        </p:nvPicPr>
+        <p:blipFill>
+          <a:blip r:embed="rId3">
+            <a:extLst>
+              <a:ext uri="{28A0092B-C50C-407E-A947-70E740481C1C}">
+                <a14:useLocalDpi xmlns:a14="http://schemas.microsoft.com/office/drawing/2010/main" val="0"/>
+              </a:ext>
+            </a:extLst>
+          </a:blip>
+          <a:stretch>
+            <a:fillRect/>
+          </a:stretch>
+        </p:blipFill>
+        <p:spPr>
+          <a:xfrm>
+            <a:off x="58692" y="2789383"/>
+            <a:ext cx="4105848" cy="1276528"/>
+          </a:xfrm>
+          <a:prstGeom prst="rect">
+            <a:avLst/>
+          </a:prstGeom>
+        </p:spPr>
+      </p:pic>
+      <p:grpSp>
+        <p:nvGrpSpPr>
+          <p:cNvPr id="13" name="Group 12">
+            <a:extLst>
+              <a:ext uri="{FF2B5EF4-FFF2-40B4-BE49-F238E27FC236}">
+                <a16:creationId xmlns:a16="http://schemas.microsoft.com/office/drawing/2014/main" id="{D5504DEB-BE2D-4550-99A2-37042B4DDF43}"/>
+              </a:ext>
+            </a:extLst>
+          </p:cNvPr>
+          <p:cNvGrpSpPr/>
+          <p:nvPr/>
+        </p:nvGrpSpPr>
+        <p:grpSpPr>
+          <a:xfrm>
+            <a:off x="96797" y="130664"/>
+            <a:ext cx="4067743" cy="1743318"/>
+            <a:chOff x="96797" y="130664"/>
+            <a:chExt cx="4067743" cy="1743318"/>
+          </a:xfrm>
+        </p:grpSpPr>
+        <p:pic>
+          <p:nvPicPr>
+            <p:cNvPr id="5" name="Picture 4" descr="Text&#10;&#10;Description automatically generated">
+              <a:extLst>
+                <a:ext uri="{FF2B5EF4-FFF2-40B4-BE49-F238E27FC236}">
+                  <a16:creationId xmlns:a16="http://schemas.microsoft.com/office/drawing/2014/main" id="{61C10F17-B97A-4C92-BDE3-D40A1913E1F7}"/>
+                </a:ext>
+              </a:extLst>
+            </p:cNvPr>
+            <p:cNvPicPr>
+              <a:picLocks noChangeAspect="1"/>
+            </p:cNvPicPr>
+            <p:nvPr/>
+          </p:nvPicPr>
+          <p:blipFill>
+            <a:blip r:embed="rId4">
+              <a:extLst>
+                <a:ext uri="{28A0092B-C50C-407E-A947-70E740481C1C}">
+                  <a14:useLocalDpi xmlns:a14="http://schemas.microsoft.com/office/drawing/2010/main" val="0"/>
+                </a:ext>
+              </a:extLst>
+            </a:blip>
+            <a:stretch>
+              <a:fillRect/>
+            </a:stretch>
+          </p:blipFill>
+          <p:spPr>
+            <a:xfrm>
+              <a:off x="96797" y="130664"/>
+              <a:ext cx="4067743" cy="1743318"/>
+            </a:xfrm>
+            <a:prstGeom prst="rect">
+              <a:avLst/>
+            </a:prstGeom>
+          </p:spPr>
+        </p:pic>
+        <p:sp>
+          <p:nvSpPr>
+            <p:cNvPr id="12" name="Oval 11">
+              <a:extLst>
+                <a:ext uri="{FF2B5EF4-FFF2-40B4-BE49-F238E27FC236}">
+                  <a16:creationId xmlns:a16="http://schemas.microsoft.com/office/drawing/2014/main" id="{7798286A-0E83-4B24-AF46-26F80BC60D3E}"/>
+                </a:ext>
+              </a:extLst>
+            </p:cNvPr>
+            <p:cNvSpPr/>
+            <p:nvPr/>
+          </p:nvSpPr>
+          <p:spPr>
+            <a:xfrm>
+              <a:off x="359555" y="1186759"/>
+              <a:ext cx="1368180" cy="687223"/>
+            </a:xfrm>
+            <a:prstGeom prst="ellipse">
+              <a:avLst/>
+            </a:prstGeom>
+            <a:noFill/>
+            <a:ln>
+              <a:solidFill>
+                <a:srgbClr val="FF0000"/>
+              </a:solidFill>
+            </a:ln>
+          </p:spPr>
+          <p:style>
+            <a:lnRef idx="2">
+              <a:schemeClr val="accent2"/>
+            </a:lnRef>
+            <a:fillRef idx="1">
+              <a:schemeClr val="lt1"/>
+            </a:fillRef>
+            <a:effectRef idx="0">
+              <a:schemeClr val="accent2"/>
+            </a:effectRef>
+            <a:fontRef idx="minor">
+              <a:schemeClr val="dk1"/>
+            </a:fontRef>
+          </p:style>
+          <p:txBody>
+            <a:bodyPr rtlCol="0" anchor="ctr"/>
+            <a:lstStyle/>
+            <a:p>
+              <a:pPr algn="ctr"/>
+              <a:endParaRPr lang="en-US"/>
+            </a:p>
+          </p:txBody>
+        </p:sp>
+      </p:grpSp>
+      <p:grpSp>
+        <p:nvGrpSpPr>
+          <p:cNvPr id="17" name="Group 16">
+            <a:extLst>
+              <a:ext uri="{FF2B5EF4-FFF2-40B4-BE49-F238E27FC236}">
+                <a16:creationId xmlns:a16="http://schemas.microsoft.com/office/drawing/2014/main" id="{2A28BD2D-58E5-43A5-8AE3-665A6A91E216}"/>
+              </a:ext>
+            </a:extLst>
+          </p:cNvPr>
+          <p:cNvGrpSpPr/>
+          <p:nvPr/>
+        </p:nvGrpSpPr>
+        <p:grpSpPr>
+          <a:xfrm>
+            <a:off x="96797" y="4476816"/>
+            <a:ext cx="7363853" cy="1876687"/>
+            <a:chOff x="96797" y="4476816"/>
+            <a:chExt cx="7363853" cy="1876687"/>
+          </a:xfrm>
+        </p:grpSpPr>
+        <p:pic>
+          <p:nvPicPr>
+            <p:cNvPr id="15" name="Picture 14" descr="Text, letter&#10;&#10;Description automatically generated">
+              <a:extLst>
+                <a:ext uri="{FF2B5EF4-FFF2-40B4-BE49-F238E27FC236}">
+                  <a16:creationId xmlns:a16="http://schemas.microsoft.com/office/drawing/2014/main" id="{663C0444-1D70-4005-8448-7A73224C1801}"/>
+                </a:ext>
+              </a:extLst>
+            </p:cNvPr>
+            <p:cNvPicPr>
+              <a:picLocks noChangeAspect="1"/>
+            </p:cNvPicPr>
+            <p:nvPr/>
+          </p:nvPicPr>
+          <p:blipFill>
+            <a:blip r:embed="rId5">
+              <a:extLst>
+                <a:ext uri="{28A0092B-C50C-407E-A947-70E740481C1C}">
+                  <a14:useLocalDpi xmlns:a14="http://schemas.microsoft.com/office/drawing/2010/main" val="0"/>
+                </a:ext>
+              </a:extLst>
+            </a:blip>
+            <a:stretch>
+              <a:fillRect/>
+            </a:stretch>
+          </p:blipFill>
+          <p:spPr>
+            <a:xfrm>
+              <a:off x="96797" y="4476816"/>
+              <a:ext cx="7363853" cy="1876687"/>
+            </a:xfrm>
+            <a:prstGeom prst="rect">
+              <a:avLst/>
+            </a:prstGeom>
+          </p:spPr>
+        </p:pic>
+        <p:sp>
+          <p:nvSpPr>
+            <p:cNvPr id="16" name="Oval 15">
+              <a:extLst>
+                <a:ext uri="{FF2B5EF4-FFF2-40B4-BE49-F238E27FC236}">
+                  <a16:creationId xmlns:a16="http://schemas.microsoft.com/office/drawing/2014/main" id="{61882AD9-DAF1-489F-B728-0A1C30D95ABE}"/>
+                </a:ext>
+              </a:extLst>
+            </p:cNvPr>
+            <p:cNvSpPr/>
+            <p:nvPr/>
+          </p:nvSpPr>
+          <p:spPr>
+            <a:xfrm>
+              <a:off x="228177" y="5616856"/>
+              <a:ext cx="1368180" cy="687223"/>
+            </a:xfrm>
+            <a:prstGeom prst="ellipse">
+              <a:avLst/>
+            </a:prstGeom>
+            <a:noFill/>
+            <a:ln>
+              <a:solidFill>
+                <a:srgbClr val="FF0000"/>
+              </a:solidFill>
+            </a:ln>
+          </p:spPr>
+          <p:style>
+            <a:lnRef idx="2">
+              <a:schemeClr val="accent2"/>
+            </a:lnRef>
+            <a:fillRef idx="1">
+              <a:schemeClr val="lt1"/>
+            </a:fillRef>
+            <a:effectRef idx="0">
+              <a:schemeClr val="accent2"/>
+            </a:effectRef>
+            <a:fontRef idx="minor">
+              <a:schemeClr val="dk1"/>
+            </a:fontRef>
+          </p:style>
+          <p:txBody>
+            <a:bodyPr rtlCol="0" anchor="ctr"/>
+            <a:lstStyle/>
+            <a:p>
+              <a:pPr algn="ctr"/>
+              <a:endParaRPr lang="en-US"/>
+            </a:p>
+          </p:txBody>
+        </p:sp>
+      </p:grpSp>
+      <p:graphicFrame>
+        <p:nvGraphicFramePr>
+          <p:cNvPr id="18" name="Table 4">
+            <a:extLst>
+              <a:ext uri="{FF2B5EF4-FFF2-40B4-BE49-F238E27FC236}">
+                <a16:creationId xmlns:a16="http://schemas.microsoft.com/office/drawing/2014/main" id="{89142F04-780A-4B8B-930B-CDFE74ECA9DA}"/>
+              </a:ext>
+            </a:extLst>
+          </p:cNvPr>
+          <p:cNvGraphicFramePr>
+            <a:graphicFrameLocks noGrp="1"/>
+          </p:cNvGraphicFramePr>
+          <p:nvPr>
+            <p:extLst>
+              <p:ext uri="{D42A27DB-BD31-4B8C-83A1-F6EECF244321}">
+                <p14:modId xmlns:p14="http://schemas.microsoft.com/office/powerpoint/2010/main" val="2293143432"/>
+              </p:ext>
+            </p:extLst>
+          </p:nvPr>
+        </p:nvGraphicFramePr>
+        <p:xfrm>
+          <a:off x="5106140" y="2789383"/>
+          <a:ext cx="2708166" cy="1112520"/>
+        </p:xfrm>
+        <a:graphic>
+          <a:graphicData uri="http://schemas.openxmlformats.org/drawingml/2006/table">
+            <a:tbl>
+              <a:tblPr firstRow="1" bandRow="1">
+                <a:tableStyleId>{5C22544A-7EE6-4342-B048-85BDC9FD1C3A}</a:tableStyleId>
+              </a:tblPr>
+              <a:tblGrid>
+                <a:gridCol w="2708166">
+                  <a:extLst>
+                    <a:ext uri="{9D8B030D-6E8A-4147-A177-3AD203B41FA5}">
+                      <a16:colId xmlns:a16="http://schemas.microsoft.com/office/drawing/2014/main" val="481685055"/>
+                    </a:ext>
+                  </a:extLst>
+                </a:gridCol>
+              </a:tblGrid>
+              <a:tr h="370840">
+                <a:tc>
+                  <a:txBody>
+                    <a:bodyPr/>
+                    <a:lstStyle/>
+                    <a:p>
+                      <a:pPr algn="ctr"/>
+                      <a:r>
+                        <a:rPr lang="en-US" u="sng" dirty="0" err="1"/>
+                        <a:t>ElectricalSeries</a:t>
+                      </a:r>
+                      <a:endParaRPr lang="en-US" u="sng" dirty="0"/>
+                    </a:p>
+                  </a:txBody>
+                  <a:tcPr/>
+                </a:tc>
+                <a:extLst>
+                  <a:ext uri="{0D108BD9-81ED-4DB2-BD59-A6C34878D82A}">
+                    <a16:rowId xmlns:a16="http://schemas.microsoft.com/office/drawing/2014/main" val="3651904715"/>
+                  </a:ext>
+                </a:extLst>
+              </a:tr>
+              <a:tr h="370840">
+                <a:tc>
+                  <a:txBody>
+                    <a:bodyPr/>
+                    <a:lstStyle/>
+                    <a:p>
+                      <a:r>
+                        <a:rPr lang="en-US" dirty="0"/>
+                        <a:t>data [</a:t>
+                      </a:r>
+                      <a:r>
+                        <a:rPr lang="en-US" dirty="0" err="1"/>
+                        <a:t>ntimes</a:t>
+                      </a:r>
+                      <a:r>
+                        <a:rPr lang="en-US" dirty="0"/>
+                        <a:t>, </a:t>
+                      </a:r>
+                      <a:r>
+                        <a:rPr lang="en-US" dirty="0" err="1"/>
+                        <a:t>nchannels</a:t>
+                      </a:r>
+                      <a:r>
+                        <a:rPr lang="en-US" dirty="0"/>
+                        <a:t>]</a:t>
+                      </a:r>
+                    </a:p>
+                  </a:txBody>
+                  <a:tcPr/>
+                </a:tc>
+                <a:extLst>
+                  <a:ext uri="{0D108BD9-81ED-4DB2-BD59-A6C34878D82A}">
+                    <a16:rowId xmlns:a16="http://schemas.microsoft.com/office/drawing/2014/main" val="3992414402"/>
+                  </a:ext>
+                </a:extLst>
+              </a:tr>
+              <a:tr h="370840">
+                <a:tc>
+                  <a:txBody>
+                    <a:bodyPr/>
+                    <a:lstStyle/>
+                    <a:p>
+                      <a:r>
+                        <a:rPr lang="en-US" dirty="0"/>
+                        <a:t>electrodes</a:t>
+                      </a:r>
+                    </a:p>
+                  </a:txBody>
+                  <a:tcPr/>
+                </a:tc>
+                <a:extLst>
+                  <a:ext uri="{0D108BD9-81ED-4DB2-BD59-A6C34878D82A}">
+                    <a16:rowId xmlns:a16="http://schemas.microsoft.com/office/drawing/2014/main" val="2149915521"/>
+                  </a:ext>
+                </a:extLst>
+              </a:tr>
+            </a:tbl>
+          </a:graphicData>
+        </a:graphic>
+      </p:graphicFrame>
+      <p:graphicFrame>
+        <p:nvGraphicFramePr>
+          <p:cNvPr id="19" name="Table 4">
+            <a:extLst>
+              <a:ext uri="{FF2B5EF4-FFF2-40B4-BE49-F238E27FC236}">
+                <a16:creationId xmlns:a16="http://schemas.microsoft.com/office/drawing/2014/main" id="{B6835E98-DA9A-4760-9064-26370407FC96}"/>
+              </a:ext>
+            </a:extLst>
+          </p:cNvPr>
+          <p:cNvGraphicFramePr>
+            <a:graphicFrameLocks noGrp="1"/>
+          </p:cNvGraphicFramePr>
+          <p:nvPr>
+            <p:extLst>
+              <p:ext uri="{D42A27DB-BD31-4B8C-83A1-F6EECF244321}">
+                <p14:modId xmlns:p14="http://schemas.microsoft.com/office/powerpoint/2010/main" val="686786007"/>
+              </p:ext>
+            </p:extLst>
+          </p:nvPr>
+        </p:nvGraphicFramePr>
+        <p:xfrm>
+          <a:off x="8402250" y="3508444"/>
+          <a:ext cx="2708166" cy="1478280"/>
+        </p:xfrm>
+        <a:graphic>
+          <a:graphicData uri="http://schemas.openxmlformats.org/drawingml/2006/table">
+            <a:tbl>
+              <a:tblPr firstRow="1" bandRow="1">
+                <a:tableStyleId>{5C22544A-7EE6-4342-B048-85BDC9FD1C3A}</a:tableStyleId>
+              </a:tblPr>
+              <a:tblGrid>
+                <a:gridCol w="2708166">
+                  <a:extLst>
+                    <a:ext uri="{9D8B030D-6E8A-4147-A177-3AD203B41FA5}">
+                      <a16:colId xmlns:a16="http://schemas.microsoft.com/office/drawing/2014/main" val="481685055"/>
+                    </a:ext>
+                  </a:extLst>
+                </a:gridCol>
+              </a:tblGrid>
+              <a:tr h="0">
+                <a:tc>
+                  <a:txBody>
+                    <a:bodyPr/>
+                    <a:lstStyle/>
+                    <a:p>
+                      <a:pPr algn="ctr"/>
+                      <a:r>
+                        <a:rPr lang="en-US" u="sng" dirty="0" err="1"/>
+                        <a:t>DynamicTableRegion</a:t>
+                      </a:r>
+                      <a:endParaRPr lang="en-US" u="sng" dirty="0"/>
+                    </a:p>
+                  </a:txBody>
+                  <a:tcPr/>
+                </a:tc>
+                <a:extLst>
+                  <a:ext uri="{0D108BD9-81ED-4DB2-BD59-A6C34878D82A}">
+                    <a16:rowId xmlns:a16="http://schemas.microsoft.com/office/drawing/2014/main" val="3651904715"/>
+                  </a:ext>
+                </a:extLst>
+              </a:tr>
+              <a:tr h="370840">
+                <a:tc>
+                  <a:txBody>
+                    <a:bodyPr/>
+                    <a:lstStyle/>
+                    <a:p>
+                      <a:r>
+                        <a:rPr lang="en-US" dirty="0"/>
+                        <a:t>name=“electrodes”</a:t>
+                      </a:r>
+                    </a:p>
+                  </a:txBody>
+                  <a:tcPr/>
+                </a:tc>
+                <a:extLst>
+                  <a:ext uri="{0D108BD9-81ED-4DB2-BD59-A6C34878D82A}">
+                    <a16:rowId xmlns:a16="http://schemas.microsoft.com/office/drawing/2014/main" val="3992414402"/>
+                  </a:ext>
+                </a:extLst>
+              </a:tr>
+              <a:tr h="370840">
+                <a:tc>
+                  <a:txBody>
+                    <a:bodyPr/>
+                    <a:lstStyle/>
+                    <a:p>
+                      <a:r>
+                        <a:rPr lang="en-US" dirty="0"/>
+                        <a:t>table</a:t>
+                      </a:r>
+                    </a:p>
+                  </a:txBody>
+                  <a:tcPr/>
+                </a:tc>
+                <a:extLst>
+                  <a:ext uri="{0D108BD9-81ED-4DB2-BD59-A6C34878D82A}">
+                    <a16:rowId xmlns:a16="http://schemas.microsoft.com/office/drawing/2014/main" val="2149915521"/>
+                  </a:ext>
+                </a:extLst>
+              </a:tr>
+              <a:tr h="370840">
+                <a:tc>
+                  <a:txBody>
+                    <a:bodyPr/>
+                    <a:lstStyle/>
+                    <a:p>
+                      <a:r>
+                        <a:rPr lang="en-US" dirty="0"/>
+                        <a:t>id</a:t>
+                      </a:r>
+                    </a:p>
+                  </a:txBody>
+                  <a:tcPr/>
+                </a:tc>
+                <a:extLst>
+                  <a:ext uri="{0D108BD9-81ED-4DB2-BD59-A6C34878D82A}">
+                    <a16:rowId xmlns:a16="http://schemas.microsoft.com/office/drawing/2014/main" val="4292476579"/>
+                  </a:ext>
+                </a:extLst>
+              </a:tr>
+            </a:tbl>
+          </a:graphicData>
+        </a:graphic>
+      </p:graphicFrame>
+      <p:cxnSp>
+        <p:nvCxnSpPr>
+          <p:cNvPr id="22" name="Connector: Elbow 21">
+            <a:extLst>
+              <a:ext uri="{FF2B5EF4-FFF2-40B4-BE49-F238E27FC236}">
+                <a16:creationId xmlns:a16="http://schemas.microsoft.com/office/drawing/2014/main" id="{FEB6F467-DE02-4FDD-8CE3-0E8613DB783F}"/>
+              </a:ext>
+            </a:extLst>
+          </p:cNvPr>
+          <p:cNvCxnSpPr>
+            <a:cxnSpLocks/>
+          </p:cNvCxnSpPr>
+          <p:nvPr/>
+        </p:nvCxnSpPr>
+        <p:spPr>
+          <a:xfrm>
+            <a:off x="6947656" y="3647090"/>
+            <a:ext cx="1454594" cy="79814"/>
+          </a:xfrm>
+          <a:prstGeom prst="bentConnector3">
+            <a:avLst/>
+          </a:prstGeom>
+          <a:ln>
+            <a:tailEnd type="triangle"/>
+          </a:ln>
+        </p:spPr>
+        <p:style>
+          <a:lnRef idx="1">
+            <a:schemeClr val="accent1"/>
+          </a:lnRef>
+          <a:fillRef idx="0">
+            <a:schemeClr val="accent1"/>
+          </a:fillRef>
+          <a:effectRef idx="0">
+            <a:schemeClr val="accent1"/>
+          </a:effectRef>
+          <a:fontRef idx="minor">
+            <a:schemeClr val="tx1"/>
+          </a:fontRef>
+        </p:style>
+      </p:cxnSp>
+    </p:spTree>
+    <p:extLst>
+      <p:ext uri="{BB962C8B-B14F-4D97-AF65-F5344CB8AC3E}">
+        <p14:creationId xmlns:p14="http://schemas.microsoft.com/office/powerpoint/2010/main" val="196408731"/>
+      </p:ext>
+    </p:extLst>
+  </p:cSld>
+  <p:clrMapOvr>
+    <a:masterClrMapping/>
+  </p:clrMapOvr>
+</p:sld>
+</file>
+
+<file path=ppt/slides/slide11.xml><?xml version="1.0" encoding="utf-8"?>
+<p:sld xmlns:a="http://schemas.openxmlformats.org/drawingml/2006/main" xmlns:r="http://schemas.openxmlformats.org/officeDocument/2006/relationships" xmlns:p="http://schemas.openxmlformats.org/presentationml/2006/main">
+  <p:cSld>
+    <p:spTree>
+      <p:nvGrpSpPr>
+        <p:cNvPr id="1" name=""/>
+        <p:cNvGrpSpPr/>
+        <p:nvPr/>
+      </p:nvGrpSpPr>
+      <p:grpSpPr>
+        <a:xfrm>
+          <a:off x="0" y="0"/>
+          <a:ext cx="0" cy="0"/>
+          <a:chOff x="0" y="0"/>
+          <a:chExt cx="0" cy="0"/>
+        </a:xfrm>
+      </p:grpSpPr>
       <p:pic>
         <p:nvPicPr>
           <p:cNvPr id="5" name="Picture 4" descr="Text, letter&#10;&#10;Description automatically generated">
@@ -4108,7 +4841,7 @@
 </p:sld>
 </file>
 
-<file path=ppt/slides/slide11.xml><?xml version="1.0" encoding="utf-8"?>
+<file path=ppt/slides/slide12.xml><?xml version="1.0" encoding="utf-8"?>
 <p:sld xmlns:a="http://schemas.openxmlformats.org/drawingml/2006/main" xmlns:r="http://schemas.openxmlformats.org/officeDocument/2006/relationships" xmlns:p="http://schemas.openxmlformats.org/presentationml/2006/main">
   <p:cSld>
     <p:spTree>
@@ -4174,7 +4907,7 @@
 </p:sld>
 </file>
 
-<file path=ppt/slides/slide12.xml><?xml version="1.0" encoding="utf-8"?>
+<file path=ppt/slides/slide13.xml><?xml version="1.0" encoding="utf-8"?>
 <p:sld xmlns:a="http://schemas.openxmlformats.org/drawingml/2006/main" xmlns:r="http://schemas.openxmlformats.org/officeDocument/2006/relationships" xmlns:p="http://schemas.openxmlformats.org/presentationml/2006/main">
   <p:cSld>
     <p:spTree>
@@ -4206,7 +4939,7 @@
           <p:nvPr/>
         </p:nvPicPr>
         <p:blipFill>
-          <a:blip r:embed="rId2">
+          <a:blip r:embed="rId3">
             <a:extLst>
               <a:ext uri="{28A0092B-C50C-407E-A947-70E740481C1C}">
                 <a14:useLocalDpi xmlns:a14="http://schemas.microsoft.com/office/drawing/2010/main" val="0"/>
@@ -4242,7 +4975,7 @@
           <p:nvPr/>
         </p:nvPicPr>
         <p:blipFill>
-          <a:blip r:embed="rId3">
+          <a:blip r:embed="rId4">
             <a:extLst>
               <a:ext uri="{28A0092B-C50C-407E-A947-70E740481C1C}">
                 <a14:useLocalDpi xmlns:a14="http://schemas.microsoft.com/office/drawing/2010/main" val="0"/>
@@ -4278,7 +5011,7 @@
           <p:nvPr/>
         </p:nvPicPr>
         <p:blipFill>
-          <a:blip r:embed="rId4">
+          <a:blip r:embed="rId5">
             <a:extLst>
               <a:ext uri="{28A0092B-C50C-407E-A947-70E740481C1C}">
                 <a14:useLocalDpi xmlns:a14="http://schemas.microsoft.com/office/drawing/2010/main" val="0"/>
@@ -4314,7 +5047,7 @@
           <p:nvPr/>
         </p:nvPicPr>
         <p:blipFill>
-          <a:blip r:embed="rId5">
+          <a:blip r:embed="rId6">
             <a:extLst>
               <a:ext uri="{28A0092B-C50C-407E-A947-70E740481C1C}">
                 <a14:useLocalDpi xmlns:a14="http://schemas.microsoft.com/office/drawing/2010/main" val="0"/>
@@ -4350,7 +5083,7 @@
           <p:nvPr/>
         </p:nvPicPr>
         <p:blipFill>
-          <a:blip r:embed="rId6">
+          <a:blip r:embed="rId7">
             <a:extLst>
               <a:ext uri="{28A0092B-C50C-407E-A947-70E740481C1C}">
                 <a14:useLocalDpi xmlns:a14="http://schemas.microsoft.com/office/drawing/2010/main" val="0"/>
@@ -4386,7 +5119,7 @@
           <p:nvPr/>
         </p:nvPicPr>
         <p:blipFill>
-          <a:blip r:embed="rId7">
+          <a:blip r:embed="rId8">
             <a:extLst>
               <a:ext uri="{28A0092B-C50C-407E-A947-70E740481C1C}">
                 <a14:useLocalDpi xmlns:a14="http://schemas.microsoft.com/office/drawing/2010/main" val="0"/>
@@ -4420,7 +5153,7 @@
 </p:sld>
 </file>
 
-<file path=ppt/slides/slide13.xml><?xml version="1.0" encoding="utf-8"?>
+<file path=ppt/slides/slide14.xml><?xml version="1.0" encoding="utf-8"?>
 <p:sld xmlns:a="http://schemas.openxmlformats.org/drawingml/2006/main" xmlns:r="http://schemas.openxmlformats.org/officeDocument/2006/relationships" xmlns:p="http://schemas.openxmlformats.org/presentationml/2006/main">
   <p:cSld>
     <p:spTree>
@@ -4452,7 +5185,7 @@
           <p:nvPr>
             <p:extLst>
               <p:ext uri="{D42A27DB-BD31-4B8C-83A1-F6EECF244321}">
-                <p14:modId xmlns:p14="http://schemas.microsoft.com/office/powerpoint/2010/main" val="530128418"/>
+                <p14:modId xmlns:p14="http://schemas.microsoft.com/office/powerpoint/2010/main" val="2781763282"/>
               </p:ext>
             </p:extLst>
           </p:nvPr>
@@ -4491,7 +5224,7 @@
                     <a:p>
                       <a:r>
                         <a:rPr lang="en-US" sz="1600" b="1" dirty="0"/>
-                        <a:t>379.89s, 321 electrodes(UDLP96+UMCX96+UPMC96+DBSS12+DBSG12), 11.2G, </a:t>
+                        <a:t>379.89s, 312 electrodes(UDLP96+UMCX96+UPMC96+DBSS12+DBSG12), 11.2G, </a:t>
                       </a:r>
                       <a:r>
                         <a:rPr lang="en-US" sz="1600" b="1" kern="1200" dirty="0" err="1">
@@ -4807,7 +5540,7 @@
 </p:sld>
 </file>
 
-<file path=ppt/slides/slide14.xml><?xml version="1.0" encoding="utf-8"?>
+<file path=ppt/slides/slide15.xml><?xml version="1.0" encoding="utf-8"?>
 <p:sld xmlns:a="http://schemas.openxmlformats.org/drawingml/2006/main" xmlns:r="http://schemas.openxmlformats.org/officeDocument/2006/relationships" xmlns:p="http://schemas.openxmlformats.org/presentationml/2006/main">
   <p:cSld>
     <p:spTree>
@@ -5617,7 +6350,7 @@
         </p:nvGrpSpPr>
         <p:grpSpPr>
           <a:xfrm>
-            <a:off x="0" y="0"/>
+            <a:off x="127412" y="48479"/>
             <a:ext cx="5393318" cy="6858000"/>
             <a:chOff x="2401294" y="0"/>
             <a:chExt cx="5393318" cy="6858000"/>
@@ -5938,7 +6671,7 @@
         </p:blipFill>
         <p:spPr>
           <a:xfrm>
-            <a:off x="6179108" y="1732693"/>
+            <a:off x="6116416" y="2182461"/>
             <a:ext cx="3972479" cy="1924319"/>
           </a:xfrm>
           <a:prstGeom prst="rect">
@@ -5960,7 +6693,7 @@
         </p:nvGrpSpPr>
         <p:grpSpPr>
           <a:xfrm>
-            <a:off x="4738977" y="3838083"/>
+            <a:off x="4738977" y="4062967"/>
             <a:ext cx="7363853" cy="1876687"/>
             <a:chOff x="96797" y="4476816"/>
             <a:chExt cx="7363853" cy="1876687"/>
@@ -6081,7 +6814,7 @@
         </p:blipFill>
         <p:spPr>
           <a:xfrm>
-            <a:off x="6179108" y="81956"/>
+            <a:off x="9248364" y="205663"/>
             <a:ext cx="2943636" cy="1524213"/>
           </a:xfrm>
           <a:prstGeom prst="rect">
@@ -6089,42 +6822,12 @@
           </a:prstGeom>
         </p:spPr>
       </p:pic>
-    </p:spTree>
-    <p:extLst>
-      <p:ext uri="{BB962C8B-B14F-4D97-AF65-F5344CB8AC3E}">
-        <p14:creationId xmlns:p14="http://schemas.microsoft.com/office/powerpoint/2010/main" val="2861659902"/>
-      </p:ext>
-    </p:extLst>
-  </p:cSld>
-  <p:clrMapOvr>
-    <a:masterClrMapping/>
-  </p:clrMapOvr>
-</p:sld>
-</file>
-
-<file path=ppt/slides/slide8.xml><?xml version="1.0" encoding="utf-8"?>
-<p:sld xmlns:a="http://schemas.openxmlformats.org/drawingml/2006/main" xmlns:r="http://schemas.openxmlformats.org/officeDocument/2006/relationships" xmlns:p="http://schemas.openxmlformats.org/presentationml/2006/main">
-  <p:cSld>
-    <p:spTree>
-      <p:nvGrpSpPr>
-        <p:cNvPr id="1" name=""/>
-        <p:cNvGrpSpPr/>
-        <p:nvPr/>
-      </p:nvGrpSpPr>
-      <p:grpSpPr>
-        <a:xfrm>
-          <a:off x="0" y="0"/>
-          <a:ext cx="0" cy="0"/>
-          <a:chOff x="0" y="0"/>
-          <a:chExt cx="0" cy="0"/>
-        </a:xfrm>
-      </p:grpSpPr>
       <p:grpSp>
         <p:nvGrpSpPr>
-          <p:cNvPr id="30" name="Group 29">
-            <a:extLst>
-              <a:ext uri="{FF2B5EF4-FFF2-40B4-BE49-F238E27FC236}">
-                <a16:creationId xmlns:a16="http://schemas.microsoft.com/office/drawing/2014/main" id="{69E84CBD-1727-4A08-AFC3-927A606DF3FD}"/>
+          <p:cNvPr id="51" name="Group 50">
+            <a:extLst>
+              <a:ext uri="{FF2B5EF4-FFF2-40B4-BE49-F238E27FC236}">
+                <a16:creationId xmlns:a16="http://schemas.microsoft.com/office/drawing/2014/main" id="{2D527C4B-E24E-413F-9182-FEC96A3EAA14}"/>
               </a:ext>
             </a:extLst>
           </p:cNvPr>
@@ -6133,18 +6836,18 @@
         </p:nvGrpSpPr>
         <p:grpSpPr>
           <a:xfrm>
-            <a:off x="2975958" y="2143910"/>
-            <a:ext cx="5563376" cy="4486901"/>
-            <a:chOff x="5656096" y="2143910"/>
-            <a:chExt cx="5563376" cy="4486901"/>
+            <a:off x="5554447" y="48479"/>
+            <a:ext cx="3419952" cy="1838582"/>
+            <a:chOff x="5656096" y="0"/>
+            <a:chExt cx="3419952" cy="1838582"/>
           </a:xfrm>
         </p:grpSpPr>
         <p:pic>
           <p:nvPicPr>
-            <p:cNvPr id="13" name="Picture 12" descr="Table&#10;&#10;Description automatically generated">
+            <p:cNvPr id="52" name="Picture 51" descr="Text, letter&#10;&#10;Description automatically generated">
               <a:extLst>
                 <a:ext uri="{FF2B5EF4-FFF2-40B4-BE49-F238E27FC236}">
-                  <a16:creationId xmlns:a16="http://schemas.microsoft.com/office/drawing/2014/main" id="{3111600D-CA85-4817-AEB1-A65EFBCE78D7}"/>
+                  <a16:creationId xmlns:a16="http://schemas.microsoft.com/office/drawing/2014/main" id="{A331D527-17CA-4837-9E57-E79AF807DA05}"/>
                 </a:ext>
               </a:extLst>
             </p:cNvPr>
@@ -6154,264 +6857,7 @@
             <p:nvPr/>
           </p:nvPicPr>
           <p:blipFill>
-            <a:blip r:embed="rId2">
-              <a:extLst>
-                <a:ext uri="{28A0092B-C50C-407E-A947-70E740481C1C}">
-                  <a14:useLocalDpi xmlns:a14="http://schemas.microsoft.com/office/drawing/2010/main" val="0"/>
-                </a:ext>
-              </a:extLst>
-            </a:blip>
-            <a:stretch>
-              <a:fillRect/>
-            </a:stretch>
-          </p:blipFill>
-          <p:spPr>
-            <a:xfrm>
-              <a:off x="5656096" y="2143910"/>
-              <a:ext cx="5563376" cy="4486901"/>
-            </a:xfrm>
-            <a:prstGeom prst="rect">
-              <a:avLst/>
-            </a:prstGeom>
-          </p:spPr>
-        </p:pic>
-        <p:sp>
-          <p:nvSpPr>
-            <p:cNvPr id="14" name="Oval 13">
-              <a:extLst>
-                <a:ext uri="{FF2B5EF4-FFF2-40B4-BE49-F238E27FC236}">
-                  <a16:creationId xmlns:a16="http://schemas.microsoft.com/office/drawing/2014/main" id="{BD53E608-F3DB-4451-A56C-2FBB65221332}"/>
-                </a:ext>
-              </a:extLst>
-            </p:cNvPr>
-            <p:cNvSpPr/>
-            <p:nvPr/>
-          </p:nvSpPr>
-          <p:spPr>
-            <a:xfrm>
-              <a:off x="6931270" y="3616569"/>
-              <a:ext cx="911468" cy="172916"/>
-            </a:xfrm>
-            <a:prstGeom prst="ellipse">
-              <a:avLst/>
-            </a:prstGeom>
-            <a:noFill/>
-            <a:ln>
-              <a:solidFill>
-                <a:srgbClr val="FF0000"/>
-              </a:solidFill>
-            </a:ln>
-          </p:spPr>
-          <p:style>
-            <a:lnRef idx="2">
-              <a:schemeClr val="accent2"/>
-            </a:lnRef>
-            <a:fillRef idx="1">
-              <a:schemeClr val="lt1"/>
-            </a:fillRef>
-            <a:effectRef idx="0">
-              <a:schemeClr val="accent2"/>
-            </a:effectRef>
-            <a:fontRef idx="minor">
-              <a:schemeClr val="dk1"/>
-            </a:fontRef>
-          </p:style>
-          <p:txBody>
-            <a:bodyPr rtlCol="0" anchor="ctr"/>
-            <a:lstStyle/>
-            <a:p>
-              <a:pPr algn="ctr"/>
-              <a:endParaRPr lang="en-US"/>
-            </a:p>
-          </p:txBody>
-        </p:sp>
-        <p:sp>
-          <p:nvSpPr>
-            <p:cNvPr id="15" name="Oval 14">
-              <a:extLst>
-                <a:ext uri="{FF2B5EF4-FFF2-40B4-BE49-F238E27FC236}">
-                  <a16:creationId xmlns:a16="http://schemas.microsoft.com/office/drawing/2014/main" id="{42B62A08-BD74-43E9-9AFC-D7B42E9540A5}"/>
-                </a:ext>
-              </a:extLst>
-            </p:cNvPr>
-            <p:cNvSpPr/>
-            <p:nvPr/>
-          </p:nvSpPr>
-          <p:spPr>
-            <a:xfrm>
-              <a:off x="6714392" y="6011008"/>
-              <a:ext cx="1128345" cy="172916"/>
-            </a:xfrm>
-            <a:prstGeom prst="ellipse">
-              <a:avLst/>
-            </a:prstGeom>
-            <a:noFill/>
-            <a:ln>
-              <a:solidFill>
-                <a:srgbClr val="FF0000"/>
-              </a:solidFill>
-            </a:ln>
-          </p:spPr>
-          <p:style>
-            <a:lnRef idx="2">
-              <a:schemeClr val="accent2"/>
-            </a:lnRef>
-            <a:fillRef idx="1">
-              <a:schemeClr val="lt1"/>
-            </a:fillRef>
-            <a:effectRef idx="0">
-              <a:schemeClr val="accent2"/>
-            </a:effectRef>
-            <a:fontRef idx="minor">
-              <a:schemeClr val="dk1"/>
-            </a:fontRef>
-          </p:style>
-          <p:txBody>
-            <a:bodyPr rtlCol="0" anchor="ctr"/>
-            <a:lstStyle/>
-            <a:p>
-              <a:pPr algn="ctr"/>
-              <a:endParaRPr lang="en-US"/>
-            </a:p>
-          </p:txBody>
-        </p:sp>
-        <p:sp>
-          <p:nvSpPr>
-            <p:cNvPr id="17" name="Oval 16">
-              <a:extLst>
-                <a:ext uri="{FF2B5EF4-FFF2-40B4-BE49-F238E27FC236}">
-                  <a16:creationId xmlns:a16="http://schemas.microsoft.com/office/drawing/2014/main" id="{23D427E3-335C-4B73-BF61-46954444F06C}"/>
-                </a:ext>
-              </a:extLst>
-            </p:cNvPr>
-            <p:cNvSpPr/>
-            <p:nvPr/>
-          </p:nvSpPr>
-          <p:spPr>
-            <a:xfrm>
-              <a:off x="6309945" y="6186853"/>
-              <a:ext cx="1532792" cy="172916"/>
-            </a:xfrm>
-            <a:prstGeom prst="ellipse">
-              <a:avLst/>
-            </a:prstGeom>
-            <a:noFill/>
-            <a:ln>
-              <a:solidFill>
-                <a:srgbClr val="FF0000"/>
-              </a:solidFill>
-            </a:ln>
-          </p:spPr>
-          <p:style>
-            <a:lnRef idx="2">
-              <a:schemeClr val="accent2"/>
-            </a:lnRef>
-            <a:fillRef idx="1">
-              <a:schemeClr val="lt1"/>
-            </a:fillRef>
-            <a:effectRef idx="0">
-              <a:schemeClr val="accent2"/>
-            </a:effectRef>
-            <a:fontRef idx="minor">
-              <a:schemeClr val="dk1"/>
-            </a:fontRef>
-          </p:style>
-          <p:txBody>
-            <a:bodyPr rtlCol="0" anchor="ctr"/>
-            <a:lstStyle/>
-            <a:p>
-              <a:pPr algn="ctr"/>
-              <a:endParaRPr lang="en-US"/>
-            </a:p>
-          </p:txBody>
-        </p:sp>
-        <p:sp>
-          <p:nvSpPr>
-            <p:cNvPr id="20" name="Oval 19">
-              <a:extLst>
-                <a:ext uri="{FF2B5EF4-FFF2-40B4-BE49-F238E27FC236}">
-                  <a16:creationId xmlns:a16="http://schemas.microsoft.com/office/drawing/2014/main" id="{50E166F9-9C8A-46F2-BF0B-21F7980F08FA}"/>
-                </a:ext>
-              </a:extLst>
-            </p:cNvPr>
-            <p:cNvSpPr/>
-            <p:nvPr/>
-          </p:nvSpPr>
-          <p:spPr>
-            <a:xfrm>
-              <a:off x="7083670" y="4973515"/>
-              <a:ext cx="911468" cy="172916"/>
-            </a:xfrm>
-            <a:prstGeom prst="ellipse">
-              <a:avLst/>
-            </a:prstGeom>
-            <a:noFill/>
-            <a:ln>
-              <a:solidFill>
-                <a:srgbClr val="FF0000"/>
-              </a:solidFill>
-            </a:ln>
-          </p:spPr>
-          <p:style>
-            <a:lnRef idx="2">
-              <a:schemeClr val="accent2"/>
-            </a:lnRef>
-            <a:fillRef idx="1">
-              <a:schemeClr val="lt1"/>
-            </a:fillRef>
-            <a:effectRef idx="0">
-              <a:schemeClr val="accent2"/>
-            </a:effectRef>
-            <a:fontRef idx="minor">
-              <a:schemeClr val="dk1"/>
-            </a:fontRef>
-          </p:style>
-          <p:txBody>
-            <a:bodyPr rtlCol="0" anchor="ctr"/>
-            <a:lstStyle/>
-            <a:p>
-              <a:pPr algn="ctr"/>
-              <a:endParaRPr lang="en-US"/>
-            </a:p>
-          </p:txBody>
-        </p:sp>
-      </p:grpSp>
-      <p:grpSp>
-        <p:nvGrpSpPr>
-          <p:cNvPr id="32" name="Group 31">
-            <a:extLst>
-              <a:ext uri="{FF2B5EF4-FFF2-40B4-BE49-F238E27FC236}">
-                <a16:creationId xmlns:a16="http://schemas.microsoft.com/office/drawing/2014/main" id="{3C2A89E6-5655-407B-A016-D85AF50ECC47}"/>
-              </a:ext>
-            </a:extLst>
-          </p:cNvPr>
-          <p:cNvGrpSpPr/>
-          <p:nvPr/>
-        </p:nvGrpSpPr>
-        <p:grpSpPr>
-          <a:xfrm>
-            <a:off x="2975958" y="0"/>
-            <a:ext cx="3419952" cy="1838582"/>
-            <a:chOff x="5656096" y="0"/>
-            <a:chExt cx="3419952" cy="1838582"/>
-          </a:xfrm>
-        </p:grpSpPr>
-        <p:pic>
-          <p:nvPicPr>
-            <p:cNvPr id="8" name="Picture 7" descr="Text, letter&#10;&#10;Description automatically generated">
-              <a:extLst>
-                <a:ext uri="{FF2B5EF4-FFF2-40B4-BE49-F238E27FC236}">
-                  <a16:creationId xmlns:a16="http://schemas.microsoft.com/office/drawing/2014/main" id="{3701AE51-4BD4-46F0-93CE-382BF8832386}"/>
-                </a:ext>
-              </a:extLst>
-            </p:cNvPr>
-            <p:cNvPicPr>
-              <a:picLocks noChangeAspect="1"/>
-            </p:cNvPicPr>
-            <p:nvPr/>
-          </p:nvPicPr>
-          <p:blipFill>
-            <a:blip r:embed="rId3">
+            <a:blip r:embed="rId7">
               <a:extLst>
                 <a:ext uri="{28A0092B-C50C-407E-A947-70E740481C1C}">
                   <a14:useLocalDpi xmlns:a14="http://schemas.microsoft.com/office/drawing/2010/main" val="0"/>
@@ -6434,10 +6880,10 @@
         </p:pic>
         <p:sp>
           <p:nvSpPr>
-            <p:cNvPr id="31" name="Oval 30">
+            <p:cNvPr id="53" name="Oval 52">
               <a:extLst>
                 <a:ext uri="{FF2B5EF4-FFF2-40B4-BE49-F238E27FC236}">
-                  <a16:creationId xmlns:a16="http://schemas.microsoft.com/office/drawing/2014/main" id="{A52930DA-6211-49FF-B454-8020CCB92F6C}"/>
+                  <a16:creationId xmlns:a16="http://schemas.microsoft.com/office/drawing/2014/main" id="{D49CFF24-2454-41E3-A7CE-518B7637A127}"/>
                 </a:ext>
               </a:extLst>
             </p:cNvPr>
@@ -6485,10 +6931,10 @@
       </p:grpSp>
       <p:sp>
         <p:nvSpPr>
-          <p:cNvPr id="18" name="TextBox 17">
-            <a:extLst>
-              <a:ext uri="{FF2B5EF4-FFF2-40B4-BE49-F238E27FC236}">
-                <a16:creationId xmlns:a16="http://schemas.microsoft.com/office/drawing/2014/main" id="{F9563EA6-4549-4CF2-955B-15BF87359787}"/>
+          <p:cNvPr id="54" name="TextBox 53">
+            <a:extLst>
+              <a:ext uri="{FF2B5EF4-FFF2-40B4-BE49-F238E27FC236}">
+                <a16:creationId xmlns:a16="http://schemas.microsoft.com/office/drawing/2014/main" id="{FE72F4A2-433C-4023-B490-36CDD70D2C91}"/>
               </a:ext>
             </a:extLst>
           </p:cNvPr>
@@ -6497,7 +6943,42 @@
         </p:nvSpPr>
         <p:spPr>
           <a:xfrm>
-            <a:off x="7032026" y="0"/>
+            <a:off x="5621881" y="6214161"/>
+            <a:ext cx="6316717" cy="369332"/>
+          </a:xfrm>
+          <a:prstGeom prst="rect">
+            <a:avLst/>
+          </a:prstGeom>
+          <a:noFill/>
+        </p:spPr>
+        <p:txBody>
+          <a:bodyPr wrap="square">
+            <a:spAutoFit/>
+          </a:bodyPr>
+          <a:lstStyle/>
+          <a:p>
+            <a:r>
+              <a:rPr lang="en-US" dirty="0"/>
+              <a:t> UDLP(9272996), UMCX/UPMC(9272995) DBS*(9271296)</a:t>
+            </a:r>
+          </a:p>
+        </p:txBody>
+      </p:sp>
+      <p:sp>
+        <p:nvSpPr>
+          <p:cNvPr id="55" name="TextBox 54">
+            <a:extLst>
+              <a:ext uri="{FF2B5EF4-FFF2-40B4-BE49-F238E27FC236}">
+                <a16:creationId xmlns:a16="http://schemas.microsoft.com/office/drawing/2014/main" id="{8FCB13C5-D7B3-4B09-A94C-ADB4C58D3D3C}"/>
+              </a:ext>
+            </a:extLst>
+          </p:cNvPr>
+          <p:cNvSpPr txBox="1"/>
+          <p:nvPr/>
+        </p:nvSpPr>
+        <p:spPr>
+          <a:xfrm>
+            <a:off x="7442185" y="125012"/>
             <a:ext cx="1532214" cy="646331"/>
           </a:xfrm>
           <a:prstGeom prst="rect">
@@ -6529,12 +7010,89 @@
           </a:p>
         </p:txBody>
       </p:sp>
-      <p:sp>
-        <p:nvSpPr>
-          <p:cNvPr id="19" name="TextBox 18">
-            <a:extLst>
-              <a:ext uri="{FF2B5EF4-FFF2-40B4-BE49-F238E27FC236}">
-                <a16:creationId xmlns:a16="http://schemas.microsoft.com/office/drawing/2014/main" id="{BA44FB20-BA2C-4B5F-ADDE-F38F41A7DF6B}"/>
+    </p:spTree>
+    <p:extLst>
+      <p:ext uri="{BB962C8B-B14F-4D97-AF65-F5344CB8AC3E}">
+        <p14:creationId xmlns:p14="http://schemas.microsoft.com/office/powerpoint/2010/main" val="2861659902"/>
+      </p:ext>
+    </p:extLst>
+  </p:cSld>
+  <p:clrMapOvr>
+    <a:masterClrMapping/>
+  </p:clrMapOvr>
+</p:sld>
+</file>
+
+<file path=ppt/slides/slide8.xml><?xml version="1.0" encoding="utf-8"?>
+<p:sld xmlns:a="http://schemas.openxmlformats.org/drawingml/2006/main" xmlns:r="http://schemas.openxmlformats.org/officeDocument/2006/relationships" xmlns:p="http://schemas.openxmlformats.org/presentationml/2006/main">
+  <p:cSld>
+    <p:spTree>
+      <p:nvGrpSpPr>
+        <p:cNvPr id="1" name=""/>
+        <p:cNvGrpSpPr/>
+        <p:nvPr/>
+      </p:nvGrpSpPr>
+      <p:grpSpPr>
+        <a:xfrm>
+          <a:off x="0" y="0"/>
+          <a:ext cx="0" cy="0"/>
+          <a:chOff x="0" y="0"/>
+          <a:chExt cx="0" cy="0"/>
+        </a:xfrm>
+      </p:grpSpPr>
+      <p:pic>
+        <p:nvPicPr>
+          <p:cNvPr id="1026" name="Picture 2">
+            <a:extLst>
+              <a:ext uri="{FF2B5EF4-FFF2-40B4-BE49-F238E27FC236}">
+                <a16:creationId xmlns:a16="http://schemas.microsoft.com/office/drawing/2014/main" id="{39CD215E-F35B-4803-9CB0-BE08935F352B}"/>
+              </a:ext>
+            </a:extLst>
+          </p:cNvPr>
+          <p:cNvPicPr>
+            <a:picLocks noChangeAspect="1" noChangeArrowheads="1"/>
+          </p:cNvPicPr>
+          <p:nvPr/>
+        </p:nvPicPr>
+        <p:blipFill>
+          <a:blip r:embed="rId2">
+            <a:extLst>
+              <a:ext uri="{28A0092B-C50C-407E-A947-70E740481C1C}">
+                <a14:useLocalDpi xmlns:a14="http://schemas.microsoft.com/office/drawing/2010/main" val="0"/>
+              </a:ext>
+            </a:extLst>
+          </a:blip>
+          <a:srcRect/>
+          <a:stretch>
+            <a:fillRect/>
+          </a:stretch>
+        </p:blipFill>
+        <p:spPr bwMode="auto">
+          <a:xfrm>
+            <a:off x="945502" y="963613"/>
+            <a:ext cx="11246498" cy="5381625"/>
+          </a:xfrm>
+          <a:prstGeom prst="rect">
+            <a:avLst/>
+          </a:prstGeom>
+          <a:noFill/>
+          <a:extLst>
+            <a:ext uri="{909E8E84-426E-40DD-AFC4-6F175D3DCCD1}">
+              <a14:hiddenFill xmlns:a14="http://schemas.microsoft.com/office/drawing/2010/main">
+                <a:solidFill>
+                  <a:srgbClr val="FFFFFF"/>
+                </a:solidFill>
+              </a14:hiddenFill>
+            </a:ext>
+          </a:extLst>
+        </p:spPr>
+      </p:pic>
+      <p:sp>
+        <p:nvSpPr>
+          <p:cNvPr id="4" name="TextBox 3">
+            <a:extLst>
+              <a:ext uri="{FF2B5EF4-FFF2-40B4-BE49-F238E27FC236}">
+                <a16:creationId xmlns:a16="http://schemas.microsoft.com/office/drawing/2014/main" id="{EB03D4CA-1F1F-4459-931C-6B4561559AFC}"/>
               </a:ext>
             </a:extLst>
           </p:cNvPr>
@@ -6543,8 +7101,8 @@
         </p:nvSpPr>
         <p:spPr>
           <a:xfrm>
-            <a:off x="7032026" y="804468"/>
-            <a:ext cx="2525591" cy="923330"/>
+            <a:off x="8254482" y="5256244"/>
+            <a:ext cx="691215" cy="369332"/>
           </a:xfrm>
           <a:prstGeom prst="rect">
             <a:avLst/>
@@ -6552,20 +7110,84 @@
           <a:noFill/>
         </p:spPr>
         <p:txBody>
-          <a:bodyPr wrap="square">
+          <a:bodyPr wrap="none" rtlCol="0">
             <a:spAutoFit/>
           </a:bodyPr>
           <a:lstStyle/>
           <a:p>
             <a:r>
               <a:rPr lang="en-US" dirty="0"/>
-              <a:t> UDLP(9272996), UMCX/UPMC(9272995)</a:t>
-            </a:r>
-          </a:p>
+              <a:t>UDLP</a:t>
+            </a:r>
+          </a:p>
+        </p:txBody>
+      </p:sp>
+      <p:sp>
+        <p:nvSpPr>
+          <p:cNvPr id="6" name="TextBox 5">
+            <a:extLst>
+              <a:ext uri="{FF2B5EF4-FFF2-40B4-BE49-F238E27FC236}">
+                <a16:creationId xmlns:a16="http://schemas.microsoft.com/office/drawing/2014/main" id="{EC171EA7-E01F-47E3-9B29-A773D4E2A658}"/>
+              </a:ext>
+            </a:extLst>
+          </p:cNvPr>
+          <p:cNvSpPr txBox="1"/>
+          <p:nvPr/>
+        </p:nvSpPr>
+        <p:spPr>
+          <a:xfrm>
+            <a:off x="10795142" y="5256244"/>
+            <a:ext cx="1190711" cy="369332"/>
+          </a:xfrm>
+          <a:prstGeom prst="rect">
+            <a:avLst/>
+          </a:prstGeom>
+          <a:noFill/>
+        </p:spPr>
+        <p:txBody>
+          <a:bodyPr wrap="none" rtlCol="0">
+            <a:spAutoFit/>
+          </a:bodyPr>
+          <a:lstStyle/>
           <a:p>
             <a:r>
               <a:rPr lang="en-US" dirty="0"/>
-              <a:t> DBS*(9271296)</a:t>
+              <a:t>Utah Array</a:t>
+            </a:r>
+          </a:p>
+        </p:txBody>
+      </p:sp>
+      <p:sp>
+        <p:nvSpPr>
+          <p:cNvPr id="7" name="TextBox 6">
+            <a:extLst>
+              <a:ext uri="{FF2B5EF4-FFF2-40B4-BE49-F238E27FC236}">
+                <a16:creationId xmlns:a16="http://schemas.microsoft.com/office/drawing/2014/main" id="{12B34F3B-2119-49D9-A425-6503B87E3649}"/>
+              </a:ext>
+            </a:extLst>
+          </p:cNvPr>
+          <p:cNvSpPr txBox="1"/>
+          <p:nvPr/>
+        </p:nvSpPr>
+        <p:spPr>
+          <a:xfrm>
+            <a:off x="5222033" y="6258682"/>
+            <a:ext cx="1122423" cy="369332"/>
+          </a:xfrm>
+          <a:prstGeom prst="rect">
+            <a:avLst/>
+          </a:prstGeom>
+          <a:noFill/>
+        </p:spPr>
+        <p:txBody>
+          <a:bodyPr wrap="none" rtlCol="0">
+            <a:spAutoFit/>
+          </a:bodyPr>
+          <a:lstStyle/>
+          <a:p>
+            <a:r>
+              <a:rPr lang="en-US" dirty="0"/>
+              <a:t>Channel 1</a:t>
             </a:r>
           </a:p>
         </p:txBody>
@@ -6573,7 +7195,7 @@
     </p:spTree>
     <p:extLst>
       <p:ext uri="{BB962C8B-B14F-4D97-AF65-F5344CB8AC3E}">
-        <p14:creationId xmlns:p14="http://schemas.microsoft.com/office/powerpoint/2010/main" val="822829289"/>
+        <p14:creationId xmlns:p14="http://schemas.microsoft.com/office/powerpoint/2010/main" val="3736345900"/>
       </p:ext>
     </p:extLst>
   </p:cSld>
@@ -6600,118 +7222,48 @@
           <a:chExt cx="0" cy="0"/>
         </a:xfrm>
       </p:grpSpPr>
-      <p:grpSp>
-        <p:nvGrpSpPr>
-          <p:cNvPr id="9" name="Group 8">
-            <a:extLst>
-              <a:ext uri="{FF2B5EF4-FFF2-40B4-BE49-F238E27FC236}">
-                <a16:creationId xmlns:a16="http://schemas.microsoft.com/office/drawing/2014/main" id="{4D62A68A-D52D-4CF5-A3CD-5B8486D268D2}"/>
-              </a:ext>
-            </a:extLst>
-          </p:cNvPr>
-          <p:cNvGrpSpPr/>
-          <p:nvPr/>
-        </p:nvGrpSpPr>
-        <p:grpSpPr>
-          <a:xfrm>
-            <a:off x="7879018" y="0"/>
-            <a:ext cx="3953427" cy="5315692"/>
-            <a:chOff x="5544048" y="130664"/>
-            <a:chExt cx="3953427" cy="5315692"/>
-          </a:xfrm>
-        </p:grpSpPr>
-        <p:pic>
-          <p:nvPicPr>
-            <p:cNvPr id="7" name="Picture 6" descr="A picture containing table&#10;&#10;Description automatically generated">
-              <a:extLst>
-                <a:ext uri="{FF2B5EF4-FFF2-40B4-BE49-F238E27FC236}">
-                  <a16:creationId xmlns:a16="http://schemas.microsoft.com/office/drawing/2014/main" id="{5DCD4D7B-E82D-46E2-B582-F442830A24A7}"/>
-                </a:ext>
-              </a:extLst>
-            </p:cNvPr>
-            <p:cNvPicPr>
-              <a:picLocks noChangeAspect="1"/>
-            </p:cNvPicPr>
-            <p:nvPr/>
-          </p:nvPicPr>
-          <p:blipFill>
-            <a:blip r:embed="rId2">
-              <a:extLst>
-                <a:ext uri="{28A0092B-C50C-407E-A947-70E740481C1C}">
-                  <a14:useLocalDpi xmlns:a14="http://schemas.microsoft.com/office/drawing/2010/main" val="0"/>
-                </a:ext>
-              </a:extLst>
-            </a:blip>
-            <a:stretch>
-              <a:fillRect/>
-            </a:stretch>
-          </p:blipFill>
-          <p:spPr>
-            <a:xfrm>
-              <a:off x="5544048" y="130664"/>
-              <a:ext cx="3953427" cy="5315692"/>
-            </a:xfrm>
-            <a:prstGeom prst="rect">
-              <a:avLst/>
-            </a:prstGeom>
-          </p:spPr>
-        </p:pic>
-        <p:sp>
-          <p:nvSpPr>
-            <p:cNvPr id="8" name="TextBox 7">
-              <a:extLst>
-                <a:ext uri="{FF2B5EF4-FFF2-40B4-BE49-F238E27FC236}">
-                  <a16:creationId xmlns:a16="http://schemas.microsoft.com/office/drawing/2014/main" id="{D27593B4-C16A-4658-A1B6-4FEE45FC2FFF}"/>
-                </a:ext>
-              </a:extLst>
-            </p:cNvPr>
-            <p:cNvSpPr txBox="1"/>
-            <p:nvPr/>
-          </p:nvSpPr>
-          <p:spPr>
-            <a:xfrm>
-              <a:off x="6379326" y="2228193"/>
-              <a:ext cx="2282869" cy="646331"/>
-            </a:xfrm>
-            <a:prstGeom prst="rect">
-              <a:avLst/>
-            </a:prstGeom>
-            <a:noFill/>
-          </p:spPr>
-          <p:txBody>
-            <a:bodyPr wrap="none" rtlCol="0">
-              <a:spAutoFit/>
-            </a:bodyPr>
-            <a:lstStyle/>
-            <a:p>
-              <a:r>
-                <a:rPr lang="en-US" dirty="0">
-                  <a:solidFill>
-                    <a:srgbClr val="FF0000"/>
-                  </a:solidFill>
-                </a:rPr>
-                <a:t>Row number of</a:t>
-              </a:r>
-            </a:p>
-            <a:p>
-              <a:r>
-                <a:rPr lang="en-US" dirty="0">
-                  <a:solidFill>
-                    <a:srgbClr val="FF0000"/>
-                  </a:solidFill>
-                </a:rPr>
-                <a:t> actual electrode table</a:t>
-              </a:r>
-            </a:p>
-          </p:txBody>
-        </p:sp>
-      </p:grpSp>
       <p:pic>
         <p:nvPicPr>
-          <p:cNvPr id="11" name="Picture 10" descr="Text, letter&#10;&#10;Description automatically generated">
-            <a:extLst>
-              <a:ext uri="{FF2B5EF4-FFF2-40B4-BE49-F238E27FC236}">
-                <a16:creationId xmlns:a16="http://schemas.microsoft.com/office/drawing/2014/main" id="{2A4711CD-5166-4B15-8AE1-78C8257498F3}"/>
+          <p:cNvPr id="33" name="Picture 32" descr="Table&#10;&#10;Description automatically generated with medium confidence">
+            <a:extLst>
+              <a:ext uri="{FF2B5EF4-FFF2-40B4-BE49-F238E27FC236}">
+                <a16:creationId xmlns:a16="http://schemas.microsoft.com/office/drawing/2014/main" id="{A1CF37EF-2049-44DD-B646-DC81BA30FF7E}"/>
+              </a:ext>
+            </a:extLst>
+          </p:cNvPr>
+          <p:cNvPicPr>
+            <a:picLocks noChangeAspect="1"/>
+          </p:cNvPicPr>
+          <p:nvPr/>
+        </p:nvPicPr>
+        <p:blipFill>
+          <a:blip r:embed="rId2">
+            <a:extLst>
+              <a:ext uri="{28A0092B-C50C-407E-A947-70E740481C1C}">
+                <a14:useLocalDpi xmlns:a14="http://schemas.microsoft.com/office/drawing/2010/main" val="0"/>
+              </a:ext>
+            </a:extLst>
+          </a:blip>
+          <a:stretch>
+            <a:fillRect/>
+          </a:stretch>
+        </p:blipFill>
+        <p:spPr>
+          <a:xfrm>
+            <a:off x="3295259" y="136204"/>
+            <a:ext cx="5601482" cy="4401164"/>
+          </a:xfrm>
+          <a:prstGeom prst="rect">
+            <a:avLst/>
+          </a:prstGeom>
+        </p:spPr>
+      </p:pic>
+      <p:pic>
+        <p:nvPicPr>
+          <p:cNvPr id="34" name="Picture 33" descr="Text&#10;&#10;Description automatically generated">
+            <a:extLst>
+              <a:ext uri="{FF2B5EF4-FFF2-40B4-BE49-F238E27FC236}">
+                <a16:creationId xmlns:a16="http://schemas.microsoft.com/office/drawing/2014/main" id="{1627226D-C492-451A-8394-740BF4982815}"/>
               </a:ext>
             </a:extLst>
           </p:cNvPr>
@@ -6734,232 +7286,175 @@
         </p:blipFill>
         <p:spPr>
           <a:xfrm>
-            <a:off x="58692" y="2789383"/>
-            <a:ext cx="4105848" cy="1276528"/>
+            <a:off x="-203885" y="4675119"/>
+            <a:ext cx="7887801" cy="1962424"/>
           </a:xfrm>
           <a:prstGeom prst="rect">
             <a:avLst/>
           </a:prstGeom>
         </p:spPr>
       </p:pic>
-      <p:grpSp>
-        <p:nvGrpSpPr>
-          <p:cNvPr id="13" name="Group 12">
-            <a:extLst>
-              <a:ext uri="{FF2B5EF4-FFF2-40B4-BE49-F238E27FC236}">
-                <a16:creationId xmlns:a16="http://schemas.microsoft.com/office/drawing/2014/main" id="{D5504DEB-BE2D-4550-99A2-37042B4DDF43}"/>
-              </a:ext>
-            </a:extLst>
-          </p:cNvPr>
-          <p:cNvGrpSpPr/>
+      <p:graphicFrame>
+        <p:nvGraphicFramePr>
+          <p:cNvPr id="4" name="Table 4">
+            <a:extLst>
+              <a:ext uri="{FF2B5EF4-FFF2-40B4-BE49-F238E27FC236}">
+                <a16:creationId xmlns:a16="http://schemas.microsoft.com/office/drawing/2014/main" id="{EE8FF83F-8402-47CD-8A9C-621AAFC05A65}"/>
+              </a:ext>
+            </a:extLst>
+          </p:cNvPr>
+          <p:cNvGraphicFramePr>
+            <a:graphicFrameLocks noGrp="1"/>
+          </p:cNvGraphicFramePr>
+          <p:nvPr>
+            <p:extLst>
+              <p:ext uri="{D42A27DB-BD31-4B8C-83A1-F6EECF244321}">
+                <p14:modId xmlns:p14="http://schemas.microsoft.com/office/powerpoint/2010/main" val="2913693284"/>
+              </p:ext>
+            </p:extLst>
+          </p:nvPr>
+        </p:nvGraphicFramePr>
+        <p:xfrm>
+          <a:off x="255220" y="220457"/>
+          <a:ext cx="2708166" cy="1112520"/>
+        </p:xfrm>
+        <a:graphic>
+          <a:graphicData uri="http://schemas.openxmlformats.org/drawingml/2006/table">
+            <a:tbl>
+              <a:tblPr firstRow="1" bandRow="1">
+                <a:tableStyleId>{5C22544A-7EE6-4342-B048-85BDC9FD1C3A}</a:tableStyleId>
+              </a:tblPr>
+              <a:tblGrid>
+                <a:gridCol w="2708166">
+                  <a:extLst>
+                    <a:ext uri="{9D8B030D-6E8A-4147-A177-3AD203B41FA5}">
+                      <a16:colId xmlns:a16="http://schemas.microsoft.com/office/drawing/2014/main" val="481685055"/>
+                    </a:ext>
+                  </a:extLst>
+                </a:gridCol>
+              </a:tblGrid>
+              <a:tr h="370840">
+                <a:tc>
+                  <a:txBody>
+                    <a:bodyPr/>
+                    <a:lstStyle/>
+                    <a:p>
+                      <a:pPr algn="ctr"/>
+                      <a:r>
+                        <a:rPr lang="en-US" u="sng" dirty="0" err="1"/>
+                        <a:t>ElectricalSeries</a:t>
+                      </a:r>
+                      <a:endParaRPr lang="en-US" u="sng" dirty="0"/>
+                    </a:p>
+                  </a:txBody>
+                  <a:tcPr/>
+                </a:tc>
+                <a:extLst>
+                  <a:ext uri="{0D108BD9-81ED-4DB2-BD59-A6C34878D82A}">
+                    <a16:rowId xmlns:a16="http://schemas.microsoft.com/office/drawing/2014/main" val="3651904715"/>
+                  </a:ext>
+                </a:extLst>
+              </a:tr>
+              <a:tr h="370840">
+                <a:tc>
+                  <a:txBody>
+                    <a:bodyPr/>
+                    <a:lstStyle/>
+                    <a:p>
+                      <a:r>
+                        <a:rPr lang="en-US" dirty="0"/>
+                        <a:t>data [</a:t>
+                      </a:r>
+                      <a:r>
+                        <a:rPr lang="en-US" dirty="0" err="1"/>
+                        <a:t>ntimes</a:t>
+                      </a:r>
+                      <a:r>
+                        <a:rPr lang="en-US" dirty="0"/>
+                        <a:t>, </a:t>
+                      </a:r>
+                      <a:r>
+                        <a:rPr lang="en-US" dirty="0" err="1"/>
+                        <a:t>nchannels</a:t>
+                      </a:r>
+                      <a:r>
+                        <a:rPr lang="en-US" dirty="0"/>
+                        <a:t>]</a:t>
+                      </a:r>
+                    </a:p>
+                  </a:txBody>
+                  <a:tcPr/>
+                </a:tc>
+                <a:extLst>
+                  <a:ext uri="{0D108BD9-81ED-4DB2-BD59-A6C34878D82A}">
+                    <a16:rowId xmlns:a16="http://schemas.microsoft.com/office/drawing/2014/main" val="3992414402"/>
+                  </a:ext>
+                </a:extLst>
+              </a:tr>
+              <a:tr h="370840">
+                <a:tc>
+                  <a:txBody>
+                    <a:bodyPr/>
+                    <a:lstStyle/>
+                    <a:p>
+                      <a:r>
+                        <a:rPr lang="en-US" dirty="0"/>
+                        <a:t>electrodes</a:t>
+                      </a:r>
+                    </a:p>
+                  </a:txBody>
+                  <a:tcPr/>
+                </a:tc>
+                <a:extLst>
+                  <a:ext uri="{0D108BD9-81ED-4DB2-BD59-A6C34878D82A}">
+                    <a16:rowId xmlns:a16="http://schemas.microsoft.com/office/drawing/2014/main" val="2149915521"/>
+                  </a:ext>
+                </a:extLst>
+              </a:tr>
+            </a:tbl>
+          </a:graphicData>
+        </a:graphic>
+      </p:graphicFrame>
+      <p:pic>
+        <p:nvPicPr>
+          <p:cNvPr id="36" name="Picture 35" descr="Text&#10;&#10;Description automatically generated">
+            <a:extLst>
+              <a:ext uri="{FF2B5EF4-FFF2-40B4-BE49-F238E27FC236}">
+                <a16:creationId xmlns:a16="http://schemas.microsoft.com/office/drawing/2014/main" id="{32836053-6B58-48AB-8EDD-48CF5AB24F98}"/>
+              </a:ext>
+            </a:extLst>
+          </p:cNvPr>
+          <p:cNvPicPr>
+            <a:picLocks noChangeAspect="1"/>
+          </p:cNvPicPr>
           <p:nvPr/>
-        </p:nvGrpSpPr>
-        <p:grpSpPr>
+        </p:nvPicPr>
+        <p:blipFill>
+          <a:blip r:embed="rId4">
+            <a:extLst>
+              <a:ext uri="{28A0092B-C50C-407E-A947-70E740481C1C}">
+                <a14:useLocalDpi xmlns:a14="http://schemas.microsoft.com/office/drawing/2010/main" val="0"/>
+              </a:ext>
+            </a:extLst>
+          </a:blip>
+          <a:stretch>
+            <a:fillRect/>
+          </a:stretch>
+        </p:blipFill>
+        <p:spPr>
           <a:xfrm>
-            <a:off x="96797" y="130664"/>
-            <a:ext cx="4067743" cy="1743318"/>
-            <a:chOff x="96797" y="130664"/>
-            <a:chExt cx="4067743" cy="1743318"/>
+            <a:off x="6526924" y="4675119"/>
+            <a:ext cx="5172797" cy="971686"/>
           </a:xfrm>
-        </p:grpSpPr>
-        <p:pic>
-          <p:nvPicPr>
-            <p:cNvPr id="5" name="Picture 4" descr="Text&#10;&#10;Description automatically generated">
-              <a:extLst>
-                <a:ext uri="{FF2B5EF4-FFF2-40B4-BE49-F238E27FC236}">
-                  <a16:creationId xmlns:a16="http://schemas.microsoft.com/office/drawing/2014/main" id="{61C10F17-B97A-4C92-BDE3-D40A1913E1F7}"/>
-                </a:ext>
-              </a:extLst>
-            </p:cNvPr>
-            <p:cNvPicPr>
-              <a:picLocks noChangeAspect="1"/>
-            </p:cNvPicPr>
-            <p:nvPr/>
-          </p:nvPicPr>
-          <p:blipFill>
-            <a:blip r:embed="rId4">
-              <a:extLst>
-                <a:ext uri="{28A0092B-C50C-407E-A947-70E740481C1C}">
-                  <a14:useLocalDpi xmlns:a14="http://schemas.microsoft.com/office/drawing/2010/main" val="0"/>
-                </a:ext>
-              </a:extLst>
-            </a:blip>
-            <a:stretch>
-              <a:fillRect/>
-            </a:stretch>
-          </p:blipFill>
-          <p:spPr>
-            <a:xfrm>
-              <a:off x="96797" y="130664"/>
-              <a:ext cx="4067743" cy="1743318"/>
-            </a:xfrm>
-            <a:prstGeom prst="rect">
-              <a:avLst/>
-            </a:prstGeom>
-          </p:spPr>
-        </p:pic>
-        <p:sp>
-          <p:nvSpPr>
-            <p:cNvPr id="12" name="Oval 11">
-              <a:extLst>
-                <a:ext uri="{FF2B5EF4-FFF2-40B4-BE49-F238E27FC236}">
-                  <a16:creationId xmlns:a16="http://schemas.microsoft.com/office/drawing/2014/main" id="{7798286A-0E83-4B24-AF46-26F80BC60D3E}"/>
-                </a:ext>
-              </a:extLst>
-            </p:cNvPr>
-            <p:cNvSpPr/>
-            <p:nvPr/>
-          </p:nvSpPr>
-          <p:spPr>
-            <a:xfrm>
-              <a:off x="359555" y="1186759"/>
-              <a:ext cx="1368180" cy="687223"/>
-            </a:xfrm>
-            <a:prstGeom prst="ellipse">
-              <a:avLst/>
-            </a:prstGeom>
-            <a:noFill/>
-            <a:ln>
-              <a:solidFill>
-                <a:srgbClr val="FF0000"/>
-              </a:solidFill>
-            </a:ln>
-          </p:spPr>
-          <p:style>
-            <a:lnRef idx="2">
-              <a:schemeClr val="accent2"/>
-            </a:lnRef>
-            <a:fillRef idx="1">
-              <a:schemeClr val="lt1"/>
-            </a:fillRef>
-            <a:effectRef idx="0">
-              <a:schemeClr val="accent2"/>
-            </a:effectRef>
-            <a:fontRef idx="minor">
-              <a:schemeClr val="dk1"/>
-            </a:fontRef>
-          </p:style>
-          <p:txBody>
-            <a:bodyPr rtlCol="0" anchor="ctr"/>
-            <a:lstStyle/>
-            <a:p>
-              <a:pPr algn="ctr"/>
-              <a:endParaRPr lang="en-US"/>
-            </a:p>
-          </p:txBody>
-        </p:sp>
-      </p:grpSp>
-      <p:grpSp>
-        <p:nvGrpSpPr>
-          <p:cNvPr id="17" name="Group 16">
-            <a:extLst>
-              <a:ext uri="{FF2B5EF4-FFF2-40B4-BE49-F238E27FC236}">
-                <a16:creationId xmlns:a16="http://schemas.microsoft.com/office/drawing/2014/main" id="{2A28BD2D-58E5-43A5-8AE3-665A6A91E216}"/>
-              </a:ext>
-            </a:extLst>
-          </p:cNvPr>
-          <p:cNvGrpSpPr/>
-          <p:nvPr/>
-        </p:nvGrpSpPr>
-        <p:grpSpPr>
-          <a:xfrm>
-            <a:off x="96797" y="4476816"/>
-            <a:ext cx="7363853" cy="1876687"/>
-            <a:chOff x="96797" y="4476816"/>
-            <a:chExt cx="7363853" cy="1876687"/>
-          </a:xfrm>
-        </p:grpSpPr>
-        <p:pic>
-          <p:nvPicPr>
-            <p:cNvPr id="15" name="Picture 14" descr="Text, letter&#10;&#10;Description automatically generated">
-              <a:extLst>
-                <a:ext uri="{FF2B5EF4-FFF2-40B4-BE49-F238E27FC236}">
-                  <a16:creationId xmlns:a16="http://schemas.microsoft.com/office/drawing/2014/main" id="{663C0444-1D70-4005-8448-7A73224C1801}"/>
-                </a:ext>
-              </a:extLst>
-            </p:cNvPr>
-            <p:cNvPicPr>
-              <a:picLocks noChangeAspect="1"/>
-            </p:cNvPicPr>
-            <p:nvPr/>
-          </p:nvPicPr>
-          <p:blipFill>
-            <a:blip r:embed="rId5">
-              <a:extLst>
-                <a:ext uri="{28A0092B-C50C-407E-A947-70E740481C1C}">
-                  <a14:useLocalDpi xmlns:a14="http://schemas.microsoft.com/office/drawing/2010/main" val="0"/>
-                </a:ext>
-              </a:extLst>
-            </a:blip>
-            <a:stretch>
-              <a:fillRect/>
-            </a:stretch>
-          </p:blipFill>
-          <p:spPr>
-            <a:xfrm>
-              <a:off x="96797" y="4476816"/>
-              <a:ext cx="7363853" cy="1876687"/>
-            </a:xfrm>
-            <a:prstGeom prst="rect">
-              <a:avLst/>
-            </a:prstGeom>
-          </p:spPr>
-        </p:pic>
-        <p:sp>
-          <p:nvSpPr>
-            <p:cNvPr id="16" name="Oval 15">
-              <a:extLst>
-                <a:ext uri="{FF2B5EF4-FFF2-40B4-BE49-F238E27FC236}">
-                  <a16:creationId xmlns:a16="http://schemas.microsoft.com/office/drawing/2014/main" id="{61882AD9-DAF1-489F-B728-0A1C30D95ABE}"/>
-                </a:ext>
-              </a:extLst>
-            </p:cNvPr>
-            <p:cNvSpPr/>
-            <p:nvPr/>
-          </p:nvSpPr>
-          <p:spPr>
-            <a:xfrm>
-              <a:off x="228177" y="5616856"/>
-              <a:ext cx="1368180" cy="687223"/>
-            </a:xfrm>
-            <a:prstGeom prst="ellipse">
-              <a:avLst/>
-            </a:prstGeom>
-            <a:noFill/>
-            <a:ln>
-              <a:solidFill>
-                <a:srgbClr val="FF0000"/>
-              </a:solidFill>
-            </a:ln>
-          </p:spPr>
-          <p:style>
-            <a:lnRef idx="2">
-              <a:schemeClr val="accent2"/>
-            </a:lnRef>
-            <a:fillRef idx="1">
-              <a:schemeClr val="lt1"/>
-            </a:fillRef>
-            <a:effectRef idx="0">
-              <a:schemeClr val="accent2"/>
-            </a:effectRef>
-            <a:fontRef idx="minor">
-              <a:schemeClr val="dk1"/>
-            </a:fontRef>
-          </p:style>
-          <p:txBody>
-            <a:bodyPr rtlCol="0" anchor="ctr"/>
-            <a:lstStyle/>
-            <a:p>
-              <a:pPr algn="ctr"/>
-              <a:endParaRPr lang="en-US"/>
-            </a:p>
-          </p:txBody>
-        </p:sp>
-      </p:grpSp>
+          <a:prstGeom prst="rect">
+            <a:avLst/>
+          </a:prstGeom>
+        </p:spPr>
+      </p:pic>
     </p:spTree>
     <p:extLst>
       <p:ext uri="{BB962C8B-B14F-4D97-AF65-F5344CB8AC3E}">
-        <p14:creationId xmlns:p14="http://schemas.microsoft.com/office/powerpoint/2010/main" val="196408731"/>
+        <p14:creationId xmlns:p14="http://schemas.microsoft.com/office/powerpoint/2010/main" val="822829289"/>
       </p:ext>
     </p:extLst>
   </p:cSld>

</xml_diff>

<commit_message>
first discussion with Jingyi
</commit_message>
<xml_diff>
--- a/NWBUnderstanding.pptx
+++ b/NWBUnderstanding.pptx
@@ -5,7 +5,7 @@
     <p:sldMasterId id="2147483677" r:id="rId1"/>
   </p:sldMasterIdLst>
   <p:notesMasterIdLst>
-    <p:notesMasterId r:id="rId22"/>
+    <p:notesMasterId r:id="rId23"/>
   </p:notesMasterIdLst>
   <p:sldIdLst>
     <p:sldId id="256" r:id="rId2"/>
@@ -28,6 +28,7 @@
     <p:sldId id="274" r:id="rId19"/>
     <p:sldId id="275" r:id="rId20"/>
     <p:sldId id="276" r:id="rId21"/>
+    <p:sldId id="277" r:id="rId22"/>
   </p:sldIdLst>
   <p:sldSz cx="12192000" cy="6858000"/>
   <p:notesSz cx="6858000" cy="9144000"/>
@@ -228,7 +229,7 @@
           <a:p>
             <a:fld id="{0BBC82C6-28DA-4EB2-911C-4302BD97042D}" type="datetimeFigureOut">
               <a:rPr lang="en-US" smtClean="0"/>
-              <a:t>6/13/22</a:t>
+              <a:t>7/11/22</a:t>
             </a:fld>
             <a:endParaRPr lang="en-US"/>
           </a:p>
@@ -919,7 +920,7 @@
           <a:p>
             <a:fld id="{22672356-9B25-4037-AA2B-D3C17254FCC8}" type="datetimeFigureOut">
               <a:rPr lang="en-US" smtClean="0"/>
-              <a:t>6/13/22</a:t>
+              <a:t>7/11/22</a:t>
             </a:fld>
             <a:endParaRPr lang="en-US"/>
           </a:p>
@@ -1117,7 +1118,7 @@
           <a:p>
             <a:fld id="{22672356-9B25-4037-AA2B-D3C17254FCC8}" type="datetimeFigureOut">
               <a:rPr lang="en-US" smtClean="0"/>
-              <a:t>6/13/22</a:t>
+              <a:t>7/11/22</a:t>
             </a:fld>
             <a:endParaRPr lang="en-US"/>
           </a:p>
@@ -1325,7 +1326,7 @@
           <a:p>
             <a:fld id="{22672356-9B25-4037-AA2B-D3C17254FCC8}" type="datetimeFigureOut">
               <a:rPr lang="en-US" smtClean="0"/>
-              <a:t>6/13/22</a:t>
+              <a:t>7/11/22</a:t>
             </a:fld>
             <a:endParaRPr lang="en-US"/>
           </a:p>
@@ -1523,7 +1524,7 @@
           <a:p>
             <a:fld id="{22672356-9B25-4037-AA2B-D3C17254FCC8}" type="datetimeFigureOut">
               <a:rPr lang="en-US" smtClean="0"/>
-              <a:t>6/13/22</a:t>
+              <a:t>7/11/22</a:t>
             </a:fld>
             <a:endParaRPr lang="en-US"/>
           </a:p>
@@ -1798,7 +1799,7 @@
           <a:p>
             <a:fld id="{22672356-9B25-4037-AA2B-D3C17254FCC8}" type="datetimeFigureOut">
               <a:rPr lang="en-US" smtClean="0"/>
-              <a:t>6/13/22</a:t>
+              <a:t>7/11/22</a:t>
             </a:fld>
             <a:endParaRPr lang="en-US"/>
           </a:p>
@@ -2063,7 +2064,7 @@
           <a:p>
             <a:fld id="{22672356-9B25-4037-AA2B-D3C17254FCC8}" type="datetimeFigureOut">
               <a:rPr lang="en-US" smtClean="0"/>
-              <a:t>6/13/22</a:t>
+              <a:t>7/11/22</a:t>
             </a:fld>
             <a:endParaRPr lang="en-US"/>
           </a:p>
@@ -2475,7 +2476,7 @@
           <a:p>
             <a:fld id="{22672356-9B25-4037-AA2B-D3C17254FCC8}" type="datetimeFigureOut">
               <a:rPr lang="en-US" smtClean="0"/>
-              <a:t>6/13/22</a:t>
+              <a:t>7/11/22</a:t>
             </a:fld>
             <a:endParaRPr lang="en-US"/>
           </a:p>
@@ -2616,7 +2617,7 @@
           <a:p>
             <a:fld id="{22672356-9B25-4037-AA2B-D3C17254FCC8}" type="datetimeFigureOut">
               <a:rPr lang="en-US" smtClean="0"/>
-              <a:t>6/13/22</a:t>
+              <a:t>7/11/22</a:t>
             </a:fld>
             <a:endParaRPr lang="en-US"/>
           </a:p>
@@ -2729,7 +2730,7 @@
           <a:p>
             <a:fld id="{22672356-9B25-4037-AA2B-D3C17254FCC8}" type="datetimeFigureOut">
               <a:rPr lang="en-US" smtClean="0"/>
-              <a:t>6/13/22</a:t>
+              <a:t>7/11/22</a:t>
             </a:fld>
             <a:endParaRPr lang="en-US"/>
           </a:p>
@@ -3040,7 +3041,7 @@
           <a:p>
             <a:fld id="{22672356-9B25-4037-AA2B-D3C17254FCC8}" type="datetimeFigureOut">
               <a:rPr lang="en-US" smtClean="0"/>
-              <a:t>6/13/22</a:t>
+              <a:t>7/11/22</a:t>
             </a:fld>
             <a:endParaRPr lang="en-US"/>
           </a:p>
@@ -3328,7 +3329,7 @@
           <a:p>
             <a:fld id="{22672356-9B25-4037-AA2B-D3C17254FCC8}" type="datetimeFigureOut">
               <a:rPr lang="en-US" smtClean="0"/>
-              <a:t>6/13/22</a:t>
+              <a:t>7/11/22</a:t>
             </a:fld>
             <a:endParaRPr lang="en-US"/>
           </a:p>
@@ -3569,7 +3570,7 @@
           <a:p>
             <a:fld id="{22672356-9B25-4037-AA2B-D3C17254FCC8}" type="datetimeFigureOut">
               <a:rPr lang="en-US" smtClean="0"/>
-              <a:t>6/13/22</a:t>
+              <a:t>7/11/22</a:t>
             </a:fld>
             <a:endParaRPr lang="en-US"/>
           </a:p>
@@ -6480,6 +6481,180 @@
     <p:extLst>
       <p:ext uri="{BB962C8B-B14F-4D97-AF65-F5344CB8AC3E}">
         <p14:creationId xmlns:p14="http://schemas.microsoft.com/office/powerpoint/2010/main" val="2352684150"/>
+      </p:ext>
+    </p:extLst>
+  </p:cSld>
+  <p:clrMapOvr>
+    <a:masterClrMapping/>
+  </p:clrMapOvr>
+</p:sld>
+</file>
+
+<file path=ppt/slides/slide21.xml><?xml version="1.0" encoding="utf-8"?>
+<p:sld xmlns:a="http://schemas.openxmlformats.org/drawingml/2006/main" xmlns:r="http://schemas.openxmlformats.org/officeDocument/2006/relationships" xmlns:p="http://schemas.openxmlformats.org/presentationml/2006/main">
+  <p:cSld>
+    <p:spTree>
+      <p:nvGrpSpPr>
+        <p:cNvPr id="1" name=""/>
+        <p:cNvGrpSpPr/>
+        <p:nvPr/>
+      </p:nvGrpSpPr>
+      <p:grpSpPr>
+        <a:xfrm>
+          <a:off x="0" y="0"/>
+          <a:ext cx="0" cy="0"/>
+          <a:chOff x="0" y="0"/>
+          <a:chExt cx="0" cy="0"/>
+        </a:xfrm>
+      </p:grpSpPr>
+      <p:sp>
+        <p:nvSpPr>
+          <p:cNvPr id="2" name="Title 1">
+            <a:extLst>
+              <a:ext uri="{FF2B5EF4-FFF2-40B4-BE49-F238E27FC236}">
+                <a16:creationId xmlns:a16="http://schemas.microsoft.com/office/drawing/2014/main" id="{3438A1B0-D0F5-1FF3-5D6F-C5D78DC3B068}"/>
+              </a:ext>
+            </a:extLst>
+          </p:cNvPr>
+          <p:cNvSpPr>
+            <a:spLocks noGrp="1"/>
+          </p:cNvSpPr>
+          <p:nvPr>
+            <p:ph type="title"/>
+          </p:nvPr>
+        </p:nvSpPr>
+        <p:spPr/>
+        <p:txBody>
+          <a:bodyPr/>
+          <a:lstStyle/>
+          <a:p>
+            <a:r>
+              <a:rPr lang="en-US" dirty="0"/>
+              <a:t>July 11 with </a:t>
+            </a:r>
+            <a:r>
+              <a:rPr lang="en-US" dirty="0" err="1"/>
+              <a:t>Jingyi</a:t>
+            </a:r>
+            <a:r>
+              <a:rPr lang="en-US" dirty="0"/>
+              <a:t> </a:t>
+            </a:r>
+          </a:p>
+        </p:txBody>
+      </p:sp>
+      <p:sp>
+        <p:nvSpPr>
+          <p:cNvPr id="3" name="Content Placeholder 2">
+            <a:extLst>
+              <a:ext uri="{FF2B5EF4-FFF2-40B4-BE49-F238E27FC236}">
+                <a16:creationId xmlns:a16="http://schemas.microsoft.com/office/drawing/2014/main" id="{8E0E1435-E9C8-6620-B29C-8517D535456F}"/>
+              </a:ext>
+            </a:extLst>
+          </p:cNvPr>
+          <p:cNvSpPr>
+            <a:spLocks noGrp="1"/>
+          </p:cNvSpPr>
+          <p:nvPr>
+            <p:ph idx="1"/>
+          </p:nvPr>
+        </p:nvSpPr>
+        <p:spPr/>
+        <p:txBody>
+          <a:bodyPr/>
+          <a:lstStyle/>
+          <a:p>
+            <a:r>
+              <a:rPr lang="en-US" dirty="0" err="1"/>
+              <a:t>deeplabcut</a:t>
+            </a:r>
+            <a:r>
+              <a:rPr lang="en-US" dirty="0"/>
+              <a:t> processed </a:t>
+            </a:r>
+            <a:r>
+              <a:rPr lang="en-US" dirty="0" err="1"/>
+              <a:t>x,y</a:t>
+            </a:r>
+            <a:r>
+              <a:rPr lang="en-US" dirty="0"/>
+              <a:t>, z trajectory data</a:t>
+            </a:r>
+          </a:p>
+          <a:p>
+            <a:pPr lvl="1"/>
+            <a:r>
+              <a:rPr lang="en-US" dirty="0"/>
+              <a:t>Get familiar with the current NWBNMRC codes using the NWB test data.</a:t>
+            </a:r>
+          </a:p>
+          <a:p>
+            <a:pPr lvl="1"/>
+            <a:r>
+              <a:rPr lang="en-US" dirty="0"/>
+              <a:t>Ask </a:t>
+            </a:r>
+            <a:r>
+              <a:rPr lang="en-US" dirty="0" err="1"/>
+              <a:t>Ziling</a:t>
+            </a:r>
+            <a:r>
+              <a:rPr lang="en-US" dirty="0"/>
+              <a:t> or Kai for processed x, y, z trajectory data as sample data</a:t>
+            </a:r>
+          </a:p>
+          <a:p>
+            <a:pPr lvl="1"/>
+            <a:r>
+              <a:rPr lang="en-US" dirty="0"/>
+              <a:t>Read the NWB official documentation and especially the class </a:t>
+            </a:r>
+            <a:r>
+              <a:rPr lang="en-US" dirty="0" err="1"/>
+              <a:t>SpatialSeries</a:t>
+            </a:r>
+            <a:r>
+              <a:rPr lang="en-US" dirty="0"/>
+              <a:t> </a:t>
+            </a:r>
+          </a:p>
+          <a:p>
+            <a:pPr lvl="2"/>
+            <a:r>
+              <a:rPr lang="en-US" dirty="0"/>
+              <a:t>Understanding the idea of the class </a:t>
+            </a:r>
+            <a:r>
+              <a:rPr lang="en-US" dirty="0" err="1"/>
+              <a:t>SpatialSeries</a:t>
+            </a:r>
+            <a:endParaRPr lang="en-US" dirty="0"/>
+          </a:p>
+          <a:p>
+            <a:pPr lvl="2"/>
+            <a:r>
+              <a:rPr lang="en-US" dirty="0"/>
+              <a:t>How to use it for the x, </a:t>
+            </a:r>
+            <a:r>
+              <a:rPr lang="en-US" dirty="0" err="1"/>
+              <a:t>y,z</a:t>
+            </a:r>
+            <a:r>
+              <a:rPr lang="en-US" dirty="0"/>
+              <a:t> trajectory data</a:t>
+            </a:r>
+          </a:p>
+          <a:p>
+            <a:pPr lvl="1"/>
+            <a:endParaRPr lang="en-US" dirty="0"/>
+          </a:p>
+        </p:txBody>
+      </p:sp>
+    </p:spTree>
+    <p:extLst>
+      <p:ext uri="{BB962C8B-B14F-4D97-AF65-F5344CB8AC3E}">
+        <p14:creationId xmlns:p14="http://schemas.microsoft.com/office/powerpoint/2010/main" val="3949056481"/>
       </p:ext>
     </p:extLst>
   </p:cSld>

</xml_diff>